<commit_message>
Addition demos and slide edits
Introduce scripts for some walkthroughs, add comments to slides and
update various slide content
</commit_message>
<xml_diff>
--- a/Slides/Module 1 - Introduction to Web API.pptx
+++ b/Slides/Module 1 - Introduction to Web API.pptx
@@ -5,10 +5,10 @@
     <p:sldMasterId id="2147483660" r:id="rId4"/>
   </p:sldMasterIdLst>
   <p:notesMasterIdLst>
-    <p:notesMasterId r:id="rId19"/>
+    <p:notesMasterId r:id="rId20"/>
   </p:notesMasterIdLst>
   <p:handoutMasterIdLst>
-    <p:handoutMasterId r:id="rId20"/>
+    <p:handoutMasterId r:id="rId21"/>
   </p:handoutMasterIdLst>
   <p:sldIdLst>
     <p:sldId id="271" r:id="rId5"/>
@@ -24,7 +24,8 @@
     <p:sldId id="284" r:id="rId15"/>
     <p:sldId id="285" r:id="rId16"/>
     <p:sldId id="286" r:id="rId17"/>
-    <p:sldId id="269" r:id="rId18"/>
+    <p:sldId id="287" r:id="rId18"/>
+    <p:sldId id="269" r:id="rId19"/>
   </p:sldIdLst>
   <p:sldSz cx="12192000" cy="6858000"/>
   <p:notesSz cx="6858000" cy="9144000"/>
@@ -216,7 +217,7 @@
           <a:p>
             <a:fld id="{312E7B4A-039C-48A2-9B2C-AF16AA3873D8}" type="datetimeFigureOut">
               <a:rPr lang="en-US" smtClean="0"/>
-              <a:t>12/9/2014</a:t>
+              <a:t>12/21/2014</a:t>
             </a:fld>
             <a:endParaRPr lang="en-US"/>
           </a:p>
@@ -381,7 +382,7 @@
           <a:p>
             <a:fld id="{DA005A0C-54D9-45AA-87D4-C551D08DFCE1}" type="datetimeFigureOut">
               <a:rPr lang="en-US" smtClean="0"/>
-              <a:t>12/9/2014</a:t>
+              <a:t>12/21/2014</a:t>
             </a:fld>
             <a:endParaRPr lang="en-US"/>
           </a:p>
@@ -1355,6 +1356,90 @@
     <p:extLst>
       <p:ext uri="{BB962C8B-B14F-4D97-AF65-F5344CB8AC3E}">
         <p14:creationId xmlns:p14="http://schemas.microsoft.com/office/powerpoint/2010/main" val="1038524082"/>
+      </p:ext>
+    </p:extLst>
+  </p:cSld>
+  <p:clrMapOvr>
+    <a:masterClrMapping/>
+  </p:clrMapOvr>
+</p:notes>
+</file>
+
+<file path=ppt/notesSlides/notesSlide9.xml><?xml version="1.0" encoding="utf-8"?>
+<p:notes xmlns:a="http://schemas.openxmlformats.org/drawingml/2006/main" xmlns:r="http://schemas.openxmlformats.org/officeDocument/2006/relationships" xmlns:p="http://schemas.openxmlformats.org/presentationml/2006/main">
+  <p:cSld>
+    <p:spTree>
+      <p:nvGrpSpPr>
+        <p:cNvPr id="1" name=""/>
+        <p:cNvGrpSpPr/>
+        <p:nvPr/>
+      </p:nvGrpSpPr>
+      <p:grpSpPr>
+        <a:xfrm>
+          <a:off x="0" y="0"/>
+          <a:ext cx="0" cy="0"/>
+          <a:chOff x="0" y="0"/>
+          <a:chExt cx="0" cy="0"/>
+        </a:xfrm>
+      </p:grpSpPr>
+      <p:sp>
+        <p:nvSpPr>
+          <p:cNvPr id="2" name="Slide Image Placeholder 1"/>
+          <p:cNvSpPr>
+            <a:spLocks noGrp="1" noRot="1" noChangeAspect="1"/>
+          </p:cNvSpPr>
+          <p:nvPr>
+            <p:ph type="sldImg"/>
+          </p:nvPr>
+        </p:nvSpPr>
+        <p:spPr/>
+      </p:sp>
+      <p:sp>
+        <p:nvSpPr>
+          <p:cNvPr id="3" name="Notes Placeholder 2"/>
+          <p:cNvSpPr>
+            <a:spLocks noGrp="1"/>
+          </p:cNvSpPr>
+          <p:nvPr>
+            <p:ph type="body" idx="1"/>
+          </p:nvPr>
+        </p:nvSpPr>
+        <p:spPr/>
+        <p:txBody>
+          <a:bodyPr/>
+          <a:lstStyle/>
+          <a:p>
+            <a:endParaRPr lang="en-US" dirty="0"/>
+          </a:p>
+        </p:txBody>
+      </p:sp>
+      <p:sp>
+        <p:nvSpPr>
+          <p:cNvPr id="4" name="Slide Number Placeholder 3"/>
+          <p:cNvSpPr>
+            <a:spLocks noGrp="1"/>
+          </p:cNvSpPr>
+          <p:nvPr>
+            <p:ph type="sldNum" sz="quarter" idx="10"/>
+          </p:nvPr>
+        </p:nvSpPr>
+        <p:spPr/>
+        <p:txBody>
+          <a:bodyPr/>
+          <a:lstStyle/>
+          <a:p>
+            <a:fld id="{4CFD207A-07DF-40AD-A916-9872E089CE7A}" type="slidenum">
+              <a:rPr lang="en-US" smtClean="0"/>
+              <a:t>14</a:t>
+            </a:fld>
+            <a:endParaRPr lang="en-US"/>
+          </a:p>
+        </p:txBody>
+      </p:sp>
+    </p:spTree>
+    <p:extLst>
+      <p:ext uri="{BB962C8B-B14F-4D97-AF65-F5344CB8AC3E}">
+        <p14:creationId xmlns:p14="http://schemas.microsoft.com/office/powerpoint/2010/main" val="2868944259"/>
       </p:ext>
     </p:extLst>
   </p:cSld>
@@ -4954,6 +5039,113 @@
           <a:chExt cx="0" cy="0"/>
         </a:xfrm>
       </p:grpSpPr>
+      <p:sp>
+        <p:nvSpPr>
+          <p:cNvPr id="2" name="Title 1"/>
+          <p:cNvSpPr>
+            <a:spLocks noGrp="1"/>
+          </p:cNvSpPr>
+          <p:nvPr>
+            <p:ph type="title"/>
+          </p:nvPr>
+        </p:nvSpPr>
+        <p:spPr/>
+        <p:txBody>
+          <a:bodyPr/>
+          <a:lstStyle/>
+          <a:p>
+            <a:r>
+              <a:rPr lang="en-US" b="1" dirty="0" smtClean="0"/>
+              <a:t>Scaffolding</a:t>
+            </a:r>
+            <a:endParaRPr lang="en-US" dirty="0"/>
+          </a:p>
+        </p:txBody>
+      </p:sp>
+      <p:sp>
+        <p:nvSpPr>
+          <p:cNvPr id="4" name="TextBox 3"/>
+          <p:cNvSpPr txBox="1"/>
+          <p:nvPr/>
+        </p:nvSpPr>
+        <p:spPr>
+          <a:xfrm>
+            <a:off x="9906000" y="-1"/>
+            <a:ext cx="2286000" cy="2031325"/>
+          </a:xfrm>
+          <a:prstGeom prst="rect">
+            <a:avLst/>
+          </a:prstGeom>
+          <a:solidFill>
+            <a:srgbClr val="FFFF00"/>
+          </a:solidFill>
+          <a:ln>
+            <a:noFill/>
+          </a:ln>
+        </p:spPr>
+        <p:txBody>
+          <a:bodyPr wrap="square" rtlCol="0">
+            <a:spAutoFit/>
+          </a:bodyPr>
+          <a:lstStyle/>
+          <a:p>
+            <a:pPr algn="ctr"/>
+            <a:endParaRPr lang="en-US" dirty="0" smtClean="0"/>
+          </a:p>
+          <a:p>
+            <a:pPr algn="ctr"/>
+            <a:endParaRPr lang="en-US" dirty="0"/>
+          </a:p>
+          <a:p>
+            <a:pPr algn="ctr"/>
+            <a:r>
+              <a:rPr lang="en-US" dirty="0" smtClean="0"/>
+              <a:t>Please leave this area blank to allow for picture in picture recording</a:t>
+            </a:r>
+          </a:p>
+          <a:p>
+            <a:pPr algn="ctr"/>
+            <a:endParaRPr lang="en-US" dirty="0"/>
+          </a:p>
+        </p:txBody>
+      </p:sp>
+    </p:spTree>
+    <p:extLst>
+      <p:ext uri="{BB962C8B-B14F-4D97-AF65-F5344CB8AC3E}">
+        <p14:creationId xmlns:p14="http://schemas.microsoft.com/office/powerpoint/2010/main" val="2477759453"/>
+      </p:ext>
+    </p:extLst>
+  </p:cSld>
+  <p:clrMapOvr>
+    <a:masterClrMapping/>
+  </p:clrMapOvr>
+  <p:timing>
+    <p:tnLst>
+      <p:par>
+        <p:cTn id="1" dur="indefinite" restart="never" nodeType="tmRoot"/>
+      </p:par>
+    </p:tnLst>
+  </p:timing>
+</p:sld>
+</file>
+
+<file path=ppt/slides/slide15.xml><?xml version="1.0" encoding="utf-8"?>
+<p:sld xmlns:a="http://schemas.openxmlformats.org/drawingml/2006/main" xmlns:r="http://schemas.openxmlformats.org/officeDocument/2006/relationships" xmlns:p="http://schemas.openxmlformats.org/presentationml/2006/main">
+  <p:cSld>
+    <p:spTree>
+      <p:nvGrpSpPr>
+        <p:cNvPr id="1" name=""/>
+        <p:cNvGrpSpPr/>
+        <p:nvPr/>
+      </p:nvGrpSpPr>
+      <p:grpSpPr>
+        <a:xfrm>
+          <a:off x="0" y="0"/>
+          <a:ext cx="0" cy="0"/>
+          <a:chOff x="0" y="0"/>
+          <a:chExt cx="0" cy="0"/>
+        </a:xfrm>
+      </p:grpSpPr>
     </p:spTree>
     <p:extLst>
       <p:ext uri="{BB962C8B-B14F-4D97-AF65-F5344CB8AC3E}">
@@ -5466,14 +5658,14 @@
                 <a:gridCol w="5762625">
                   <a:extLst>
                     <a:ext uri="{9D8B030D-6E8A-4147-A177-3AD203B41FA5}">
-                      <a16:colId xmlns="" xmlns:a16="http://schemas.microsoft.com/office/drawing/2014/main" val="1632794655"/>
+                      <a16:colId xmlns:a16="http://schemas.microsoft.com/office/drawing/2014/main" xmlns="" val="1632794655"/>
                     </a:ext>
                   </a:extLst>
                 </a:gridCol>
                 <a:gridCol w="5762625">
                   <a:extLst>
                     <a:ext uri="{9D8B030D-6E8A-4147-A177-3AD203B41FA5}">
-                      <a16:colId xmlns="" xmlns:a16="http://schemas.microsoft.com/office/drawing/2014/main" val="2011313899"/>
+                      <a16:colId xmlns:a16="http://schemas.microsoft.com/office/drawing/2014/main" xmlns="" val="2011313899"/>
                     </a:ext>
                   </a:extLst>
                 </a:gridCol>
@@ -5518,7 +5710,7 @@
                 </a:tc>
                 <a:extLst>
                   <a:ext uri="{0D108BD9-81ED-4DB2-BD59-A6C34878D82A}">
-                    <a16:rowId xmlns="" xmlns:a16="http://schemas.microsoft.com/office/drawing/2014/main" val="1789177411"/>
+                    <a16:rowId xmlns:a16="http://schemas.microsoft.com/office/drawing/2014/main" xmlns="" val="1789177411"/>
                   </a:ext>
                 </a:extLst>
               </a:tr>
@@ -5586,7 +5778,7 @@
                 </a:tc>
                 <a:extLst>
                   <a:ext uri="{0D108BD9-81ED-4DB2-BD59-A6C34878D82A}">
-                    <a16:rowId xmlns="" xmlns:a16="http://schemas.microsoft.com/office/drawing/2014/main" val="3842815335"/>
+                    <a16:rowId xmlns:a16="http://schemas.microsoft.com/office/drawing/2014/main" xmlns="" val="3842815335"/>
                   </a:ext>
                 </a:extLst>
               </a:tr>
@@ -5633,7 +5825,7 @@
                 </a:tc>
                 <a:extLst>
                   <a:ext uri="{0D108BD9-81ED-4DB2-BD59-A6C34878D82A}">
-                    <a16:rowId xmlns="" xmlns:a16="http://schemas.microsoft.com/office/drawing/2014/main" val="321066646"/>
+                    <a16:rowId xmlns:a16="http://schemas.microsoft.com/office/drawing/2014/main" xmlns="" val="321066646"/>
                   </a:ext>
                 </a:extLst>
               </a:tr>
@@ -5718,7 +5910,7 @@
                 </a:tc>
                 <a:extLst>
                   <a:ext uri="{0D108BD9-81ED-4DB2-BD59-A6C34878D82A}">
-                    <a16:rowId xmlns="" xmlns:a16="http://schemas.microsoft.com/office/drawing/2014/main" val="3812060533"/>
+                    <a16:rowId xmlns:a16="http://schemas.microsoft.com/office/drawing/2014/main" xmlns="" val="3812060533"/>
                   </a:ext>
                 </a:extLst>
               </a:tr>
@@ -7507,15 +7699,6 @@
 </file>
 
 <file path=customXml/item2.xml><?xml version="1.0" encoding="utf-8"?>
-<?mso-contentType ?>
-<FormTemplates xmlns="http://schemas.microsoft.com/sharepoint/v3/contenttype/forms">
-  <Display>DocumentLibraryForm</Display>
-  <Edit>DocumentLibraryForm</Edit>
-  <New>DocumentLibraryForm</New>
-</FormTemplates>
-</file>
-
-<file path=customXml/item3.xml><?xml version="1.0" encoding="utf-8"?>
 <ct:contentTypeSchema xmlns:ct="http://schemas.microsoft.com/office/2006/metadata/contentType" xmlns:ma="http://schemas.microsoft.com/office/2006/metadata/properties/metaAttributes" ct:_="" ma:_="" ma:contentTypeName="Document" ma:contentTypeID="0x010100496889825850D44592AC5D2F43187AE4" ma:contentTypeVersion="5" ma:contentTypeDescription="Create a new document." ma:contentTypeScope="" ma:versionID="fde90edb5a63ba841bca516fd2abaf95">
   <xsd:schema xmlns:xsd="http://www.w3.org/2001/XMLSchema" xmlns:xs="http://www.w3.org/2001/XMLSchema" xmlns:p="http://schemas.microsoft.com/office/2006/metadata/properties" xmlns:ns1="http://schemas.microsoft.com/sharepoint/v3" xmlns:ns2="230e9df3-be65-4c73-a93b-d1236ebd677e" xmlns:ns3="27aa9422-7f1f-4c84-9cdf-302b1a67e513" targetNamespace="http://schemas.microsoft.com/office/2006/metadata/properties" ma:root="true" ma:fieldsID="5e7808ae941cc340dbe51a3031959734" ns1:_="" ns2:_="" ns3:_="">
     <xsd:import namespace="http://schemas.microsoft.com/sharepoint/v3"/>
@@ -7697,6 +7880,15 @@
 </ct:contentTypeSchema>
 </file>
 
+<file path=customXml/item3.xml><?xml version="1.0" encoding="utf-8"?>
+<?mso-contentType ?>
+<FormTemplates xmlns="http://schemas.microsoft.com/sharepoint/v3/contenttype/forms">
+  <Display>DocumentLibraryForm</Display>
+  <Edit>DocumentLibraryForm</Edit>
+  <New>DocumentLibraryForm</New>
+</FormTemplates>
+</file>
+
 <file path=customXml/itemProps1.xml><?xml version="1.0" encoding="utf-8"?>
 <ds:datastoreItem xmlns:ds="http://schemas.openxmlformats.org/officeDocument/2006/customXml" ds:itemID="{7025FDD9-4C58-4084-9F89-0E6ADD6FFF55}">
   <ds:schemaRefs>
@@ -7716,14 +7908,6 @@
 </file>
 
 <file path=customXml/itemProps2.xml><?xml version="1.0" encoding="utf-8"?>
-<ds:datastoreItem xmlns:ds="http://schemas.openxmlformats.org/officeDocument/2006/customXml" ds:itemID="{B0CA13EC-1D3C-4D6F-8D1C-E8A452CFC79A}">
-  <ds:schemaRefs>
-    <ds:schemaRef ds:uri="http://schemas.microsoft.com/sharepoint/v3/contenttype/forms"/>
-  </ds:schemaRefs>
-</ds:datastoreItem>
-</file>
-
-<file path=customXml/itemProps3.xml><?xml version="1.0" encoding="utf-8"?>
 <ds:datastoreItem xmlns:ds="http://schemas.openxmlformats.org/officeDocument/2006/customXml" ds:itemID="{3253B29C-1CCD-4FE8-A1C4-023A0910DF96}">
   <ds:schemaRefs>
     <ds:schemaRef ds:uri="http://schemas.microsoft.com/office/2006/metadata/contentType"/>
@@ -7741,4 +7925,12 @@
     <ds:schemaRef ds:uri="http://schemas.microsoft.com/internal/obd"/>
   </ds:schemaRefs>
 </ds:datastoreItem>
+</file>
+
+<file path=customXml/itemProps3.xml><?xml version="1.0" encoding="utf-8"?>
+<ds:datastoreItem xmlns:ds="http://schemas.openxmlformats.org/officeDocument/2006/customXml" ds:itemID="{B0CA13EC-1D3C-4D6F-8D1C-E8A452CFC79A}">
+  <ds:schemaRefs>
+    <ds:schemaRef ds:uri="http://schemas.microsoft.com/sharepoint/v3/contenttype/forms"/>
+  </ds:schemaRefs>
+</ds:datastoreItem>
 </file>
</xml_diff>

<commit_message>
Additions to examples and slides
Updating routing actions demo to include a serializable type; added
custom content negotiation example; updated deck to be in synch with
slides and based on feedback
</commit_message>
<xml_diff>
--- a/Slides/Module 1 - Introduction to Web API.pptx
+++ b/Slides/Module 1 - Introduction to Web API.pptx
@@ -5,10 +5,10 @@
     <p:sldMasterId id="2147483660" r:id="rId4"/>
   </p:sldMasterIdLst>
   <p:notesMasterIdLst>
-    <p:notesMasterId r:id="rId20"/>
+    <p:notesMasterId r:id="rId25"/>
   </p:notesMasterIdLst>
   <p:handoutMasterIdLst>
-    <p:handoutMasterId r:id="rId21"/>
+    <p:handoutMasterId r:id="rId26"/>
   </p:handoutMasterIdLst>
   <p:sldIdLst>
     <p:sldId id="271" r:id="rId5"/>
@@ -19,13 +19,18 @@
     <p:sldId id="276" r:id="rId10"/>
     <p:sldId id="277" r:id="rId11"/>
     <p:sldId id="278" r:id="rId12"/>
-    <p:sldId id="282" r:id="rId13"/>
-    <p:sldId id="283" r:id="rId14"/>
-    <p:sldId id="284" r:id="rId15"/>
-    <p:sldId id="285" r:id="rId16"/>
-    <p:sldId id="286" r:id="rId17"/>
-    <p:sldId id="287" r:id="rId18"/>
-    <p:sldId id="269" r:id="rId19"/>
+    <p:sldId id="288" r:id="rId13"/>
+    <p:sldId id="282" r:id="rId14"/>
+    <p:sldId id="289" r:id="rId15"/>
+    <p:sldId id="283" r:id="rId16"/>
+    <p:sldId id="290" r:id="rId17"/>
+    <p:sldId id="284" r:id="rId18"/>
+    <p:sldId id="291" r:id="rId19"/>
+    <p:sldId id="285" r:id="rId20"/>
+    <p:sldId id="286" r:id="rId21"/>
+    <p:sldId id="292" r:id="rId22"/>
+    <p:sldId id="287" r:id="rId23"/>
+    <p:sldId id="269" r:id="rId24"/>
   </p:sldIdLst>
   <p:sldSz cx="12192000" cy="6858000"/>
   <p:notesSz cx="6858000" cy="9144000"/>
@@ -217,7 +222,7 @@
           <a:p>
             <a:fld id="{312E7B4A-039C-48A2-9B2C-AF16AA3873D8}" type="datetimeFigureOut">
               <a:rPr lang="en-US" smtClean="0"/>
-              <a:t>12/21/2014</a:t>
+              <a:t>1/7/2015</a:t>
             </a:fld>
             <a:endParaRPr lang="en-US"/>
           </a:p>
@@ -382,7 +387,7 @@
           <a:p>
             <a:fld id="{DA005A0C-54D9-45AA-87D4-C551D08DFCE1}" type="datetimeFigureOut">
               <a:rPr lang="en-US" smtClean="0"/>
-              <a:t>12/21/2014</a:t>
+              <a:t>1/7/2015</a:t>
             </a:fld>
             <a:endParaRPr lang="en-US"/>
           </a:p>
@@ -1346,7 +1351,7 @@
           <a:p>
             <a:fld id="{4CFD207A-07DF-40AD-A916-9872E089CE7A}" type="slidenum">
               <a:rPr lang="en-US" smtClean="0"/>
-              <a:t>13</a:t>
+              <a:t>17</a:t>
             </a:fld>
             <a:endParaRPr lang="en-US"/>
           </a:p>
@@ -1430,7 +1435,7 @@
           <a:p>
             <a:fld id="{4CFD207A-07DF-40AD-A916-9872E089CE7A}" type="slidenum">
               <a:rPr lang="en-US" smtClean="0"/>
-              <a:t>14</a:t>
+              <a:t>19</a:t>
             </a:fld>
             <a:endParaRPr lang="en-US"/>
           </a:p>
@@ -4322,7 +4327,7 @@
           <a:p>
             <a:r>
               <a:rPr lang="en-US" dirty="0" smtClean="0"/>
-              <a:t>But what is Web API design?</a:t>
+              <a:t>ASP.NET Web API</a:t>
             </a:r>
             <a:endParaRPr lang="en-US" dirty="0"/>
           </a:p>
@@ -4345,2364 +4350,6 @@
           <a:p>
             <a:r>
               <a:rPr lang="en-US" dirty="0" smtClean="0"/>
-              <a:t>An intentional approach to building APIs </a:t>
-            </a:r>
-          </a:p>
-          <a:p>
-            <a:r>
-              <a:rPr lang="en-US" dirty="0" smtClean="0"/>
-              <a:t>A “must have” if your APIs will be consumed by third-party services</a:t>
-            </a:r>
-          </a:p>
-          <a:p>
-            <a:r>
-              <a:rPr lang="en-US" dirty="0" smtClean="0"/>
-              <a:t>Attention to details:</a:t>
-            </a:r>
-          </a:p>
-          <a:p>
-            <a:pPr lvl="1"/>
-            <a:r>
-              <a:rPr lang="en-US" dirty="0" smtClean="0"/>
-              <a:t>How consumable is the API (signature, content negotiation)?</a:t>
-            </a:r>
-          </a:p>
-          <a:p>
-            <a:pPr lvl="1"/>
-            <a:r>
-              <a:rPr lang="en-US" dirty="0" smtClean="0"/>
-              <a:t>Does it comply with standards (response codes, etc.)?</a:t>
-            </a:r>
-          </a:p>
-          <a:p>
-            <a:pPr lvl="1"/>
-            <a:r>
-              <a:rPr lang="en-US" dirty="0" smtClean="0"/>
-              <a:t>Is it secure? </a:t>
-            </a:r>
-          </a:p>
-          <a:p>
-            <a:pPr lvl="1"/>
-            <a:r>
-              <a:rPr lang="en-US" dirty="0" smtClean="0"/>
-              <a:t>How do you handle multiple versions? </a:t>
-            </a:r>
-          </a:p>
-          <a:p>
-            <a:pPr lvl="1"/>
-            <a:r>
-              <a:rPr lang="en-US" dirty="0" smtClean="0"/>
-              <a:t>Is it truly RESTful?</a:t>
-            </a:r>
-          </a:p>
-        </p:txBody>
-      </p:sp>
-      <p:sp>
-        <p:nvSpPr>
-          <p:cNvPr id="4" name="TextBox 3"/>
-          <p:cNvSpPr txBox="1"/>
-          <p:nvPr/>
-        </p:nvSpPr>
-        <p:spPr>
-          <a:xfrm>
-            <a:off x="9906000" y="-1"/>
-            <a:ext cx="2286000" cy="2031325"/>
-          </a:xfrm>
-          <a:prstGeom prst="rect">
-            <a:avLst/>
-          </a:prstGeom>
-          <a:solidFill>
-            <a:srgbClr val="FFFF00"/>
-          </a:solidFill>
-          <a:ln>
-            <a:noFill/>
-          </a:ln>
-        </p:spPr>
-        <p:txBody>
-          <a:bodyPr wrap="square" rtlCol="0">
-            <a:spAutoFit/>
-          </a:bodyPr>
-          <a:lstStyle/>
-          <a:p>
-            <a:pPr algn="ctr"/>
-            <a:endParaRPr lang="en-US" dirty="0" smtClean="0"/>
-          </a:p>
-          <a:p>
-            <a:pPr algn="ctr"/>
-            <a:endParaRPr lang="en-US" dirty="0"/>
-          </a:p>
-          <a:p>
-            <a:pPr algn="ctr"/>
-            <a:r>
-              <a:rPr lang="en-US" dirty="0" smtClean="0"/>
-              <a:t>Please leave this area blank to allow for picture in picture recording</a:t>
-            </a:r>
-          </a:p>
-          <a:p>
-            <a:pPr algn="ctr"/>
-            <a:endParaRPr lang="en-US" dirty="0"/>
-          </a:p>
-        </p:txBody>
-      </p:sp>
-    </p:spTree>
-    <p:extLst>
-      <p:ext uri="{BB962C8B-B14F-4D97-AF65-F5344CB8AC3E}">
-        <p14:creationId xmlns:p14="http://schemas.microsoft.com/office/powerpoint/2010/main" val="2047590724"/>
-      </p:ext>
-    </p:extLst>
-  </p:cSld>
-  <p:clrMapOvr>
-    <a:masterClrMapping/>
-  </p:clrMapOvr>
-  <p:timing>
-    <p:tnLst>
-      <p:par>
-        <p:cTn id="1" dur="indefinite" restart="never" nodeType="tmRoot"/>
-      </p:par>
-    </p:tnLst>
-  </p:timing>
-</p:sld>
-</file>
-
-<file path=ppt/slides/slide11.xml><?xml version="1.0" encoding="utf-8"?>
-<p:sld xmlns:a="http://schemas.openxmlformats.org/drawingml/2006/main" xmlns:r="http://schemas.openxmlformats.org/officeDocument/2006/relationships" xmlns:p="http://schemas.openxmlformats.org/presentationml/2006/main">
-  <p:cSld>
-    <p:spTree>
-      <p:nvGrpSpPr>
-        <p:cNvPr id="1" name=""/>
-        <p:cNvGrpSpPr/>
-        <p:nvPr/>
-      </p:nvGrpSpPr>
-      <p:grpSpPr>
-        <a:xfrm>
-          <a:off x="0" y="0"/>
-          <a:ext cx="0" cy="0"/>
-          <a:chOff x="0" y="0"/>
-          <a:chExt cx="0" cy="0"/>
-        </a:xfrm>
-      </p:grpSpPr>
-      <p:sp>
-        <p:nvSpPr>
-          <p:cNvPr id="2" name="Title 1"/>
-          <p:cNvSpPr>
-            <a:spLocks noGrp="1"/>
-          </p:cNvSpPr>
-          <p:nvPr>
-            <p:ph type="title"/>
-          </p:nvPr>
-        </p:nvSpPr>
-        <p:spPr/>
-        <p:txBody>
-          <a:bodyPr/>
-          <a:lstStyle/>
-          <a:p>
-            <a:r>
-              <a:rPr lang="en-US" b="1" dirty="0" smtClean="0">
-                <a:solidFill>
-                  <a:srgbClr val="FF0000"/>
-                </a:solidFill>
-              </a:rPr>
-              <a:t>Re</a:t>
-            </a:r>
-            <a:r>
-              <a:rPr lang="en-US" dirty="0" smtClean="0"/>
-              <a:t>presentational </a:t>
-            </a:r>
-            <a:r>
-              <a:rPr lang="en-US" b="1" dirty="0" smtClean="0">
-                <a:solidFill>
-                  <a:srgbClr val="FF0000"/>
-                </a:solidFill>
-              </a:rPr>
-              <a:t>S</a:t>
-            </a:r>
-            <a:r>
-              <a:rPr lang="en-US" dirty="0" smtClean="0"/>
-              <a:t>tate </a:t>
-            </a:r>
-            <a:r>
-              <a:rPr lang="en-US" b="1" dirty="0" smtClean="0">
-                <a:solidFill>
-                  <a:srgbClr val="FF0000"/>
-                </a:solidFill>
-              </a:rPr>
-              <a:t>T</a:t>
-            </a:r>
-            <a:r>
-              <a:rPr lang="en-US" dirty="0" smtClean="0"/>
-              <a:t>ransfer (REST) </a:t>
-            </a:r>
-            <a:endParaRPr lang="en-US" dirty="0"/>
-          </a:p>
-        </p:txBody>
-      </p:sp>
-      <p:sp>
-        <p:nvSpPr>
-          <p:cNvPr id="3" name="Content Placeholder 2"/>
-          <p:cNvSpPr>
-            <a:spLocks noGrp="1"/>
-          </p:cNvSpPr>
-          <p:nvPr>
-            <p:ph sz="quarter" idx="10"/>
-          </p:nvPr>
-        </p:nvSpPr>
-        <p:spPr/>
-        <p:txBody>
-          <a:bodyPr/>
-          <a:lstStyle/>
-          <a:p>
-            <a:r>
-              <a:rPr lang="en-US" dirty="0" smtClean="0"/>
-              <a:t>Client-server </a:t>
-            </a:r>
-          </a:p>
-          <a:p>
-            <a:r>
-              <a:rPr lang="en-US" dirty="0" smtClean="0"/>
-              <a:t>Stateless </a:t>
-            </a:r>
-          </a:p>
-          <a:p>
-            <a:r>
-              <a:rPr lang="en-US" dirty="0" smtClean="0"/>
-              <a:t>Resource-based (vs. remote </a:t>
-            </a:r>
-            <a:r>
-              <a:rPr lang="en-US" i="1" dirty="0" smtClean="0"/>
-              <a:t>procedure call</a:t>
-            </a:r>
-            <a:r>
-              <a:rPr lang="en-US" dirty="0" smtClean="0"/>
-              <a:t>) </a:t>
-            </a:r>
-          </a:p>
-          <a:p>
-            <a:r>
-              <a:rPr lang="en-US" dirty="0" smtClean="0"/>
-              <a:t>HTTP methods (GET, POST, PUT, DELETE) </a:t>
-            </a:r>
-          </a:p>
-          <a:p>
-            <a:r>
-              <a:rPr lang="en-US" dirty="0" err="1" smtClean="0"/>
-              <a:t>Indempotency</a:t>
-            </a:r>
-            <a:r>
-              <a:rPr lang="en-US" dirty="0" smtClean="0"/>
-              <a:t> and side effects</a:t>
-            </a:r>
-          </a:p>
-          <a:p>
-            <a:r>
-              <a:rPr lang="en-US" dirty="0" smtClean="0"/>
-              <a:t>It’s a style, not a standard</a:t>
-            </a:r>
-          </a:p>
-          <a:p>
-            <a:r>
-              <a:rPr lang="en-US" dirty="0" smtClean="0"/>
-              <a:t>Don’t hate on HATEOAS</a:t>
-            </a:r>
-          </a:p>
-        </p:txBody>
-      </p:sp>
-      <p:sp>
-        <p:nvSpPr>
-          <p:cNvPr id="4" name="TextBox 3"/>
-          <p:cNvSpPr txBox="1"/>
-          <p:nvPr/>
-        </p:nvSpPr>
-        <p:spPr>
-          <a:xfrm>
-            <a:off x="9906000" y="-1"/>
-            <a:ext cx="2286000" cy="2031325"/>
-          </a:xfrm>
-          <a:prstGeom prst="rect">
-            <a:avLst/>
-          </a:prstGeom>
-          <a:solidFill>
-            <a:srgbClr val="FFFF00"/>
-          </a:solidFill>
-          <a:ln>
-            <a:noFill/>
-          </a:ln>
-        </p:spPr>
-        <p:txBody>
-          <a:bodyPr wrap="square" rtlCol="0">
-            <a:spAutoFit/>
-          </a:bodyPr>
-          <a:lstStyle/>
-          <a:p>
-            <a:pPr algn="ctr"/>
-            <a:endParaRPr lang="en-US" dirty="0" smtClean="0"/>
-          </a:p>
-          <a:p>
-            <a:pPr algn="ctr"/>
-            <a:endParaRPr lang="en-US" dirty="0"/>
-          </a:p>
-          <a:p>
-            <a:pPr algn="ctr"/>
-            <a:r>
-              <a:rPr lang="en-US" dirty="0" smtClean="0"/>
-              <a:t>Please leave this area blank to allow for picture in picture recording</a:t>
-            </a:r>
-          </a:p>
-          <a:p>
-            <a:pPr algn="ctr"/>
-            <a:endParaRPr lang="en-US" dirty="0"/>
-          </a:p>
-        </p:txBody>
-      </p:sp>
-    </p:spTree>
-    <p:extLst>
-      <p:ext uri="{BB962C8B-B14F-4D97-AF65-F5344CB8AC3E}">
-        <p14:creationId xmlns:p14="http://schemas.microsoft.com/office/powerpoint/2010/main" val="867290118"/>
-      </p:ext>
-    </p:extLst>
-  </p:cSld>
-  <p:clrMapOvr>
-    <a:masterClrMapping/>
-  </p:clrMapOvr>
-  <p:timing>
-    <p:tnLst>
-      <p:par>
-        <p:cTn id="1" dur="indefinite" restart="never" nodeType="tmRoot"/>
-      </p:par>
-    </p:tnLst>
-  </p:timing>
-</p:sld>
-</file>
-
-<file path=ppt/slides/slide12.xml><?xml version="1.0" encoding="utf-8"?>
-<p:sld xmlns:a="http://schemas.openxmlformats.org/drawingml/2006/main" xmlns:r="http://schemas.openxmlformats.org/officeDocument/2006/relationships" xmlns:p="http://schemas.openxmlformats.org/presentationml/2006/main">
-  <p:cSld>
-    <p:spTree>
-      <p:nvGrpSpPr>
-        <p:cNvPr id="1" name=""/>
-        <p:cNvGrpSpPr/>
-        <p:nvPr/>
-      </p:nvGrpSpPr>
-      <p:grpSpPr>
-        <a:xfrm>
-          <a:off x="0" y="0"/>
-          <a:ext cx="0" cy="0"/>
-          <a:chOff x="0" y="0"/>
-          <a:chExt cx="0" cy="0"/>
-        </a:xfrm>
-      </p:grpSpPr>
-      <p:sp>
-        <p:nvSpPr>
-          <p:cNvPr id="2" name="Title 1"/>
-          <p:cNvSpPr>
-            <a:spLocks noGrp="1"/>
-          </p:cNvSpPr>
-          <p:nvPr>
-            <p:ph type="title"/>
-          </p:nvPr>
-        </p:nvSpPr>
-        <p:spPr>
-          <a:xfrm>
-            <a:off x="379514" y="182215"/>
-            <a:ext cx="9452643" cy="1288366"/>
-          </a:xfrm>
-        </p:spPr>
-        <p:txBody>
-          <a:bodyPr/>
-          <a:lstStyle/>
-          <a:p>
-            <a:r>
-              <a:rPr lang="en-US" b="1" dirty="0" smtClean="0">
-                <a:solidFill>
-                  <a:srgbClr val="FF0000"/>
-                </a:solidFill>
-              </a:rPr>
-              <a:t>H</a:t>
-            </a:r>
-            <a:r>
-              <a:rPr lang="en-US" b="1" dirty="0" smtClean="0"/>
-              <a:t>ypermedia </a:t>
-            </a:r>
-            <a:r>
-              <a:rPr lang="en-US" b="1" dirty="0" smtClean="0">
-                <a:solidFill>
-                  <a:srgbClr val="FF0000"/>
-                </a:solidFill>
-              </a:rPr>
-              <a:t>a</a:t>
-            </a:r>
-            <a:r>
-              <a:rPr lang="en-US" b="1" dirty="0" smtClean="0"/>
-              <a:t>s </a:t>
-            </a:r>
-            <a:r>
-              <a:rPr lang="en-US" b="1" dirty="0" smtClean="0">
-                <a:solidFill>
-                  <a:srgbClr val="FF0000"/>
-                </a:solidFill>
-              </a:rPr>
-              <a:t>t</a:t>
-            </a:r>
-            <a:r>
-              <a:rPr lang="en-US" b="1" dirty="0" smtClean="0"/>
-              <a:t>he </a:t>
-            </a:r>
-            <a:r>
-              <a:rPr lang="en-US" b="1" dirty="0" smtClean="0">
-                <a:solidFill>
-                  <a:srgbClr val="FF0000"/>
-                </a:solidFill>
-              </a:rPr>
-              <a:t>E</a:t>
-            </a:r>
-            <a:r>
-              <a:rPr lang="en-US" b="1" dirty="0" smtClean="0"/>
-              <a:t>ngine </a:t>
-            </a:r>
-            <a:r>
-              <a:rPr lang="en-US" b="1" dirty="0" smtClean="0">
-                <a:solidFill>
-                  <a:srgbClr val="FF0000"/>
-                </a:solidFill>
-              </a:rPr>
-              <a:t>o</a:t>
-            </a:r>
-            <a:r>
-              <a:rPr lang="en-US" b="1" dirty="0" smtClean="0"/>
-              <a:t>f </a:t>
-            </a:r>
-            <a:r>
-              <a:rPr lang="en-US" b="1" dirty="0" smtClean="0">
-                <a:solidFill>
-                  <a:srgbClr val="FF0000"/>
-                </a:solidFill>
-              </a:rPr>
-              <a:t>A</a:t>
-            </a:r>
-            <a:r>
-              <a:rPr lang="en-US" b="1" dirty="0" smtClean="0"/>
-              <a:t>pplication </a:t>
-            </a:r>
-            <a:r>
-              <a:rPr lang="en-US" b="1" dirty="0" smtClean="0">
-                <a:solidFill>
-                  <a:srgbClr val="FF0000"/>
-                </a:solidFill>
-              </a:rPr>
-              <a:t>S</a:t>
-            </a:r>
-            <a:r>
-              <a:rPr lang="en-US" b="1" dirty="0" smtClean="0"/>
-              <a:t>tate</a:t>
-            </a:r>
-            <a:r>
-              <a:rPr lang="en-US" dirty="0" smtClean="0"/>
-              <a:t> (HATEOAS)</a:t>
-            </a:r>
-            <a:endParaRPr lang="en-US" dirty="0"/>
-          </a:p>
-        </p:txBody>
-      </p:sp>
-      <p:sp>
-        <p:nvSpPr>
-          <p:cNvPr id="3" name="Content Placeholder 2"/>
-          <p:cNvSpPr>
-            <a:spLocks noGrp="1"/>
-          </p:cNvSpPr>
-          <p:nvPr>
-            <p:ph sz="quarter" idx="10"/>
-          </p:nvPr>
-        </p:nvSpPr>
-        <p:spPr/>
-        <p:txBody>
-          <a:bodyPr/>
-          <a:lstStyle/>
-          <a:p>
-            <a:r>
-              <a:rPr lang="en-US" dirty="0" smtClean="0"/>
-              <a:t>Hypermedia is the key</a:t>
-            </a:r>
-          </a:p>
-          <a:p>
-            <a:r>
-              <a:rPr lang="en-US" dirty="0" smtClean="0"/>
-              <a:t>It all starts at a URL</a:t>
-            </a:r>
-          </a:p>
-          <a:p>
-            <a:r>
-              <a:rPr lang="en-US" dirty="0" smtClean="0"/>
-              <a:t>Resources are returned </a:t>
-            </a:r>
-          </a:p>
-          <a:p>
-            <a:r>
-              <a:rPr lang="en-US" dirty="0" smtClean="0"/>
-              <a:t>Media types and locations are included</a:t>
-            </a:r>
-          </a:p>
-          <a:p>
-            <a:r>
-              <a:rPr lang="en-US" dirty="0" smtClean="0"/>
-              <a:t>References based on state </a:t>
-            </a:r>
-          </a:p>
-        </p:txBody>
-      </p:sp>
-      <p:sp>
-        <p:nvSpPr>
-          <p:cNvPr id="4" name="TextBox 3"/>
-          <p:cNvSpPr txBox="1"/>
-          <p:nvPr/>
-        </p:nvSpPr>
-        <p:spPr>
-          <a:xfrm>
-            <a:off x="9906000" y="-1"/>
-            <a:ext cx="2286000" cy="2031325"/>
-          </a:xfrm>
-          <a:prstGeom prst="rect">
-            <a:avLst/>
-          </a:prstGeom>
-          <a:solidFill>
-            <a:srgbClr val="FFFF00"/>
-          </a:solidFill>
-          <a:ln>
-            <a:noFill/>
-          </a:ln>
-        </p:spPr>
-        <p:txBody>
-          <a:bodyPr wrap="square" rtlCol="0">
-            <a:spAutoFit/>
-          </a:bodyPr>
-          <a:lstStyle/>
-          <a:p>
-            <a:pPr algn="ctr"/>
-            <a:endParaRPr lang="en-US" dirty="0" smtClean="0"/>
-          </a:p>
-          <a:p>
-            <a:pPr algn="ctr"/>
-            <a:endParaRPr lang="en-US" dirty="0"/>
-          </a:p>
-          <a:p>
-            <a:pPr algn="ctr"/>
-            <a:r>
-              <a:rPr lang="en-US" dirty="0" smtClean="0"/>
-              <a:t>Please leave this area blank to allow for picture in picture recording</a:t>
-            </a:r>
-          </a:p>
-          <a:p>
-            <a:pPr algn="ctr"/>
-            <a:endParaRPr lang="en-US" dirty="0"/>
-          </a:p>
-        </p:txBody>
-      </p:sp>
-    </p:spTree>
-    <p:extLst>
-      <p:ext uri="{BB962C8B-B14F-4D97-AF65-F5344CB8AC3E}">
-        <p14:creationId xmlns:p14="http://schemas.microsoft.com/office/powerpoint/2010/main" val="920491971"/>
-      </p:ext>
-    </p:extLst>
-  </p:cSld>
-  <p:clrMapOvr>
-    <a:masterClrMapping/>
-  </p:clrMapOvr>
-  <p:timing>
-    <p:tnLst>
-      <p:par>
-        <p:cTn id="1" dur="indefinite" restart="never" nodeType="tmRoot"/>
-      </p:par>
-    </p:tnLst>
-  </p:timing>
-</p:sld>
-</file>
-
-<file path=ppt/slides/slide13.xml><?xml version="1.0" encoding="utf-8"?>
-<p:sld xmlns:a="http://schemas.openxmlformats.org/drawingml/2006/main" xmlns:r="http://schemas.openxmlformats.org/officeDocument/2006/relationships" xmlns:p="http://schemas.openxmlformats.org/presentationml/2006/main">
-  <p:cSld>
-    <p:spTree>
-      <p:nvGrpSpPr>
-        <p:cNvPr id="1" name=""/>
-        <p:cNvGrpSpPr/>
-        <p:nvPr/>
-      </p:nvGrpSpPr>
-      <p:grpSpPr>
-        <a:xfrm>
-          <a:off x="0" y="0"/>
-          <a:ext cx="0" cy="0"/>
-          <a:chOff x="0" y="0"/>
-          <a:chExt cx="0" cy="0"/>
-        </a:xfrm>
-      </p:grpSpPr>
-      <p:sp>
-        <p:nvSpPr>
-          <p:cNvPr id="2" name="Title 1"/>
-          <p:cNvSpPr>
-            <a:spLocks noGrp="1"/>
-          </p:cNvSpPr>
-          <p:nvPr>
-            <p:ph type="title"/>
-          </p:nvPr>
-        </p:nvSpPr>
-        <p:spPr/>
-        <p:txBody>
-          <a:bodyPr/>
-          <a:lstStyle/>
-          <a:p>
-            <a:r>
-              <a:rPr lang="en-US" b="1" dirty="0" smtClean="0"/>
-              <a:t>REST and HATEOAS in Action</a:t>
-            </a:r>
-            <a:endParaRPr lang="en-US" dirty="0"/>
-          </a:p>
-        </p:txBody>
-      </p:sp>
-      <p:sp>
-        <p:nvSpPr>
-          <p:cNvPr id="4" name="TextBox 3"/>
-          <p:cNvSpPr txBox="1"/>
-          <p:nvPr/>
-        </p:nvSpPr>
-        <p:spPr>
-          <a:xfrm>
-            <a:off x="9906000" y="-1"/>
-            <a:ext cx="2286000" cy="2031325"/>
-          </a:xfrm>
-          <a:prstGeom prst="rect">
-            <a:avLst/>
-          </a:prstGeom>
-          <a:solidFill>
-            <a:srgbClr val="FFFF00"/>
-          </a:solidFill>
-          <a:ln>
-            <a:noFill/>
-          </a:ln>
-        </p:spPr>
-        <p:txBody>
-          <a:bodyPr wrap="square" rtlCol="0">
-            <a:spAutoFit/>
-          </a:bodyPr>
-          <a:lstStyle/>
-          <a:p>
-            <a:pPr algn="ctr"/>
-            <a:endParaRPr lang="en-US" dirty="0" smtClean="0"/>
-          </a:p>
-          <a:p>
-            <a:pPr algn="ctr"/>
-            <a:endParaRPr lang="en-US" dirty="0"/>
-          </a:p>
-          <a:p>
-            <a:pPr algn="ctr"/>
-            <a:r>
-              <a:rPr lang="en-US" dirty="0" smtClean="0"/>
-              <a:t>Please leave this area blank to allow for picture in picture recording</a:t>
-            </a:r>
-          </a:p>
-          <a:p>
-            <a:pPr algn="ctr"/>
-            <a:endParaRPr lang="en-US" dirty="0"/>
-          </a:p>
-        </p:txBody>
-      </p:sp>
-    </p:spTree>
-    <p:extLst>
-      <p:ext uri="{BB962C8B-B14F-4D97-AF65-F5344CB8AC3E}">
-        <p14:creationId xmlns:p14="http://schemas.microsoft.com/office/powerpoint/2010/main" val="2016122624"/>
-      </p:ext>
-    </p:extLst>
-  </p:cSld>
-  <p:clrMapOvr>
-    <a:masterClrMapping/>
-  </p:clrMapOvr>
-  <p:timing>
-    <p:tnLst>
-      <p:par>
-        <p:cTn id="1" dur="indefinite" restart="never" nodeType="tmRoot"/>
-      </p:par>
-    </p:tnLst>
-  </p:timing>
-</p:sld>
-</file>
-
-<file path=ppt/slides/slide14.xml><?xml version="1.0" encoding="utf-8"?>
-<p:sld xmlns:a="http://schemas.openxmlformats.org/drawingml/2006/main" xmlns:r="http://schemas.openxmlformats.org/officeDocument/2006/relationships" xmlns:p="http://schemas.openxmlformats.org/presentationml/2006/main">
-  <p:cSld>
-    <p:spTree>
-      <p:nvGrpSpPr>
-        <p:cNvPr id="1" name=""/>
-        <p:cNvGrpSpPr/>
-        <p:nvPr/>
-      </p:nvGrpSpPr>
-      <p:grpSpPr>
-        <a:xfrm>
-          <a:off x="0" y="0"/>
-          <a:ext cx="0" cy="0"/>
-          <a:chOff x="0" y="0"/>
-          <a:chExt cx="0" cy="0"/>
-        </a:xfrm>
-      </p:grpSpPr>
-      <p:sp>
-        <p:nvSpPr>
-          <p:cNvPr id="2" name="Title 1"/>
-          <p:cNvSpPr>
-            <a:spLocks noGrp="1"/>
-          </p:cNvSpPr>
-          <p:nvPr>
-            <p:ph type="title"/>
-          </p:nvPr>
-        </p:nvSpPr>
-        <p:spPr/>
-        <p:txBody>
-          <a:bodyPr/>
-          <a:lstStyle/>
-          <a:p>
-            <a:r>
-              <a:rPr lang="en-US" b="1" dirty="0" smtClean="0"/>
-              <a:t>Scaffolding</a:t>
-            </a:r>
-            <a:endParaRPr lang="en-US" dirty="0"/>
-          </a:p>
-        </p:txBody>
-      </p:sp>
-      <p:sp>
-        <p:nvSpPr>
-          <p:cNvPr id="4" name="TextBox 3"/>
-          <p:cNvSpPr txBox="1"/>
-          <p:nvPr/>
-        </p:nvSpPr>
-        <p:spPr>
-          <a:xfrm>
-            <a:off x="9906000" y="-1"/>
-            <a:ext cx="2286000" cy="2031325"/>
-          </a:xfrm>
-          <a:prstGeom prst="rect">
-            <a:avLst/>
-          </a:prstGeom>
-          <a:solidFill>
-            <a:srgbClr val="FFFF00"/>
-          </a:solidFill>
-          <a:ln>
-            <a:noFill/>
-          </a:ln>
-        </p:spPr>
-        <p:txBody>
-          <a:bodyPr wrap="square" rtlCol="0">
-            <a:spAutoFit/>
-          </a:bodyPr>
-          <a:lstStyle/>
-          <a:p>
-            <a:pPr algn="ctr"/>
-            <a:endParaRPr lang="en-US" dirty="0" smtClean="0"/>
-          </a:p>
-          <a:p>
-            <a:pPr algn="ctr"/>
-            <a:endParaRPr lang="en-US" dirty="0"/>
-          </a:p>
-          <a:p>
-            <a:pPr algn="ctr"/>
-            <a:r>
-              <a:rPr lang="en-US" dirty="0" smtClean="0"/>
-              <a:t>Please leave this area blank to allow for picture in picture recording</a:t>
-            </a:r>
-          </a:p>
-          <a:p>
-            <a:pPr algn="ctr"/>
-            <a:endParaRPr lang="en-US" dirty="0"/>
-          </a:p>
-        </p:txBody>
-      </p:sp>
-    </p:spTree>
-    <p:extLst>
-      <p:ext uri="{BB962C8B-B14F-4D97-AF65-F5344CB8AC3E}">
-        <p14:creationId xmlns:p14="http://schemas.microsoft.com/office/powerpoint/2010/main" val="2477759453"/>
-      </p:ext>
-    </p:extLst>
-  </p:cSld>
-  <p:clrMapOvr>
-    <a:masterClrMapping/>
-  </p:clrMapOvr>
-  <p:timing>
-    <p:tnLst>
-      <p:par>
-        <p:cTn id="1" dur="indefinite" restart="never" nodeType="tmRoot"/>
-      </p:par>
-    </p:tnLst>
-  </p:timing>
-</p:sld>
-</file>
-
-<file path=ppt/slides/slide15.xml><?xml version="1.0" encoding="utf-8"?>
-<p:sld xmlns:a="http://schemas.openxmlformats.org/drawingml/2006/main" xmlns:r="http://schemas.openxmlformats.org/officeDocument/2006/relationships" xmlns:p="http://schemas.openxmlformats.org/presentationml/2006/main">
-  <p:cSld>
-    <p:spTree>
-      <p:nvGrpSpPr>
-        <p:cNvPr id="1" name=""/>
-        <p:cNvGrpSpPr/>
-        <p:nvPr/>
-      </p:nvGrpSpPr>
-      <p:grpSpPr>
-        <a:xfrm>
-          <a:off x="0" y="0"/>
-          <a:ext cx="0" cy="0"/>
-          <a:chOff x="0" y="0"/>
-          <a:chExt cx="0" cy="0"/>
-        </a:xfrm>
-      </p:grpSpPr>
-    </p:spTree>
-    <p:extLst>
-      <p:ext uri="{BB962C8B-B14F-4D97-AF65-F5344CB8AC3E}">
-        <p14:creationId xmlns:p14="http://schemas.microsoft.com/office/powerpoint/2010/main" val="898363405"/>
-      </p:ext>
-    </p:extLst>
-  </p:cSld>
-  <p:clrMapOvr>
-    <a:masterClrMapping/>
-  </p:clrMapOvr>
-  <p:timing>
-    <p:tnLst>
-      <p:par>
-        <p:cTn id="1" dur="indefinite" restart="never" nodeType="tmRoot"/>
-      </p:par>
-    </p:tnLst>
-  </p:timing>
-</p:sld>
-</file>
-
-<file path=ppt/slides/slide2.xml><?xml version="1.0" encoding="utf-8"?>
-<p:sld xmlns:a="http://schemas.openxmlformats.org/drawingml/2006/main" xmlns:r="http://schemas.openxmlformats.org/officeDocument/2006/relationships" xmlns:p="http://schemas.openxmlformats.org/presentationml/2006/main">
-  <p:cSld>
-    <p:spTree>
-      <p:nvGrpSpPr>
-        <p:cNvPr id="1" name=""/>
-        <p:cNvGrpSpPr/>
-        <p:nvPr/>
-      </p:nvGrpSpPr>
-      <p:grpSpPr>
-        <a:xfrm>
-          <a:off x="0" y="0"/>
-          <a:ext cx="0" cy="0"/>
-          <a:chOff x="0" y="0"/>
-          <a:chExt cx="0" cy="0"/>
-        </a:xfrm>
-      </p:grpSpPr>
-      <p:sp>
-        <p:nvSpPr>
-          <p:cNvPr id="2" name="Title 1"/>
-          <p:cNvSpPr>
-            <a:spLocks noGrp="1"/>
-          </p:cNvSpPr>
-          <p:nvPr>
-            <p:ph type="title"/>
-          </p:nvPr>
-        </p:nvSpPr>
-        <p:spPr/>
-        <p:txBody>
-          <a:bodyPr/>
-          <a:lstStyle/>
-          <a:p>
-            <a:r>
-              <a:rPr lang="en-US" dirty="0" smtClean="0"/>
-              <a:t>Meet Jeremy Likness | ‏@</a:t>
-            </a:r>
-            <a:r>
-              <a:rPr lang="en-US" dirty="0" err="1" smtClean="0"/>
-              <a:t>jeremylikness</a:t>
-            </a:r>
-            <a:r>
-              <a:rPr lang="en-US" dirty="0" smtClean="0"/>
-              <a:t> </a:t>
-            </a:r>
-            <a:endParaRPr lang="en-US" dirty="0"/>
-          </a:p>
-        </p:txBody>
-      </p:sp>
-      <p:sp>
-        <p:nvSpPr>
-          <p:cNvPr id="7" name="Content Placeholder 6"/>
-          <p:cNvSpPr>
-            <a:spLocks noGrp="1"/>
-          </p:cNvSpPr>
-          <p:nvPr>
-            <p:ph idx="10"/>
-          </p:nvPr>
-        </p:nvSpPr>
-        <p:spPr/>
-        <p:txBody>
-          <a:bodyPr/>
-          <a:lstStyle/>
-          <a:p>
-            <a:r>
-              <a:rPr lang="en-US" dirty="0" smtClean="0"/>
-              <a:t>Principal Architect at iVision</a:t>
-            </a:r>
-          </a:p>
-          <a:p>
-            <a:pPr lvl="1"/>
-            <a:r>
-              <a:rPr lang="en-US" dirty="0" smtClean="0"/>
-              <a:t>Focused on Microsoft stack Enterprise Applications</a:t>
-            </a:r>
-          </a:p>
-          <a:p>
-            <a:pPr lvl="1"/>
-            <a:r>
-              <a:rPr lang="en-US" dirty="0" smtClean="0">
-                <a:hlinkClick r:id="rId3"/>
-              </a:rPr>
-              <a:t>http://csharperimage.jeremylikness.com/</a:t>
-            </a:r>
-            <a:r>
-              <a:rPr lang="en-US" dirty="0" smtClean="0"/>
-              <a:t> </a:t>
-            </a:r>
-          </a:p>
-          <a:p>
-            <a:pPr lvl="1"/>
-            <a:r>
-              <a:rPr lang="en-US" dirty="0" smtClean="0"/>
-              <a:t>Former Certified Fitness Trainer and Specialist in Performance Nutrition   </a:t>
-            </a:r>
-          </a:p>
-          <a:p>
-            <a:r>
-              <a:rPr lang="en-US" dirty="0" smtClean="0"/>
-              <a:t>Over 20 Years of Professional Experience </a:t>
-            </a:r>
-          </a:p>
-          <a:p>
-            <a:pPr lvl="1"/>
-            <a:r>
-              <a:rPr lang="en-US" dirty="0" smtClean="0"/>
-              <a:t>4-time Author incl. Programming the Windows Runtime by Example</a:t>
-            </a:r>
-          </a:p>
-          <a:p>
-            <a:pPr lvl="1"/>
-            <a:r>
-              <a:rPr lang="en-US" dirty="0" smtClean="0"/>
-              <a:t>Prolific speaker at conferences including </a:t>
-            </a:r>
-            <a:r>
-              <a:rPr lang="en-US" dirty="0" err="1" smtClean="0"/>
-              <a:t>DevLink</a:t>
-            </a:r>
-            <a:r>
-              <a:rPr lang="en-US" dirty="0" smtClean="0"/>
-              <a:t>, CodeStock, and the Microsoft Worldwide Partner Conference </a:t>
-            </a:r>
-          </a:p>
-          <a:p>
-            <a:pPr lvl="1"/>
-            <a:r>
-              <a:rPr lang="en-US" dirty="0" smtClean="0"/>
-              <a:t>5 Year Microsoft Most Valuable Professional (MVP)</a:t>
-            </a:r>
-          </a:p>
-          <a:p>
-            <a:pPr lvl="1"/>
-            <a:r>
-              <a:rPr lang="en-US" dirty="0" smtClean="0"/>
-              <a:t>9-Ball player</a:t>
-            </a:r>
-          </a:p>
-        </p:txBody>
-      </p:sp>
-      <p:pic>
-        <p:nvPicPr>
-          <p:cNvPr id="5" name="Picture 4"/>
-          <p:cNvPicPr/>
-          <p:nvPr/>
-        </p:nvPicPr>
-        <p:blipFill>
-          <a:blip r:embed="rId4">
-            <a:extLst>
-              <a:ext uri="{28A0092B-C50C-407E-A947-70E740481C1C}">
-                <a14:useLocalDpi xmlns:a14="http://schemas.microsoft.com/office/drawing/2010/main" val="0"/>
-              </a:ext>
-            </a:extLst>
-          </a:blip>
-          <a:stretch>
-            <a:fillRect/>
-          </a:stretch>
-        </p:blipFill>
-        <p:spPr bwMode="auto">
-          <a:xfrm>
-            <a:off x="9703020" y="202030"/>
-            <a:ext cx="2259281" cy="2259281"/>
-          </a:xfrm>
-          <a:prstGeom prst="rect">
-            <a:avLst/>
-          </a:prstGeom>
-          <a:noFill/>
-          <a:ln>
-            <a:solidFill>
-              <a:schemeClr val="tx1"/>
-            </a:solidFill>
-          </a:ln>
-          <a:effectLst>
-            <a:outerShdw blurRad="50800" dist="38100" dir="2700000" algn="tl" rotWithShape="0">
-              <a:prstClr val="black">
-                <a:alpha val="40000"/>
-              </a:prstClr>
-            </a:outerShdw>
-          </a:effectLst>
-        </p:spPr>
-      </p:pic>
-    </p:spTree>
-    <p:extLst>
-      <p:ext uri="{BB962C8B-B14F-4D97-AF65-F5344CB8AC3E}">
-        <p14:creationId xmlns:p14="http://schemas.microsoft.com/office/powerpoint/2010/main" val="4238450048"/>
-      </p:ext>
-    </p:extLst>
-  </p:cSld>
-  <p:clrMapOvr>
-    <a:masterClrMapping/>
-  </p:clrMapOvr>
-  <mc:AlternateContent xmlns:mc="http://schemas.openxmlformats.org/markup-compatibility/2006" xmlns:p14="http://schemas.microsoft.com/office/powerpoint/2010/main">
-    <mc:Choice Requires="p14">
-      <p:transition spd="slow" p14:dur="2000"/>
-    </mc:Choice>
-    <mc:Fallback xmlns="">
-      <p:transition spd="slow"/>
-    </mc:Fallback>
-  </mc:AlternateContent>
-  <p:timing>
-    <p:tnLst>
-      <p:par>
-        <p:cTn id="1" dur="indefinite" restart="never" nodeType="tmRoot"/>
-      </p:par>
-    </p:tnLst>
-  </p:timing>
-</p:sld>
-</file>
-
-<file path=ppt/slides/slide3.xml><?xml version="1.0" encoding="utf-8"?>
-<p:sld xmlns:a="http://schemas.openxmlformats.org/drawingml/2006/main" xmlns:r="http://schemas.openxmlformats.org/officeDocument/2006/relationships" xmlns:p="http://schemas.openxmlformats.org/presentationml/2006/main">
-  <p:cSld>
-    <p:spTree>
-      <p:nvGrpSpPr>
-        <p:cNvPr id="1" name=""/>
-        <p:cNvGrpSpPr/>
-        <p:nvPr/>
-      </p:nvGrpSpPr>
-      <p:grpSpPr>
-        <a:xfrm>
-          <a:off x="0" y="0"/>
-          <a:ext cx="0" cy="0"/>
-          <a:chOff x="0" y="0"/>
-          <a:chExt cx="0" cy="0"/>
-        </a:xfrm>
-      </p:grpSpPr>
-      <p:sp>
-        <p:nvSpPr>
-          <p:cNvPr id="2" name="Title 1"/>
-          <p:cNvSpPr>
-            <a:spLocks noGrp="1"/>
-          </p:cNvSpPr>
-          <p:nvPr>
-            <p:ph type="title"/>
-          </p:nvPr>
-        </p:nvSpPr>
-        <p:spPr/>
-        <p:txBody>
-          <a:bodyPr/>
-          <a:lstStyle/>
-          <a:p>
-            <a:r>
-              <a:rPr lang="en-US" dirty="0" smtClean="0"/>
-              <a:t>Meet Christopher Harrison | @</a:t>
-            </a:r>
-            <a:r>
-              <a:rPr lang="en-US" dirty="0" err="1" smtClean="0"/>
-              <a:t>geektrainer</a:t>
-            </a:r>
-            <a:endParaRPr lang="en-US" dirty="0"/>
-          </a:p>
-        </p:txBody>
-      </p:sp>
-      <p:sp>
-        <p:nvSpPr>
-          <p:cNvPr id="7" name="Content Placeholder 6"/>
-          <p:cNvSpPr>
-            <a:spLocks noGrp="1"/>
-          </p:cNvSpPr>
-          <p:nvPr>
-            <p:ph idx="10"/>
-          </p:nvPr>
-        </p:nvSpPr>
-        <p:spPr/>
-        <p:txBody>
-          <a:bodyPr/>
-          <a:lstStyle/>
-          <a:p>
-            <a:r>
-              <a:rPr lang="en-US" dirty="0" smtClean="0"/>
-              <a:t>Principal Program Manager, Microsoft</a:t>
-            </a:r>
-          </a:p>
-          <a:p>
-            <a:pPr lvl="1"/>
-            <a:r>
-              <a:rPr lang="en-US" dirty="0" smtClean="0"/>
-              <a:t>Web developer focused on Windows Azure and ASP.NET</a:t>
-            </a:r>
-          </a:p>
-          <a:p>
-            <a:pPr lvl="1"/>
-            <a:r>
-              <a:rPr lang="en-US" dirty="0" smtClean="0"/>
-              <a:t>Blogging at </a:t>
-            </a:r>
-            <a:r>
-              <a:rPr lang="en-US" dirty="0" smtClean="0">
-                <a:hlinkClick r:id="rId3"/>
-              </a:rPr>
-              <a:t>http://hanselman.com</a:t>
-            </a:r>
-            <a:r>
-              <a:rPr lang="en-US" dirty="0" smtClean="0"/>
-              <a:t> for over a decade</a:t>
-            </a:r>
-          </a:p>
-          <a:p>
-            <a:r>
-              <a:rPr lang="en-US" dirty="0" smtClean="0"/>
-              <a:t>One of Microsoft’s Most Respected Developers</a:t>
-            </a:r>
-          </a:p>
-          <a:p>
-            <a:pPr lvl="1"/>
-            <a:r>
-              <a:rPr lang="en-US" dirty="0" smtClean="0"/>
-              <a:t>Written a number of books and spoken in person to almost a half million developers worldwide</a:t>
-            </a:r>
-          </a:p>
-          <a:p>
-            <a:pPr lvl="1"/>
-            <a:r>
-              <a:rPr lang="en-US" dirty="0" smtClean="0">
-                <a:hlinkClick r:id="rId4"/>
-              </a:rPr>
-              <a:t>http://hanselminutes.com</a:t>
-            </a:r>
-            <a:r>
-              <a:rPr lang="en-US" dirty="0" smtClean="0"/>
-              <a:t> for tech talk</a:t>
-            </a:r>
-          </a:p>
-          <a:p>
-            <a:pPr lvl="1"/>
-            <a:r>
-              <a:rPr lang="en-US" dirty="0" smtClean="0">
-                <a:hlinkClick r:id="rId5"/>
-              </a:rPr>
-              <a:t>http://thisdeveloperslife.com</a:t>
-            </a:r>
-            <a:r>
-              <a:rPr lang="en-US" dirty="0" smtClean="0"/>
-              <a:t> on developers’ lives and loves</a:t>
-            </a:r>
-          </a:p>
-          <a:p>
-            <a:pPr lvl="1"/>
-            <a:r>
-              <a:rPr lang="en-US" dirty="0" smtClean="0">
-                <a:hlinkClick r:id="rId6"/>
-              </a:rPr>
-              <a:t>http://ratchetandthegeek.com</a:t>
-            </a:r>
-            <a:r>
-              <a:rPr lang="en-US" dirty="0" smtClean="0"/>
-              <a:t> for pop culture and tech media</a:t>
-            </a:r>
-          </a:p>
-        </p:txBody>
-      </p:sp>
-      <p:pic>
-        <p:nvPicPr>
-          <p:cNvPr id="3" name="Picture 2"/>
-          <p:cNvPicPr>
-            <a:picLocks noChangeAspect="1"/>
-          </p:cNvPicPr>
-          <p:nvPr/>
-        </p:nvPicPr>
-        <p:blipFill>
-          <a:blip r:embed="rId7">
-            <a:extLst>
-              <a:ext uri="{28A0092B-C50C-407E-A947-70E740481C1C}">
-                <a14:useLocalDpi xmlns:a14="http://schemas.microsoft.com/office/drawing/2010/main" val="0"/>
-              </a:ext>
-            </a:extLst>
-          </a:blip>
-          <a:stretch>
-            <a:fillRect/>
-          </a:stretch>
-        </p:blipFill>
-        <p:spPr>
-          <a:xfrm>
-            <a:off x="10217018" y="110280"/>
-            <a:ext cx="1830521" cy="2125767"/>
-          </a:xfrm>
-          <a:prstGeom prst="rect">
-            <a:avLst/>
-          </a:prstGeom>
-          <a:ln>
-            <a:solidFill>
-              <a:schemeClr val="tx1"/>
-            </a:solidFill>
-          </a:ln>
-          <a:effectLst>
-            <a:outerShdw blurRad="50800" dist="38100" dir="2700000" algn="tl" rotWithShape="0">
-              <a:prstClr val="black">
-                <a:alpha val="40000"/>
-              </a:prstClr>
-            </a:outerShdw>
-          </a:effectLst>
-        </p:spPr>
-      </p:pic>
-    </p:spTree>
-    <p:extLst>
-      <p:ext uri="{BB962C8B-B14F-4D97-AF65-F5344CB8AC3E}">
-        <p14:creationId xmlns:p14="http://schemas.microsoft.com/office/powerpoint/2010/main" val="444521906"/>
-      </p:ext>
-    </p:extLst>
-  </p:cSld>
-  <p:clrMapOvr>
-    <a:masterClrMapping/>
-  </p:clrMapOvr>
-  <mc:AlternateContent xmlns:mc="http://schemas.openxmlformats.org/markup-compatibility/2006" xmlns:p14="http://schemas.microsoft.com/office/powerpoint/2010/main">
-    <mc:Choice Requires="p14">
-      <p:transition spd="slow" p14:dur="2000"/>
-    </mc:Choice>
-    <mc:Fallback xmlns="">
-      <p:transition spd="slow"/>
-    </mc:Fallback>
-  </mc:AlternateContent>
-  <p:timing>
-    <p:tnLst>
-      <p:par>
-        <p:cTn id="1" dur="indefinite" restart="never" nodeType="tmRoot"/>
-      </p:par>
-    </p:tnLst>
-  </p:timing>
-</p:sld>
-</file>
-
-<file path=ppt/slides/slide4.xml><?xml version="1.0" encoding="utf-8"?>
-<p:sld xmlns:a="http://schemas.openxmlformats.org/drawingml/2006/main" xmlns:r="http://schemas.openxmlformats.org/officeDocument/2006/relationships" xmlns:p="http://schemas.openxmlformats.org/presentationml/2006/main">
-  <p:cSld>
-    <p:spTree>
-      <p:nvGrpSpPr>
-        <p:cNvPr id="1" name=""/>
-        <p:cNvGrpSpPr/>
-        <p:nvPr/>
-      </p:nvGrpSpPr>
-      <p:grpSpPr>
-        <a:xfrm>
-          <a:off x="0" y="0"/>
-          <a:ext cx="0" cy="0"/>
-          <a:chOff x="0" y="0"/>
-          <a:chExt cx="0" cy="0"/>
-        </a:xfrm>
-      </p:grpSpPr>
-      <p:sp>
-        <p:nvSpPr>
-          <p:cNvPr id="2" name="Title 1"/>
-          <p:cNvSpPr>
-            <a:spLocks noGrp="1"/>
-          </p:cNvSpPr>
-          <p:nvPr>
-            <p:ph type="title"/>
-          </p:nvPr>
-        </p:nvSpPr>
-        <p:spPr/>
-        <p:txBody>
-          <a:bodyPr>
-            <a:normAutofit/>
-          </a:bodyPr>
-          <a:lstStyle/>
-          <a:p>
-            <a:pPr lvl="0"/>
-            <a:r>
-              <a:rPr lang="en-US" dirty="0" smtClean="0"/>
-              <a:t>Course Topics</a:t>
-            </a:r>
-            <a:endParaRPr lang="en-US" dirty="0"/>
-          </a:p>
-        </p:txBody>
-      </p:sp>
-      <p:graphicFrame>
-        <p:nvGraphicFramePr>
-          <p:cNvPr id="4" name="Content Placeholder 3"/>
-          <p:cNvGraphicFramePr>
-            <a:graphicFrameLocks noGrp="1"/>
-          </p:cNvGraphicFramePr>
-          <p:nvPr>
-            <p:ph sz="quarter" idx="10"/>
-            <p:extLst>
-              <p:ext uri="{D42A27DB-BD31-4B8C-83A1-F6EECF244321}">
-                <p14:modId xmlns:p14="http://schemas.microsoft.com/office/powerpoint/2010/main" val="3547459360"/>
-              </p:ext>
-            </p:extLst>
-          </p:nvPr>
-        </p:nvGraphicFramePr>
-        <p:xfrm>
-          <a:off x="379413" y="1417636"/>
-          <a:ext cx="11525250" cy="3070528"/>
-        </p:xfrm>
-        <a:graphic>
-          <a:graphicData uri="http://schemas.openxmlformats.org/drawingml/2006/table">
-            <a:tbl>
-              <a:tblPr firstRow="1" bandRow="1">
-                <a:tableStyleId>{5C22544A-7EE6-4342-B048-85BDC9FD1C3A}</a:tableStyleId>
-              </a:tblPr>
-              <a:tblGrid>
-                <a:gridCol w="5762625">
-                  <a:extLst>
-                    <a:ext uri="{9D8B030D-6E8A-4147-A177-3AD203B41FA5}">
-                      <a16:colId xmlns:a16="http://schemas.microsoft.com/office/drawing/2014/main" xmlns="" val="1632794655"/>
-                    </a:ext>
-                  </a:extLst>
-                </a:gridCol>
-                <a:gridCol w="5762625">
-                  <a:extLst>
-                    <a:ext uri="{9D8B030D-6E8A-4147-A177-3AD203B41FA5}">
-                      <a16:colId xmlns:a16="http://schemas.microsoft.com/office/drawing/2014/main" xmlns="" val="2011313899"/>
-                    </a:ext>
-                  </a:extLst>
-                </a:gridCol>
-              </a:tblGrid>
-              <a:tr h="767632">
-                <a:tc gridSpan="2">
-                  <a:txBody>
-                    <a:bodyPr/>
-                    <a:lstStyle/>
-                    <a:p>
-                      <a:r>
-                        <a:rPr lang="en-US" sz="3600" dirty="0" smtClean="0">
-                          <a:latin typeface="Segoe UI Light" panose="020B0502040204020203" pitchFamily="34" charset="0"/>
-                          <a:cs typeface="Segoe UI Light" panose="020B0502040204020203" pitchFamily="34" charset="0"/>
-                        </a:rPr>
-                        <a:t>Web</a:t>
-                      </a:r>
-                      <a:r>
-                        <a:rPr lang="en-US" sz="3600" baseline="0" dirty="0" smtClean="0">
-                          <a:latin typeface="Segoe UI Light" panose="020B0502040204020203" pitchFamily="34" charset="0"/>
-                          <a:cs typeface="Segoe UI Light" panose="020B0502040204020203" pitchFamily="34" charset="0"/>
-                        </a:rPr>
-                        <a:t> API Design</a:t>
-                      </a:r>
-                      <a:endParaRPr lang="en-US" sz="3600" dirty="0">
-                        <a:latin typeface="Segoe UI Light" panose="020B0502040204020203" pitchFamily="34" charset="0"/>
-                        <a:cs typeface="Segoe UI Light" panose="020B0502040204020203" pitchFamily="34" charset="0"/>
-                      </a:endParaRPr>
-                    </a:p>
-                  </a:txBody>
-                  <a:tcPr anchor="ctr"/>
-                </a:tc>
-                <a:tc hMerge="1">
-                  <a:txBody>
-                    <a:bodyPr/>
-                    <a:lstStyle/>
-                    <a:p>
-                      <a:endParaRPr lang="en-US" dirty="0"/>
-                    </a:p>
-                  </a:txBody>
-                  <a:tcPr/>
-                </a:tc>
-                <a:extLst>
-                  <a:ext uri="{0D108BD9-81ED-4DB2-BD59-A6C34878D82A}">
-                    <a16:rowId xmlns:a16="http://schemas.microsoft.com/office/drawing/2014/main" xmlns="" val="1789177411"/>
-                  </a:ext>
-                </a:extLst>
-              </a:tr>
-              <a:tr h="767632">
-                <a:tc>
-                  <a:txBody>
-                    <a:bodyPr/>
-                    <a:lstStyle/>
-                    <a:p>
-                      <a:r>
-                        <a:rPr lang="en-US" sz="2400" dirty="0" smtClean="0">
-                          <a:latin typeface="Segoe UI Light" panose="020B0502040204020203" pitchFamily="34" charset="0"/>
-                          <a:cs typeface="Segoe UI Light" panose="020B0502040204020203" pitchFamily="34" charset="0"/>
-                        </a:rPr>
-                        <a:t>01 | Introduction to Web</a:t>
-                      </a:r>
-                      <a:r>
-                        <a:rPr lang="en-US" sz="2400" baseline="0" dirty="0" smtClean="0">
-                          <a:latin typeface="Segoe UI Light" panose="020B0502040204020203" pitchFamily="34" charset="0"/>
-                          <a:cs typeface="Segoe UI Light" panose="020B0502040204020203" pitchFamily="34" charset="0"/>
-                        </a:rPr>
-                        <a:t> API</a:t>
-                      </a:r>
-                      <a:endParaRPr lang="en-US" sz="2400" dirty="0">
-                        <a:latin typeface="Segoe UI Light" panose="020B0502040204020203" pitchFamily="34" charset="0"/>
-                        <a:cs typeface="Segoe UI Light" panose="020B0502040204020203" pitchFamily="34" charset="0"/>
-                      </a:endParaRPr>
-                    </a:p>
-                  </a:txBody>
-                  <a:tcPr anchor="ctr"/>
-                </a:tc>
-                <a:tc>
-                  <a:txBody>
-                    <a:bodyPr/>
-                    <a:lstStyle/>
-                    <a:p>
-                      <a:r>
-                        <a:rPr lang="en-US" sz="2400" dirty="0" smtClean="0">
-                          <a:latin typeface="Segoe UI Light" panose="020B0502040204020203" pitchFamily="34" charset="0"/>
-                          <a:cs typeface="Segoe UI Light" panose="020B0502040204020203" pitchFamily="34" charset="0"/>
-                        </a:rPr>
-                        <a:t>04 | Validation</a:t>
-                      </a:r>
-                      <a:r>
-                        <a:rPr lang="en-US" sz="2400" baseline="0" dirty="0" smtClean="0">
-                          <a:latin typeface="Segoe UI Light" panose="020B0502040204020203" pitchFamily="34" charset="0"/>
-                          <a:cs typeface="Segoe UI Light" panose="020B0502040204020203" pitchFamily="34" charset="0"/>
-                        </a:rPr>
-                        <a:t> and Error Handling</a:t>
-                      </a:r>
-                      <a:r>
-                        <a:rPr lang="en-US" sz="2400" dirty="0" smtClean="0">
-                          <a:latin typeface="Segoe UI Light" panose="020B0502040204020203" pitchFamily="34" charset="0"/>
-                          <a:cs typeface="Segoe UI Light" panose="020B0502040204020203" pitchFamily="34" charset="0"/>
-                        </a:rPr>
-                        <a:t> </a:t>
-                      </a:r>
-                      <a:endParaRPr lang="en-US" sz="2400" dirty="0">
-                        <a:latin typeface="Segoe UI Light" panose="020B0502040204020203" pitchFamily="34" charset="0"/>
-                        <a:cs typeface="Segoe UI Light" panose="020B0502040204020203" pitchFamily="34" charset="0"/>
-                      </a:endParaRPr>
-                    </a:p>
-                  </a:txBody>
-                  <a:tcPr anchor="ctr"/>
-                </a:tc>
-                <a:extLst>
-                  <a:ext uri="{0D108BD9-81ED-4DB2-BD59-A6C34878D82A}">
-                    <a16:rowId xmlns:a16="http://schemas.microsoft.com/office/drawing/2014/main" xmlns="" val="3842815335"/>
-                  </a:ext>
-                </a:extLst>
-              </a:tr>
-              <a:tr h="767632">
-                <a:tc>
-                  <a:txBody>
-                    <a:bodyPr/>
-                    <a:lstStyle/>
-                    <a:p>
-                      <a:r>
-                        <a:rPr lang="en-US" sz="2400" dirty="0" smtClean="0">
-                          <a:latin typeface="Segoe UI Light" panose="020B0502040204020203" pitchFamily="34" charset="0"/>
-                          <a:cs typeface="Segoe UI Light" panose="020B0502040204020203" pitchFamily="34" charset="0"/>
-                        </a:rPr>
-                        <a:t>02 | Basic Web API Design</a:t>
-                      </a:r>
-                      <a:endParaRPr lang="en-US" sz="2400" dirty="0">
-                        <a:latin typeface="Segoe UI Light" panose="020B0502040204020203" pitchFamily="34" charset="0"/>
-                        <a:cs typeface="Segoe UI Light" panose="020B0502040204020203" pitchFamily="34" charset="0"/>
-                      </a:endParaRPr>
-                    </a:p>
-                  </a:txBody>
-                  <a:tcPr anchor="ctr"/>
-                </a:tc>
-                <a:tc>
-                  <a:txBody>
-                    <a:bodyPr/>
-                    <a:lstStyle/>
-                    <a:p>
-                      <a:r>
-                        <a:rPr lang="en-US" sz="2400" dirty="0" smtClean="0">
-                          <a:latin typeface="Segoe UI Light" panose="020B0502040204020203" pitchFamily="34" charset="0"/>
-                          <a:cs typeface="Segoe UI Light" panose="020B0502040204020203" pitchFamily="34" charset="0"/>
-                        </a:rPr>
-                        <a:t>05 | Security </a:t>
-                      </a:r>
-                      <a:endParaRPr lang="en-US" sz="2400" dirty="0">
-                        <a:latin typeface="Segoe UI Light" panose="020B0502040204020203" pitchFamily="34" charset="0"/>
-                        <a:cs typeface="Segoe UI Light" panose="020B0502040204020203" pitchFamily="34" charset="0"/>
-                      </a:endParaRPr>
-                    </a:p>
-                  </a:txBody>
-                  <a:tcPr anchor="ctr"/>
-                </a:tc>
-                <a:extLst>
-                  <a:ext uri="{0D108BD9-81ED-4DB2-BD59-A6C34878D82A}">
-                    <a16:rowId xmlns:a16="http://schemas.microsoft.com/office/drawing/2014/main" xmlns="" val="321066646"/>
-                  </a:ext>
-                </a:extLst>
-              </a:tr>
-              <a:tr h="767632">
-                <a:tc>
-                  <a:txBody>
-                    <a:bodyPr/>
-                    <a:lstStyle/>
-                    <a:p>
-                      <a:pPr marL="0" marR="0" indent="0" algn="l" defTabSz="914088" rtl="0" eaLnBrk="1" fontAlgn="auto" latinLnBrk="0" hangingPunct="1">
-                        <a:lnSpc>
-                          <a:spcPct val="100000"/>
-                        </a:lnSpc>
-                        <a:spcBef>
-                          <a:spcPts val="0"/>
-                        </a:spcBef>
-                        <a:spcAft>
-                          <a:spcPts val="0"/>
-                        </a:spcAft>
-                        <a:buClrTx/>
-                        <a:buSzTx/>
-                        <a:buFontTx/>
-                        <a:buNone/>
-                        <a:tabLst/>
-                        <a:defRPr/>
-                      </a:pPr>
-                      <a:r>
-                        <a:rPr lang="en-US" sz="2400" dirty="0" smtClean="0">
-                          <a:latin typeface="Segoe UI Light" panose="020B0502040204020203" pitchFamily="34" charset="0"/>
-                          <a:cs typeface="Segoe UI Light" panose="020B0502040204020203" pitchFamily="34" charset="0"/>
-                        </a:rPr>
-                        <a:t>03</a:t>
-                      </a:r>
-                      <a:r>
-                        <a:rPr lang="en-US" sz="2400" baseline="0" dirty="0" smtClean="0">
-                          <a:latin typeface="Segoe UI Light" panose="020B0502040204020203" pitchFamily="34" charset="0"/>
-                          <a:cs typeface="Segoe UI Light" panose="020B0502040204020203" pitchFamily="34" charset="0"/>
-                        </a:rPr>
-                        <a:t> | Configuration</a:t>
-                      </a:r>
-                      <a:endParaRPr lang="en-US" sz="2400" dirty="0" smtClean="0">
-                        <a:latin typeface="Segoe UI Light" panose="020B0502040204020203" pitchFamily="34" charset="0"/>
-                        <a:cs typeface="Segoe UI Light" panose="020B0502040204020203" pitchFamily="34" charset="0"/>
-                      </a:endParaRPr>
-                    </a:p>
-                  </a:txBody>
-                  <a:tcPr anchor="ctr"/>
-                </a:tc>
-                <a:tc>
-                  <a:txBody>
-                    <a:bodyPr/>
-                    <a:lstStyle/>
-                    <a:p>
-                      <a:r>
-                        <a:rPr lang="en-US" sz="2400" dirty="0" smtClean="0">
-                          <a:latin typeface="Segoe UI Light" panose="020B0502040204020203" pitchFamily="34" charset="0"/>
-                          <a:cs typeface="Segoe UI Light" panose="020B0502040204020203" pitchFamily="34" charset="0"/>
-                        </a:rPr>
-                        <a:t>06 | Advanced</a:t>
-                      </a:r>
-                      <a:r>
-                        <a:rPr lang="en-US" sz="2400" baseline="0" dirty="0" smtClean="0">
-                          <a:latin typeface="Segoe UI Light" panose="020B0502040204020203" pitchFamily="34" charset="0"/>
-                          <a:cs typeface="Segoe UI Light" panose="020B0502040204020203" pitchFamily="34" charset="0"/>
-                        </a:rPr>
-                        <a:t> Web API Design</a:t>
-                      </a:r>
-                      <a:r>
-                        <a:rPr lang="en-US" sz="2400" dirty="0" smtClean="0">
-                          <a:latin typeface="Segoe UI Light" panose="020B0502040204020203" pitchFamily="34" charset="0"/>
-                          <a:cs typeface="Segoe UI Light" panose="020B0502040204020203" pitchFamily="34" charset="0"/>
-                        </a:rPr>
-                        <a:t> </a:t>
-                      </a:r>
-                      <a:endParaRPr lang="en-US" sz="2400" dirty="0">
-                        <a:latin typeface="Segoe UI Light" panose="020B0502040204020203" pitchFamily="34" charset="0"/>
-                        <a:cs typeface="Segoe UI Light" panose="020B0502040204020203" pitchFamily="34" charset="0"/>
-                      </a:endParaRPr>
-                    </a:p>
-                  </a:txBody>
-                  <a:tcPr anchor="ctr"/>
-                </a:tc>
-                <a:extLst>
-                  <a:ext uri="{0D108BD9-81ED-4DB2-BD59-A6C34878D82A}">
-                    <a16:rowId xmlns:a16="http://schemas.microsoft.com/office/drawing/2014/main" xmlns="" val="3812060533"/>
-                  </a:ext>
-                </a:extLst>
-              </a:tr>
-            </a:tbl>
-          </a:graphicData>
-        </a:graphic>
-      </p:graphicFrame>
-    </p:spTree>
-    <p:extLst>
-      <p:ext uri="{BB962C8B-B14F-4D97-AF65-F5344CB8AC3E}">
-        <p14:creationId xmlns:p14="http://schemas.microsoft.com/office/powerpoint/2010/main" val="4178564752"/>
-      </p:ext>
-    </p:extLst>
-  </p:cSld>
-  <p:clrMapOvr>
-    <a:masterClrMapping/>
-  </p:clrMapOvr>
-  <mc:AlternateContent xmlns:mc="http://schemas.openxmlformats.org/markup-compatibility/2006" xmlns:p14="http://schemas.microsoft.com/office/powerpoint/2010/main">
-    <mc:Choice Requires="p14">
-      <p:transition spd="slow" p14:dur="2000"/>
-    </mc:Choice>
-    <mc:Fallback xmlns="">
-      <p:transition spd="slow"/>
-    </mc:Fallback>
-  </mc:AlternateContent>
-  <p:timing>
-    <p:tnLst>
-      <p:par>
-        <p:cTn id="1" dur="indefinite" restart="never" nodeType="tmRoot"/>
-      </p:par>
-    </p:tnLst>
-  </p:timing>
-</p:sld>
-</file>
-
-<file path=ppt/slides/slide5.xml><?xml version="1.0" encoding="utf-8"?>
-<p:sld xmlns:a="http://schemas.openxmlformats.org/drawingml/2006/main" xmlns:r="http://schemas.openxmlformats.org/officeDocument/2006/relationships" xmlns:p="http://schemas.openxmlformats.org/presentationml/2006/main">
-  <p:cSld>
-    <p:spTree>
-      <p:nvGrpSpPr>
-        <p:cNvPr id="1" name=""/>
-        <p:cNvGrpSpPr/>
-        <p:nvPr/>
-      </p:nvGrpSpPr>
-      <p:grpSpPr>
-        <a:xfrm>
-          <a:off x="0" y="0"/>
-          <a:ext cx="0" cy="0"/>
-          <a:chOff x="0" y="0"/>
-          <a:chExt cx="0" cy="0"/>
-        </a:xfrm>
-      </p:grpSpPr>
-      <p:sp>
-        <p:nvSpPr>
-          <p:cNvPr id="2" name="Title 1"/>
-          <p:cNvSpPr>
-            <a:spLocks noGrp="1"/>
-          </p:cNvSpPr>
-          <p:nvPr>
-            <p:ph type="title"/>
-          </p:nvPr>
-        </p:nvSpPr>
-        <p:spPr/>
-        <p:txBody>
-          <a:bodyPr/>
-          <a:lstStyle/>
-          <a:p>
-            <a:pPr lvl="0"/>
-            <a:r>
-              <a:rPr lang="en-US" smtClean="0"/>
-              <a:t>Setting Expectations</a:t>
-            </a:r>
-            <a:endParaRPr lang="en-US" dirty="0"/>
-          </a:p>
-        </p:txBody>
-      </p:sp>
-      <p:sp>
-        <p:nvSpPr>
-          <p:cNvPr id="3" name="Content Placeholder 2"/>
-          <p:cNvSpPr>
-            <a:spLocks noGrp="1"/>
-          </p:cNvSpPr>
-          <p:nvPr>
-            <p:ph sz="quarter" idx="10"/>
-          </p:nvPr>
-        </p:nvSpPr>
-        <p:spPr/>
-        <p:txBody>
-          <a:bodyPr/>
-          <a:lstStyle/>
-          <a:p>
-            <a:r>
-              <a:rPr lang="en-US" dirty="0" smtClean="0"/>
-              <a:t>Target Audience</a:t>
-            </a:r>
-          </a:p>
-          <a:p>
-            <a:pPr lvl="1"/>
-            <a:r>
-              <a:rPr lang="en-US" dirty="0" smtClean="0"/>
-              <a:t>Web Application Developer</a:t>
-            </a:r>
-          </a:p>
-          <a:p>
-            <a:pPr lvl="1"/>
-            <a:r>
-              <a:rPr lang="en-US" dirty="0" smtClean="0"/>
-              <a:t>Interesting in building </a:t>
-            </a:r>
-            <a:r>
-              <a:rPr lang="en-US" dirty="0"/>
-              <a:t>p</a:t>
-            </a:r>
-            <a:r>
-              <a:rPr lang="en-US" dirty="0" smtClean="0"/>
-              <a:t>ublic-facing RESTful APIs </a:t>
-            </a:r>
-          </a:p>
-          <a:p>
-            <a:pPr lvl="1"/>
-            <a:r>
-              <a:rPr lang="en-US" dirty="0" smtClean="0"/>
-              <a:t>Would like to expand knowledge of Web API design</a:t>
-            </a:r>
-          </a:p>
-          <a:p>
-            <a:r>
-              <a:rPr lang="en-US" dirty="0" smtClean="0"/>
-              <a:t>Suggested Prerequisites/Supporting Material</a:t>
-            </a:r>
-          </a:p>
-          <a:p>
-            <a:pPr lvl="1"/>
-            <a:r>
-              <a:rPr lang="en-US" dirty="0" smtClean="0"/>
-              <a:t>Visual Studio 2013+</a:t>
-            </a:r>
-            <a:endParaRPr lang="en-US" dirty="0"/>
-          </a:p>
-        </p:txBody>
-      </p:sp>
-      <p:sp>
-        <p:nvSpPr>
-          <p:cNvPr id="5" name="TextBox 4"/>
-          <p:cNvSpPr txBox="1"/>
-          <p:nvPr/>
-        </p:nvSpPr>
-        <p:spPr>
-          <a:xfrm>
-            <a:off x="9906000" y="-1"/>
-            <a:ext cx="2286000" cy="2031325"/>
-          </a:xfrm>
-          <a:prstGeom prst="rect">
-            <a:avLst/>
-          </a:prstGeom>
-          <a:solidFill>
-            <a:srgbClr val="FFFF00"/>
-          </a:solidFill>
-          <a:ln>
-            <a:noFill/>
-          </a:ln>
-        </p:spPr>
-        <p:txBody>
-          <a:bodyPr wrap="square" rtlCol="0">
-            <a:spAutoFit/>
-          </a:bodyPr>
-          <a:lstStyle/>
-          <a:p>
-            <a:pPr algn="ctr"/>
-            <a:endParaRPr lang="en-US" dirty="0" smtClean="0"/>
-          </a:p>
-          <a:p>
-            <a:pPr algn="ctr"/>
-            <a:endParaRPr lang="en-US" dirty="0"/>
-          </a:p>
-          <a:p>
-            <a:pPr algn="ctr"/>
-            <a:r>
-              <a:rPr lang="en-US" dirty="0" smtClean="0"/>
-              <a:t>Please leave this area blank to allow for picture in picture recording</a:t>
-            </a:r>
-          </a:p>
-          <a:p>
-            <a:pPr algn="ctr"/>
-            <a:endParaRPr lang="en-US" dirty="0"/>
-          </a:p>
-        </p:txBody>
-      </p:sp>
-    </p:spTree>
-    <p:extLst>
-      <p:ext uri="{BB962C8B-B14F-4D97-AF65-F5344CB8AC3E}">
-        <p14:creationId xmlns:p14="http://schemas.microsoft.com/office/powerpoint/2010/main" val="1967407312"/>
-      </p:ext>
-    </p:extLst>
-  </p:cSld>
-  <p:clrMapOvr>
-    <a:masterClrMapping/>
-  </p:clrMapOvr>
-  <p:timing>
-    <p:tnLst>
-      <p:par>
-        <p:cTn id="1" dur="indefinite" restart="never" nodeType="tmRoot"/>
-      </p:par>
-    </p:tnLst>
-  </p:timing>
-</p:sld>
-</file>
-
-<file path=ppt/slides/slide6.xml><?xml version="1.0" encoding="utf-8"?>
-<p:sld xmlns:a="http://schemas.openxmlformats.org/drawingml/2006/main" xmlns:r="http://schemas.openxmlformats.org/officeDocument/2006/relationships" xmlns:p="http://schemas.openxmlformats.org/presentationml/2006/main">
-  <p:cSld>
-    <p:spTree>
-      <p:nvGrpSpPr>
-        <p:cNvPr id="1" name=""/>
-        <p:cNvGrpSpPr/>
-        <p:nvPr/>
-      </p:nvGrpSpPr>
-      <p:grpSpPr>
-        <a:xfrm>
-          <a:off x="0" y="0"/>
-          <a:ext cx="0" cy="0"/>
-          <a:chOff x="0" y="0"/>
-          <a:chExt cx="0" cy="0"/>
-        </a:xfrm>
-      </p:grpSpPr>
-      <p:sp>
-        <p:nvSpPr>
-          <p:cNvPr id="2" name="Content Placeholder 1"/>
-          <p:cNvSpPr>
-            <a:spLocks noGrp="1"/>
-          </p:cNvSpPr>
-          <p:nvPr>
-            <p:ph sz="quarter" idx="10"/>
-          </p:nvPr>
-        </p:nvSpPr>
-        <p:spPr>
-          <a:xfrm>
-            <a:off x="277813" y="1427918"/>
-            <a:ext cx="11525250" cy="5290388"/>
-          </a:xfrm>
-        </p:spPr>
-        <p:txBody>
-          <a:bodyPr/>
-          <a:lstStyle/>
-          <a:p>
-            <a:r>
-              <a:rPr lang="en-US" dirty="0" smtClean="0"/>
-              <a:t>Microsoft Virtual Academy</a:t>
-            </a:r>
-          </a:p>
-          <a:p>
-            <a:pPr lvl="1"/>
-            <a:r>
-              <a:rPr lang="en-US" dirty="0" smtClean="0"/>
-              <a:t>Free online learning tailored for IT Pros and Developers </a:t>
-            </a:r>
-          </a:p>
-          <a:p>
-            <a:pPr lvl="1"/>
-            <a:r>
-              <a:rPr lang="en-US" dirty="0"/>
-              <a:t>Over </a:t>
-            </a:r>
-            <a:r>
-              <a:rPr lang="en-US" dirty="0" smtClean="0"/>
-              <a:t>1M registered users</a:t>
-            </a:r>
-          </a:p>
-          <a:p>
-            <a:pPr lvl="1"/>
-            <a:r>
-              <a:rPr lang="en-US" dirty="0" smtClean="0"/>
-              <a:t>Up-to-date, relevant training on variety of Microsoft products</a:t>
-            </a:r>
-          </a:p>
-          <a:p>
-            <a:r>
-              <a:rPr lang="en-US" dirty="0" smtClean="0"/>
-              <a:t>“Earn while you learn!” </a:t>
-            </a:r>
-          </a:p>
-          <a:p>
-            <a:pPr lvl="1"/>
-            <a:r>
-              <a:rPr lang="en-US" dirty="0" smtClean="0"/>
-              <a:t>Get 50 MVA Points for this event!</a:t>
-            </a:r>
-          </a:p>
-          <a:p>
-            <a:pPr lvl="1"/>
-            <a:r>
-              <a:rPr lang="en-US" dirty="0" smtClean="0"/>
-              <a:t>Visit </a:t>
-            </a:r>
-            <a:r>
-              <a:rPr lang="en-US" dirty="0" smtClean="0">
-                <a:hlinkClick r:id="rId2"/>
-              </a:rPr>
-              <a:t>http://aka.ms/MVA-Voucher</a:t>
-            </a:r>
-            <a:r>
-              <a:rPr lang="en-US" dirty="0" smtClean="0"/>
-              <a:t> </a:t>
-            </a:r>
-          </a:p>
-          <a:p>
-            <a:pPr lvl="1"/>
-            <a:r>
-              <a:rPr lang="en-US" dirty="0" smtClean="0"/>
-              <a:t>Enter this code: </a:t>
-            </a:r>
-            <a:r>
-              <a:rPr lang="en-US" b="1" dirty="0" smtClean="0"/>
-              <a:t>PowerJump1 </a:t>
-            </a:r>
-            <a:r>
-              <a:rPr lang="en-US" dirty="0" smtClean="0"/>
-              <a:t>(expires 8/15/2013)</a:t>
-            </a:r>
-            <a:endParaRPr lang="en-US" dirty="0"/>
-          </a:p>
-        </p:txBody>
-      </p:sp>
-      <p:sp>
-        <p:nvSpPr>
-          <p:cNvPr id="3" name="Title 2"/>
-          <p:cNvSpPr>
-            <a:spLocks noGrp="1"/>
-          </p:cNvSpPr>
-          <p:nvPr>
-            <p:ph type="title"/>
-          </p:nvPr>
-        </p:nvSpPr>
-        <p:spPr>
-          <a:xfrm>
-            <a:off x="-367266" y="182215"/>
-            <a:ext cx="11416266" cy="1063487"/>
-          </a:xfrm>
-        </p:spPr>
-        <p:txBody>
-          <a:bodyPr/>
-          <a:lstStyle/>
-          <a:p>
-            <a:r>
-              <a:rPr lang="en-US" dirty="0" smtClean="0"/>
-              <a:t>     Join the MVA Community!</a:t>
-            </a:r>
-            <a:endParaRPr lang="en-US" dirty="0"/>
-          </a:p>
-        </p:txBody>
-      </p:sp>
-      <p:sp>
-        <p:nvSpPr>
-          <p:cNvPr id="7" name="TextBox 6"/>
-          <p:cNvSpPr txBox="1"/>
-          <p:nvPr/>
-        </p:nvSpPr>
-        <p:spPr>
-          <a:xfrm>
-            <a:off x="9906000" y="-1"/>
-            <a:ext cx="2286000" cy="2031325"/>
-          </a:xfrm>
-          <a:prstGeom prst="rect">
-            <a:avLst/>
-          </a:prstGeom>
-          <a:solidFill>
-            <a:srgbClr val="FFFF00"/>
-          </a:solidFill>
-          <a:ln>
-            <a:noFill/>
-          </a:ln>
-        </p:spPr>
-        <p:txBody>
-          <a:bodyPr wrap="square" rtlCol="0">
-            <a:spAutoFit/>
-          </a:bodyPr>
-          <a:lstStyle/>
-          <a:p>
-            <a:pPr algn="ctr"/>
-            <a:endParaRPr lang="en-US" dirty="0" smtClean="0"/>
-          </a:p>
-          <a:p>
-            <a:pPr algn="ctr"/>
-            <a:endParaRPr lang="en-US" dirty="0"/>
-          </a:p>
-          <a:p>
-            <a:pPr algn="ctr"/>
-            <a:r>
-              <a:rPr lang="en-US" dirty="0" smtClean="0"/>
-              <a:t>Please leave this area blank to allow for picture in picture recording</a:t>
-            </a:r>
-          </a:p>
-          <a:p>
-            <a:pPr algn="ctr"/>
-            <a:endParaRPr lang="en-US" dirty="0"/>
-          </a:p>
-        </p:txBody>
-      </p:sp>
-    </p:spTree>
-    <p:extLst>
-      <p:ext uri="{BB962C8B-B14F-4D97-AF65-F5344CB8AC3E}">
-        <p14:creationId xmlns:p14="http://schemas.microsoft.com/office/powerpoint/2010/main" val="3654709363"/>
-      </p:ext>
-    </p:extLst>
-  </p:cSld>
-  <p:clrMapOvr>
-    <a:masterClrMapping/>
-  </p:clrMapOvr>
-  <mc:AlternateContent xmlns:mc="http://schemas.openxmlformats.org/markup-compatibility/2006" xmlns:p14="http://schemas.microsoft.com/office/powerpoint/2010/main">
-    <mc:Choice Requires="p14">
-      <p:transition spd="med" p14:dur="700">
-        <p:fade/>
-      </p:transition>
-    </mc:Choice>
-    <mc:Fallback xmlns="">
-      <p:transition spd="med">
-        <p:fade/>
-      </p:transition>
-    </mc:Fallback>
-  </mc:AlternateContent>
-  <p:timing>
-    <p:tnLst>
-      <p:par>
-        <p:cTn id="1" dur="indefinite" restart="never" nodeType="tmRoot"/>
-      </p:par>
-    </p:tnLst>
-  </p:timing>
-</p:sld>
-</file>
-
-<file path=ppt/slides/slide7.xml><?xml version="1.0" encoding="utf-8"?>
-<p:sld xmlns:a="http://schemas.openxmlformats.org/drawingml/2006/main" xmlns:r="http://schemas.openxmlformats.org/officeDocument/2006/relationships" xmlns:p="http://schemas.openxmlformats.org/presentationml/2006/main">
-  <p:cSld>
-    <p:spTree>
-      <p:nvGrpSpPr>
-        <p:cNvPr id="1" name=""/>
-        <p:cNvGrpSpPr/>
-        <p:nvPr/>
-      </p:nvGrpSpPr>
-      <p:grpSpPr>
-        <a:xfrm>
-          <a:off x="0" y="0"/>
-          <a:ext cx="0" cy="0"/>
-          <a:chOff x="0" y="0"/>
-          <a:chExt cx="0" cy="0"/>
-        </a:xfrm>
-      </p:grpSpPr>
-      <p:sp>
-        <p:nvSpPr>
-          <p:cNvPr id="5" name="Text Placeholder 4"/>
-          <p:cNvSpPr>
-            <a:spLocks noGrp="1"/>
-          </p:cNvSpPr>
-          <p:nvPr>
-            <p:ph type="body" sz="quarter" idx="10"/>
-          </p:nvPr>
-        </p:nvSpPr>
-        <p:spPr>
-          <a:solidFill>
-            <a:srgbClr val="007233"/>
-          </a:solidFill>
-          <a:ln>
-            <a:noFill/>
-          </a:ln>
-        </p:spPr>
-        <p:txBody>
-          <a:bodyPr/>
-          <a:lstStyle/>
-          <a:p>
-            <a:pPr marL="914400" indent="-914400"/>
-            <a:r>
-              <a:rPr lang="en-US" dirty="0" smtClean="0"/>
-              <a:t>01 | Introduction to Web API</a:t>
-            </a:r>
-            <a:endParaRPr lang="en-US" dirty="0"/>
-          </a:p>
-        </p:txBody>
-      </p:sp>
-      <p:sp>
-        <p:nvSpPr>
-          <p:cNvPr id="4" name="Subtitle 3"/>
-          <p:cNvSpPr>
-            <a:spLocks noGrp="1"/>
-          </p:cNvSpPr>
-          <p:nvPr>
-            <p:ph type="subTitle" idx="1"/>
-          </p:nvPr>
-        </p:nvSpPr>
-        <p:spPr/>
-        <p:txBody>
-          <a:bodyPr/>
-          <a:lstStyle/>
-          <a:p>
-            <a:r>
-              <a:rPr lang="en-US" dirty="0" smtClean="0"/>
-              <a:t>Jeremy Likness </a:t>
-            </a:r>
-            <a:r>
-              <a:rPr lang="en-US" dirty="0"/>
-              <a:t>| </a:t>
-            </a:r>
-            <a:r>
-              <a:rPr lang="en-US" dirty="0" smtClean="0"/>
-              <a:t>Principal </a:t>
-            </a:r>
-            <a:r>
-              <a:rPr lang="en-US" dirty="0"/>
-              <a:t>Architect</a:t>
-            </a:r>
-          </a:p>
-          <a:p>
-            <a:r>
-              <a:rPr lang="en-US" dirty="0" smtClean="0"/>
-              <a:t>Christopher Harrison </a:t>
-            </a:r>
-            <a:r>
-              <a:rPr lang="en-US" dirty="0"/>
-              <a:t>| </a:t>
-            </a:r>
-            <a:r>
-              <a:rPr lang="en-US" dirty="0" smtClean="0"/>
-              <a:t>Content Developer</a:t>
-            </a:r>
-            <a:endParaRPr lang="en-US" dirty="0"/>
-          </a:p>
-        </p:txBody>
-      </p:sp>
-      <p:sp>
-        <p:nvSpPr>
-          <p:cNvPr id="7" name="TextBox 6"/>
-          <p:cNvSpPr txBox="1"/>
-          <p:nvPr/>
-        </p:nvSpPr>
-        <p:spPr>
-          <a:xfrm>
-            <a:off x="6345829" y="755471"/>
-            <a:ext cx="3671248" cy="646331"/>
-          </a:xfrm>
-          <a:prstGeom prst="rect">
-            <a:avLst/>
-          </a:prstGeom>
-          <a:solidFill>
-            <a:srgbClr val="FFFF00"/>
-          </a:solidFill>
-        </p:spPr>
-        <p:txBody>
-          <a:bodyPr wrap="square" rtlCol="0">
-            <a:spAutoFit/>
-          </a:bodyPr>
-          <a:lstStyle/>
-          <a:p>
-            <a:r>
-              <a:rPr lang="en-US" dirty="0" smtClean="0"/>
-              <a:t>Please make sure there’s a “Module Transition” slide for every module</a:t>
-            </a:r>
-            <a:endParaRPr lang="en-US" dirty="0"/>
-          </a:p>
-        </p:txBody>
-      </p:sp>
-    </p:spTree>
-    <p:extLst>
-      <p:ext uri="{BB962C8B-B14F-4D97-AF65-F5344CB8AC3E}">
-        <p14:creationId xmlns:p14="http://schemas.microsoft.com/office/powerpoint/2010/main" val="897692544"/>
-      </p:ext>
-    </p:extLst>
-  </p:cSld>
-  <p:clrMapOvr>
-    <a:masterClrMapping/>
-  </p:clrMapOvr>
-  <p:timing>
-    <p:tnLst>
-      <p:par>
-        <p:cTn id="1" dur="indefinite" restart="never" nodeType="tmRoot"/>
-      </p:par>
-    </p:tnLst>
-  </p:timing>
-</p:sld>
-</file>
-
-<file path=ppt/slides/slide8.xml><?xml version="1.0" encoding="utf-8"?>
-<p:sld xmlns:a="http://schemas.openxmlformats.org/drawingml/2006/main" xmlns:r="http://schemas.openxmlformats.org/officeDocument/2006/relationships" xmlns:p="http://schemas.openxmlformats.org/presentationml/2006/main">
-  <p:cSld>
-    <p:spTree>
-      <p:nvGrpSpPr>
-        <p:cNvPr id="1" name=""/>
-        <p:cNvGrpSpPr/>
-        <p:nvPr/>
-      </p:nvGrpSpPr>
-      <p:grpSpPr>
-        <a:xfrm>
-          <a:off x="0" y="0"/>
-          <a:ext cx="0" cy="0"/>
-          <a:chOff x="0" y="0"/>
-          <a:chExt cx="0" cy="0"/>
-        </a:xfrm>
-      </p:grpSpPr>
-      <p:sp>
-        <p:nvSpPr>
-          <p:cNvPr id="7" name="Content Placeholder 6"/>
-          <p:cNvSpPr>
-            <a:spLocks noGrp="1"/>
-          </p:cNvSpPr>
-          <p:nvPr>
-            <p:ph sz="quarter" idx="10"/>
-          </p:nvPr>
-        </p:nvSpPr>
-        <p:spPr/>
-        <p:txBody>
-          <a:bodyPr>
-            <a:normAutofit/>
-          </a:bodyPr>
-          <a:lstStyle/>
-          <a:p>
-            <a:r>
-              <a:rPr lang="en-GB" dirty="0" smtClean="0"/>
-              <a:t>ASP.NET Web API</a:t>
-            </a:r>
-          </a:p>
-          <a:p>
-            <a:r>
-              <a:rPr lang="en-GB" dirty="0" smtClean="0"/>
-              <a:t>Web API Design</a:t>
-            </a:r>
-          </a:p>
-          <a:p>
-            <a:r>
-              <a:rPr lang="en-GB" dirty="0" smtClean="0"/>
-              <a:t>REST</a:t>
-            </a:r>
-          </a:p>
-          <a:p>
-            <a:r>
-              <a:rPr lang="en-GB" dirty="0" smtClean="0"/>
-              <a:t>HATEOAS</a:t>
-            </a:r>
-          </a:p>
-          <a:p>
-            <a:r>
-              <a:rPr lang="en-GB" dirty="0" smtClean="0"/>
-              <a:t>Scaffolding</a:t>
-            </a:r>
-            <a:endParaRPr lang="en-GB" dirty="0"/>
-          </a:p>
-        </p:txBody>
-      </p:sp>
-      <p:sp>
-        <p:nvSpPr>
-          <p:cNvPr id="2" name="Title 1"/>
-          <p:cNvSpPr>
-            <a:spLocks noGrp="1"/>
-          </p:cNvSpPr>
-          <p:nvPr>
-            <p:ph type="title"/>
-          </p:nvPr>
-        </p:nvSpPr>
-        <p:spPr/>
-        <p:txBody>
-          <a:bodyPr/>
-          <a:lstStyle/>
-          <a:p>
-            <a:r>
-              <a:rPr lang="en-US" smtClean="0"/>
-              <a:t>Module Overview</a:t>
-            </a:r>
-            <a:endParaRPr lang="en-US" dirty="0"/>
-          </a:p>
-        </p:txBody>
-      </p:sp>
-      <p:sp>
-        <p:nvSpPr>
-          <p:cNvPr id="5" name="TextBox 4"/>
-          <p:cNvSpPr txBox="1"/>
-          <p:nvPr/>
-        </p:nvSpPr>
-        <p:spPr>
-          <a:xfrm>
-            <a:off x="9906000" y="-1"/>
-            <a:ext cx="2286000" cy="2031325"/>
-          </a:xfrm>
-          <a:prstGeom prst="rect">
-            <a:avLst/>
-          </a:prstGeom>
-          <a:solidFill>
-            <a:srgbClr val="FFFF00"/>
-          </a:solidFill>
-          <a:ln>
-            <a:noFill/>
-          </a:ln>
-        </p:spPr>
-        <p:txBody>
-          <a:bodyPr wrap="square" rtlCol="0">
-            <a:spAutoFit/>
-          </a:bodyPr>
-          <a:lstStyle/>
-          <a:p>
-            <a:pPr algn="ctr"/>
-            <a:endParaRPr lang="en-US" dirty="0" smtClean="0"/>
-          </a:p>
-          <a:p>
-            <a:pPr algn="ctr"/>
-            <a:endParaRPr lang="en-US" dirty="0"/>
-          </a:p>
-          <a:p>
-            <a:pPr algn="ctr"/>
-            <a:r>
-              <a:rPr lang="en-US" dirty="0" smtClean="0"/>
-              <a:t>Please leave this area blank to allow for picture in picture recording</a:t>
-            </a:r>
-          </a:p>
-          <a:p>
-            <a:pPr algn="ctr"/>
-            <a:endParaRPr lang="en-US" dirty="0"/>
-          </a:p>
-        </p:txBody>
-      </p:sp>
-    </p:spTree>
-    <p:extLst>
-      <p:ext uri="{BB962C8B-B14F-4D97-AF65-F5344CB8AC3E}">
-        <p14:creationId xmlns:p14="http://schemas.microsoft.com/office/powerpoint/2010/main" val="318349970"/>
-      </p:ext>
-    </p:extLst>
-  </p:cSld>
-  <p:clrMapOvr>
-    <a:masterClrMapping/>
-  </p:clrMapOvr>
-  <p:timing>
-    <p:tnLst>
-      <p:par>
-        <p:cTn id="1" dur="indefinite" restart="never" nodeType="tmRoot"/>
-      </p:par>
-    </p:tnLst>
-  </p:timing>
-</p:sld>
-</file>
-
-<file path=ppt/slides/slide9.xml><?xml version="1.0" encoding="utf-8"?>
-<p:sld xmlns:a="http://schemas.openxmlformats.org/drawingml/2006/main" xmlns:r="http://schemas.openxmlformats.org/officeDocument/2006/relationships" xmlns:p="http://schemas.openxmlformats.org/presentationml/2006/main">
-  <p:cSld>
-    <p:spTree>
-      <p:nvGrpSpPr>
-        <p:cNvPr id="1" name=""/>
-        <p:cNvGrpSpPr/>
-        <p:nvPr/>
-      </p:nvGrpSpPr>
-      <p:grpSpPr>
-        <a:xfrm>
-          <a:off x="0" y="0"/>
-          <a:ext cx="0" cy="0"/>
-          <a:chOff x="0" y="0"/>
-          <a:chExt cx="0" cy="0"/>
-        </a:xfrm>
-      </p:grpSpPr>
-      <p:sp>
-        <p:nvSpPr>
-          <p:cNvPr id="2" name="Title 1"/>
-          <p:cNvSpPr>
-            <a:spLocks noGrp="1"/>
-          </p:cNvSpPr>
-          <p:nvPr>
-            <p:ph type="title"/>
-          </p:nvPr>
-        </p:nvSpPr>
-        <p:spPr/>
-        <p:txBody>
-          <a:bodyPr/>
-          <a:lstStyle/>
-          <a:p>
-            <a:r>
-              <a:rPr lang="en-US" dirty="0" smtClean="0"/>
-              <a:t>ASP.NET Web API</a:t>
-            </a:r>
-            <a:endParaRPr lang="en-US" dirty="0"/>
-          </a:p>
-        </p:txBody>
-      </p:sp>
-      <p:sp>
-        <p:nvSpPr>
-          <p:cNvPr id="3" name="Content Placeholder 2"/>
-          <p:cNvSpPr>
-            <a:spLocks noGrp="1"/>
-          </p:cNvSpPr>
-          <p:nvPr>
-            <p:ph sz="quarter" idx="10"/>
-          </p:nvPr>
-        </p:nvSpPr>
-        <p:spPr/>
-        <p:txBody>
-          <a:bodyPr/>
-          <a:lstStyle/>
-          <a:p>
-            <a:r>
-              <a:rPr lang="en-US" dirty="0" smtClean="0"/>
               <a:t>Option for web applications</a:t>
             </a:r>
           </a:p>
@@ -6717,53 +4364,6 @@
               <a:rPr lang="en-US" dirty="0" smtClean="0"/>
               <a:t>Ideal for RESTful APIs</a:t>
             </a:r>
-            <a:endParaRPr lang="en-US" dirty="0"/>
-          </a:p>
-        </p:txBody>
-      </p:sp>
-      <p:sp>
-        <p:nvSpPr>
-          <p:cNvPr id="4" name="TextBox 3"/>
-          <p:cNvSpPr txBox="1"/>
-          <p:nvPr/>
-        </p:nvSpPr>
-        <p:spPr>
-          <a:xfrm>
-            <a:off x="9906000" y="-1"/>
-            <a:ext cx="2286000" cy="2031325"/>
-          </a:xfrm>
-          <a:prstGeom prst="rect">
-            <a:avLst/>
-          </a:prstGeom>
-          <a:solidFill>
-            <a:srgbClr val="FFFF00"/>
-          </a:solidFill>
-          <a:ln>
-            <a:noFill/>
-          </a:ln>
-        </p:spPr>
-        <p:txBody>
-          <a:bodyPr wrap="square" rtlCol="0">
-            <a:spAutoFit/>
-          </a:bodyPr>
-          <a:lstStyle/>
-          <a:p>
-            <a:pPr algn="ctr"/>
-            <a:endParaRPr lang="en-US" dirty="0" smtClean="0"/>
-          </a:p>
-          <a:p>
-            <a:pPr algn="ctr"/>
-            <a:endParaRPr lang="en-US" dirty="0"/>
-          </a:p>
-          <a:p>
-            <a:pPr algn="ctr"/>
-            <a:r>
-              <a:rPr lang="en-US" dirty="0" smtClean="0"/>
-              <a:t>Please leave this area blank to allow for picture in picture recording</a:t>
-            </a:r>
-          </a:p>
-          <a:p>
-            <a:pPr algn="ctr"/>
             <a:endParaRPr lang="en-US" dirty="0"/>
           </a:p>
         </p:txBody>
@@ -6875,6 +4475,2336 @@
       </p:par>
     </p:tnLst>
   </p:timing>
+</p:sld>
+</file>
+
+<file path=ppt/slides/slide11.xml><?xml version="1.0" encoding="utf-8"?>
+<p:sld xmlns:a="http://schemas.openxmlformats.org/drawingml/2006/main" xmlns:r="http://schemas.openxmlformats.org/officeDocument/2006/relationships" xmlns:p="http://schemas.openxmlformats.org/presentationml/2006/main">
+  <p:cSld>
+    <p:spTree>
+      <p:nvGrpSpPr>
+        <p:cNvPr id="1" name=""/>
+        <p:cNvGrpSpPr/>
+        <p:nvPr/>
+      </p:nvGrpSpPr>
+      <p:grpSpPr>
+        <a:xfrm>
+          <a:off x="0" y="0"/>
+          <a:ext cx="0" cy="0"/>
+          <a:chOff x="0" y="0"/>
+          <a:chExt cx="0" cy="0"/>
+        </a:xfrm>
+      </p:grpSpPr>
+      <p:sp>
+        <p:nvSpPr>
+          <p:cNvPr id="5" name="Text Placeholder 4"/>
+          <p:cNvSpPr>
+            <a:spLocks noGrp="1"/>
+          </p:cNvSpPr>
+          <p:nvPr>
+            <p:ph type="body" sz="quarter" idx="10"/>
+          </p:nvPr>
+        </p:nvSpPr>
+        <p:spPr/>
+        <p:txBody>
+          <a:bodyPr/>
+          <a:lstStyle/>
+          <a:p>
+            <a:r>
+              <a:rPr lang="en-US" dirty="0" smtClean="0"/>
+              <a:t>Web API Design</a:t>
+            </a:r>
+            <a:endParaRPr lang="en-US" dirty="0"/>
+          </a:p>
+        </p:txBody>
+      </p:sp>
+      <p:sp>
+        <p:nvSpPr>
+          <p:cNvPr id="4" name="Subtitle 3"/>
+          <p:cNvSpPr>
+            <a:spLocks noGrp="1"/>
+          </p:cNvSpPr>
+          <p:nvPr>
+            <p:ph type="subTitle" idx="1"/>
+          </p:nvPr>
+        </p:nvSpPr>
+        <p:spPr/>
+        <p:txBody>
+          <a:bodyPr/>
+          <a:lstStyle/>
+          <a:p>
+            <a:r>
+              <a:rPr lang="en-US" dirty="0" smtClean="0"/>
+              <a:t>What this course covers</a:t>
+            </a:r>
+            <a:endParaRPr lang="en-US" dirty="0"/>
+          </a:p>
+        </p:txBody>
+      </p:sp>
+    </p:spTree>
+    <p:extLst>
+      <p:ext uri="{BB962C8B-B14F-4D97-AF65-F5344CB8AC3E}">
+        <p14:creationId xmlns:p14="http://schemas.microsoft.com/office/powerpoint/2010/main" val="3723262408"/>
+      </p:ext>
+    </p:extLst>
+  </p:cSld>
+  <p:clrMapOvr>
+    <a:masterClrMapping/>
+  </p:clrMapOvr>
+</p:sld>
+</file>
+
+<file path=ppt/slides/slide12.xml><?xml version="1.0" encoding="utf-8"?>
+<p:sld xmlns:a="http://schemas.openxmlformats.org/drawingml/2006/main" xmlns:r="http://schemas.openxmlformats.org/officeDocument/2006/relationships" xmlns:p="http://schemas.openxmlformats.org/presentationml/2006/main">
+  <p:cSld>
+    <p:spTree>
+      <p:nvGrpSpPr>
+        <p:cNvPr id="1" name=""/>
+        <p:cNvGrpSpPr/>
+        <p:nvPr/>
+      </p:nvGrpSpPr>
+      <p:grpSpPr>
+        <a:xfrm>
+          <a:off x="0" y="0"/>
+          <a:ext cx="0" cy="0"/>
+          <a:chOff x="0" y="0"/>
+          <a:chExt cx="0" cy="0"/>
+        </a:xfrm>
+      </p:grpSpPr>
+      <p:sp>
+        <p:nvSpPr>
+          <p:cNvPr id="2" name="Title 1"/>
+          <p:cNvSpPr>
+            <a:spLocks noGrp="1"/>
+          </p:cNvSpPr>
+          <p:nvPr>
+            <p:ph type="title"/>
+          </p:nvPr>
+        </p:nvSpPr>
+        <p:spPr/>
+        <p:txBody>
+          <a:bodyPr/>
+          <a:lstStyle/>
+          <a:p>
+            <a:r>
+              <a:rPr lang="en-US" dirty="0" smtClean="0"/>
+              <a:t>But what is Web API design?</a:t>
+            </a:r>
+            <a:endParaRPr lang="en-US" dirty="0"/>
+          </a:p>
+        </p:txBody>
+      </p:sp>
+      <p:sp>
+        <p:nvSpPr>
+          <p:cNvPr id="3" name="Content Placeholder 2"/>
+          <p:cNvSpPr>
+            <a:spLocks noGrp="1"/>
+          </p:cNvSpPr>
+          <p:nvPr>
+            <p:ph sz="quarter" idx="10"/>
+          </p:nvPr>
+        </p:nvSpPr>
+        <p:spPr/>
+        <p:txBody>
+          <a:bodyPr/>
+          <a:lstStyle/>
+          <a:p>
+            <a:r>
+              <a:rPr lang="en-US" dirty="0" smtClean="0"/>
+              <a:t>An intentional approach to building APIs </a:t>
+            </a:r>
+          </a:p>
+          <a:p>
+            <a:r>
+              <a:rPr lang="en-US" dirty="0" smtClean="0"/>
+              <a:t>A “must have” if your APIs will be consumed by third-party services</a:t>
+            </a:r>
+          </a:p>
+          <a:p>
+            <a:r>
+              <a:rPr lang="en-US" dirty="0" smtClean="0"/>
+              <a:t>Attention to details:</a:t>
+            </a:r>
+          </a:p>
+          <a:p>
+            <a:pPr lvl="1"/>
+            <a:r>
+              <a:rPr lang="en-US" dirty="0" smtClean="0"/>
+              <a:t>How consumable is the API (signature, content negotiation)?</a:t>
+            </a:r>
+          </a:p>
+          <a:p>
+            <a:pPr lvl="1"/>
+            <a:r>
+              <a:rPr lang="en-US" dirty="0" smtClean="0"/>
+              <a:t>Does it comply with standards (response codes, etc.)?</a:t>
+            </a:r>
+          </a:p>
+          <a:p>
+            <a:pPr lvl="1"/>
+            <a:r>
+              <a:rPr lang="en-US" dirty="0" smtClean="0"/>
+              <a:t>Is it secure? </a:t>
+            </a:r>
+          </a:p>
+          <a:p>
+            <a:pPr lvl="1"/>
+            <a:r>
+              <a:rPr lang="en-US" dirty="0" smtClean="0"/>
+              <a:t>How do you handle multiple versions? </a:t>
+            </a:r>
+          </a:p>
+          <a:p>
+            <a:pPr lvl="1"/>
+            <a:r>
+              <a:rPr lang="en-US" dirty="0" smtClean="0"/>
+              <a:t>Is it truly RESTful?</a:t>
+            </a:r>
+          </a:p>
+        </p:txBody>
+      </p:sp>
+    </p:spTree>
+    <p:extLst>
+      <p:ext uri="{BB962C8B-B14F-4D97-AF65-F5344CB8AC3E}">
+        <p14:creationId xmlns:p14="http://schemas.microsoft.com/office/powerpoint/2010/main" val="2047590724"/>
+      </p:ext>
+    </p:extLst>
+  </p:cSld>
+  <p:clrMapOvr>
+    <a:masterClrMapping/>
+  </p:clrMapOvr>
+  <p:timing>
+    <p:tnLst>
+      <p:par>
+        <p:cTn id="1" dur="indefinite" restart="never" nodeType="tmRoot"/>
+      </p:par>
+    </p:tnLst>
+  </p:timing>
+</p:sld>
+</file>
+
+<file path=ppt/slides/slide13.xml><?xml version="1.0" encoding="utf-8"?>
+<p:sld xmlns:a="http://schemas.openxmlformats.org/drawingml/2006/main" xmlns:r="http://schemas.openxmlformats.org/officeDocument/2006/relationships" xmlns:p="http://schemas.openxmlformats.org/presentationml/2006/main">
+  <p:cSld>
+    <p:spTree>
+      <p:nvGrpSpPr>
+        <p:cNvPr id="1" name=""/>
+        <p:cNvGrpSpPr/>
+        <p:nvPr/>
+      </p:nvGrpSpPr>
+      <p:grpSpPr>
+        <a:xfrm>
+          <a:off x="0" y="0"/>
+          <a:ext cx="0" cy="0"/>
+          <a:chOff x="0" y="0"/>
+          <a:chExt cx="0" cy="0"/>
+        </a:xfrm>
+      </p:grpSpPr>
+      <p:sp>
+        <p:nvSpPr>
+          <p:cNvPr id="5" name="Text Placeholder 4"/>
+          <p:cNvSpPr>
+            <a:spLocks noGrp="1"/>
+          </p:cNvSpPr>
+          <p:nvPr>
+            <p:ph type="body" sz="quarter" idx="10"/>
+          </p:nvPr>
+        </p:nvSpPr>
+        <p:spPr/>
+        <p:txBody>
+          <a:bodyPr/>
+          <a:lstStyle/>
+          <a:p>
+            <a:r>
+              <a:rPr lang="en-US" dirty="0" smtClean="0"/>
+              <a:t>REST</a:t>
+            </a:r>
+            <a:endParaRPr lang="en-US" dirty="0"/>
+          </a:p>
+        </p:txBody>
+      </p:sp>
+      <p:sp>
+        <p:nvSpPr>
+          <p:cNvPr id="4" name="Subtitle 3"/>
+          <p:cNvSpPr>
+            <a:spLocks noGrp="1"/>
+          </p:cNvSpPr>
+          <p:nvPr>
+            <p:ph type="subTitle" idx="1"/>
+          </p:nvPr>
+        </p:nvSpPr>
+        <p:spPr/>
+        <p:txBody>
+          <a:bodyPr/>
+          <a:lstStyle/>
+          <a:p>
+            <a:r>
+              <a:rPr lang="en-US" dirty="0" smtClean="0"/>
+              <a:t>Introduction and overview of Representational State Transfer</a:t>
+            </a:r>
+            <a:endParaRPr lang="en-US" dirty="0"/>
+          </a:p>
+        </p:txBody>
+      </p:sp>
+    </p:spTree>
+    <p:extLst>
+      <p:ext uri="{BB962C8B-B14F-4D97-AF65-F5344CB8AC3E}">
+        <p14:creationId xmlns:p14="http://schemas.microsoft.com/office/powerpoint/2010/main" val="1859531728"/>
+      </p:ext>
+    </p:extLst>
+  </p:cSld>
+  <p:clrMapOvr>
+    <a:masterClrMapping/>
+  </p:clrMapOvr>
+</p:sld>
+</file>
+
+<file path=ppt/slides/slide14.xml><?xml version="1.0" encoding="utf-8"?>
+<p:sld xmlns:a="http://schemas.openxmlformats.org/drawingml/2006/main" xmlns:r="http://schemas.openxmlformats.org/officeDocument/2006/relationships" xmlns:p="http://schemas.openxmlformats.org/presentationml/2006/main">
+  <p:cSld>
+    <p:spTree>
+      <p:nvGrpSpPr>
+        <p:cNvPr id="1" name=""/>
+        <p:cNvGrpSpPr/>
+        <p:nvPr/>
+      </p:nvGrpSpPr>
+      <p:grpSpPr>
+        <a:xfrm>
+          <a:off x="0" y="0"/>
+          <a:ext cx="0" cy="0"/>
+          <a:chOff x="0" y="0"/>
+          <a:chExt cx="0" cy="0"/>
+        </a:xfrm>
+      </p:grpSpPr>
+      <p:sp>
+        <p:nvSpPr>
+          <p:cNvPr id="2" name="Title 1"/>
+          <p:cNvSpPr>
+            <a:spLocks noGrp="1"/>
+          </p:cNvSpPr>
+          <p:nvPr>
+            <p:ph type="title"/>
+          </p:nvPr>
+        </p:nvSpPr>
+        <p:spPr/>
+        <p:txBody>
+          <a:bodyPr/>
+          <a:lstStyle/>
+          <a:p>
+            <a:r>
+              <a:rPr lang="en-US" b="1" dirty="0" smtClean="0">
+                <a:solidFill>
+                  <a:srgbClr val="FF0000"/>
+                </a:solidFill>
+              </a:rPr>
+              <a:t>Re</a:t>
+            </a:r>
+            <a:r>
+              <a:rPr lang="en-US" dirty="0" smtClean="0"/>
+              <a:t>presentational </a:t>
+            </a:r>
+            <a:r>
+              <a:rPr lang="en-US" b="1" dirty="0" smtClean="0">
+                <a:solidFill>
+                  <a:srgbClr val="FF0000"/>
+                </a:solidFill>
+              </a:rPr>
+              <a:t>S</a:t>
+            </a:r>
+            <a:r>
+              <a:rPr lang="en-US" dirty="0" smtClean="0"/>
+              <a:t>tate </a:t>
+            </a:r>
+            <a:r>
+              <a:rPr lang="en-US" b="1" dirty="0" smtClean="0">
+                <a:solidFill>
+                  <a:srgbClr val="FF0000"/>
+                </a:solidFill>
+              </a:rPr>
+              <a:t>T</a:t>
+            </a:r>
+            <a:r>
+              <a:rPr lang="en-US" dirty="0" smtClean="0"/>
+              <a:t>ransfer (REST) </a:t>
+            </a:r>
+            <a:endParaRPr lang="en-US" dirty="0"/>
+          </a:p>
+        </p:txBody>
+      </p:sp>
+      <p:sp>
+        <p:nvSpPr>
+          <p:cNvPr id="3" name="Content Placeholder 2"/>
+          <p:cNvSpPr>
+            <a:spLocks noGrp="1"/>
+          </p:cNvSpPr>
+          <p:nvPr>
+            <p:ph sz="quarter" idx="10"/>
+          </p:nvPr>
+        </p:nvSpPr>
+        <p:spPr/>
+        <p:txBody>
+          <a:bodyPr/>
+          <a:lstStyle/>
+          <a:p>
+            <a:r>
+              <a:rPr lang="en-US" dirty="0" smtClean="0"/>
+              <a:t>Client-server </a:t>
+            </a:r>
+          </a:p>
+          <a:p>
+            <a:r>
+              <a:rPr lang="en-US" dirty="0" smtClean="0"/>
+              <a:t>Stateless </a:t>
+            </a:r>
+          </a:p>
+          <a:p>
+            <a:r>
+              <a:rPr lang="en-US" dirty="0" smtClean="0"/>
+              <a:t>Resource-based (vs. remote </a:t>
+            </a:r>
+            <a:r>
+              <a:rPr lang="en-US" i="1" dirty="0" smtClean="0"/>
+              <a:t>procedure call</a:t>
+            </a:r>
+            <a:r>
+              <a:rPr lang="en-US" dirty="0" smtClean="0"/>
+              <a:t>) </a:t>
+            </a:r>
+          </a:p>
+          <a:p>
+            <a:r>
+              <a:rPr lang="en-US" dirty="0" smtClean="0"/>
+              <a:t>HTTP methods (GET, POST, PUT, DELETE) </a:t>
+            </a:r>
+          </a:p>
+          <a:p>
+            <a:r>
+              <a:rPr lang="en-US" dirty="0" err="1" smtClean="0"/>
+              <a:t>Indempotency</a:t>
+            </a:r>
+            <a:r>
+              <a:rPr lang="en-US" dirty="0" smtClean="0"/>
+              <a:t> and side effects</a:t>
+            </a:r>
+          </a:p>
+          <a:p>
+            <a:r>
+              <a:rPr lang="en-US" dirty="0" smtClean="0"/>
+              <a:t>It’s a style, not a standard</a:t>
+            </a:r>
+          </a:p>
+          <a:p>
+            <a:r>
+              <a:rPr lang="en-US" dirty="0" smtClean="0"/>
+              <a:t>Don’t hate on HATEOAS</a:t>
+            </a:r>
+          </a:p>
+        </p:txBody>
+      </p:sp>
+    </p:spTree>
+    <p:extLst>
+      <p:ext uri="{BB962C8B-B14F-4D97-AF65-F5344CB8AC3E}">
+        <p14:creationId xmlns:p14="http://schemas.microsoft.com/office/powerpoint/2010/main" val="867290118"/>
+      </p:ext>
+    </p:extLst>
+  </p:cSld>
+  <p:clrMapOvr>
+    <a:masterClrMapping/>
+  </p:clrMapOvr>
+  <p:timing>
+    <p:tnLst>
+      <p:par>
+        <p:cTn id="1" dur="indefinite" restart="never" nodeType="tmRoot"/>
+      </p:par>
+    </p:tnLst>
+  </p:timing>
+</p:sld>
+</file>
+
+<file path=ppt/slides/slide15.xml><?xml version="1.0" encoding="utf-8"?>
+<p:sld xmlns:a="http://schemas.openxmlformats.org/drawingml/2006/main" xmlns:r="http://schemas.openxmlformats.org/officeDocument/2006/relationships" xmlns:p="http://schemas.openxmlformats.org/presentationml/2006/main">
+  <p:cSld>
+    <p:spTree>
+      <p:nvGrpSpPr>
+        <p:cNvPr id="1" name=""/>
+        <p:cNvGrpSpPr/>
+        <p:nvPr/>
+      </p:nvGrpSpPr>
+      <p:grpSpPr>
+        <a:xfrm>
+          <a:off x="0" y="0"/>
+          <a:ext cx="0" cy="0"/>
+          <a:chOff x="0" y="0"/>
+          <a:chExt cx="0" cy="0"/>
+        </a:xfrm>
+      </p:grpSpPr>
+      <p:sp>
+        <p:nvSpPr>
+          <p:cNvPr id="5" name="Text Placeholder 4"/>
+          <p:cNvSpPr>
+            <a:spLocks noGrp="1"/>
+          </p:cNvSpPr>
+          <p:nvPr>
+            <p:ph type="body" sz="quarter" idx="10"/>
+          </p:nvPr>
+        </p:nvSpPr>
+        <p:spPr/>
+        <p:txBody>
+          <a:bodyPr/>
+          <a:lstStyle/>
+          <a:p>
+            <a:r>
+              <a:rPr lang="en-US" dirty="0" smtClean="0"/>
+              <a:t>HATEOAS</a:t>
+            </a:r>
+            <a:endParaRPr lang="en-US" dirty="0"/>
+          </a:p>
+        </p:txBody>
+      </p:sp>
+      <p:sp>
+        <p:nvSpPr>
+          <p:cNvPr id="4" name="Subtitle 3"/>
+          <p:cNvSpPr>
+            <a:spLocks noGrp="1"/>
+          </p:cNvSpPr>
+          <p:nvPr>
+            <p:ph type="subTitle" idx="1"/>
+          </p:nvPr>
+        </p:nvSpPr>
+        <p:spPr/>
+        <p:txBody>
+          <a:bodyPr/>
+          <a:lstStyle/>
+          <a:p>
+            <a:r>
+              <a:rPr lang="en-US" dirty="0" smtClean="0"/>
+              <a:t>Hypermedia as the Engine of Application State</a:t>
+            </a:r>
+            <a:endParaRPr lang="en-US" dirty="0"/>
+          </a:p>
+        </p:txBody>
+      </p:sp>
+    </p:spTree>
+    <p:extLst>
+      <p:ext uri="{BB962C8B-B14F-4D97-AF65-F5344CB8AC3E}">
+        <p14:creationId xmlns:p14="http://schemas.microsoft.com/office/powerpoint/2010/main" val="1959053333"/>
+      </p:ext>
+    </p:extLst>
+  </p:cSld>
+  <p:clrMapOvr>
+    <a:masterClrMapping/>
+  </p:clrMapOvr>
+</p:sld>
+</file>
+
+<file path=ppt/slides/slide16.xml><?xml version="1.0" encoding="utf-8"?>
+<p:sld xmlns:a="http://schemas.openxmlformats.org/drawingml/2006/main" xmlns:r="http://schemas.openxmlformats.org/officeDocument/2006/relationships" xmlns:p="http://schemas.openxmlformats.org/presentationml/2006/main">
+  <p:cSld>
+    <p:spTree>
+      <p:nvGrpSpPr>
+        <p:cNvPr id="1" name=""/>
+        <p:cNvGrpSpPr/>
+        <p:nvPr/>
+      </p:nvGrpSpPr>
+      <p:grpSpPr>
+        <a:xfrm>
+          <a:off x="0" y="0"/>
+          <a:ext cx="0" cy="0"/>
+          <a:chOff x="0" y="0"/>
+          <a:chExt cx="0" cy="0"/>
+        </a:xfrm>
+      </p:grpSpPr>
+      <p:sp>
+        <p:nvSpPr>
+          <p:cNvPr id="2" name="Title 1"/>
+          <p:cNvSpPr>
+            <a:spLocks noGrp="1"/>
+          </p:cNvSpPr>
+          <p:nvPr>
+            <p:ph type="title"/>
+          </p:nvPr>
+        </p:nvSpPr>
+        <p:spPr>
+          <a:xfrm>
+            <a:off x="379514" y="182215"/>
+            <a:ext cx="9452643" cy="1288366"/>
+          </a:xfrm>
+        </p:spPr>
+        <p:txBody>
+          <a:bodyPr/>
+          <a:lstStyle/>
+          <a:p>
+            <a:r>
+              <a:rPr lang="en-US" b="1" dirty="0" smtClean="0">
+                <a:solidFill>
+                  <a:srgbClr val="FF0000"/>
+                </a:solidFill>
+              </a:rPr>
+              <a:t>H</a:t>
+            </a:r>
+            <a:r>
+              <a:rPr lang="en-US" b="1" dirty="0" smtClean="0"/>
+              <a:t>ypermedia </a:t>
+            </a:r>
+            <a:r>
+              <a:rPr lang="en-US" b="1" dirty="0" smtClean="0">
+                <a:solidFill>
+                  <a:srgbClr val="FF0000"/>
+                </a:solidFill>
+              </a:rPr>
+              <a:t>a</a:t>
+            </a:r>
+            <a:r>
+              <a:rPr lang="en-US" b="1" dirty="0" smtClean="0"/>
+              <a:t>s </a:t>
+            </a:r>
+            <a:r>
+              <a:rPr lang="en-US" b="1" dirty="0" smtClean="0">
+                <a:solidFill>
+                  <a:srgbClr val="FF0000"/>
+                </a:solidFill>
+              </a:rPr>
+              <a:t>t</a:t>
+            </a:r>
+            <a:r>
+              <a:rPr lang="en-US" b="1" dirty="0" smtClean="0"/>
+              <a:t>he </a:t>
+            </a:r>
+            <a:r>
+              <a:rPr lang="en-US" b="1" dirty="0" smtClean="0">
+                <a:solidFill>
+                  <a:srgbClr val="FF0000"/>
+                </a:solidFill>
+              </a:rPr>
+              <a:t>E</a:t>
+            </a:r>
+            <a:r>
+              <a:rPr lang="en-US" b="1" dirty="0" smtClean="0"/>
+              <a:t>ngine </a:t>
+            </a:r>
+            <a:r>
+              <a:rPr lang="en-US" b="1" dirty="0" smtClean="0">
+                <a:solidFill>
+                  <a:srgbClr val="FF0000"/>
+                </a:solidFill>
+              </a:rPr>
+              <a:t>o</a:t>
+            </a:r>
+            <a:r>
+              <a:rPr lang="en-US" b="1" dirty="0" smtClean="0"/>
+              <a:t>f </a:t>
+            </a:r>
+            <a:r>
+              <a:rPr lang="en-US" b="1" dirty="0" smtClean="0">
+                <a:solidFill>
+                  <a:srgbClr val="FF0000"/>
+                </a:solidFill>
+              </a:rPr>
+              <a:t>A</a:t>
+            </a:r>
+            <a:r>
+              <a:rPr lang="en-US" b="1" dirty="0" smtClean="0"/>
+              <a:t>pplication </a:t>
+            </a:r>
+            <a:r>
+              <a:rPr lang="en-US" b="1" dirty="0" smtClean="0">
+                <a:solidFill>
+                  <a:srgbClr val="FF0000"/>
+                </a:solidFill>
+              </a:rPr>
+              <a:t>S</a:t>
+            </a:r>
+            <a:r>
+              <a:rPr lang="en-US" b="1" dirty="0" smtClean="0"/>
+              <a:t>tate</a:t>
+            </a:r>
+            <a:r>
+              <a:rPr lang="en-US" dirty="0" smtClean="0"/>
+              <a:t> (HATEOAS)</a:t>
+            </a:r>
+            <a:endParaRPr lang="en-US" dirty="0"/>
+          </a:p>
+        </p:txBody>
+      </p:sp>
+      <p:sp>
+        <p:nvSpPr>
+          <p:cNvPr id="3" name="Content Placeholder 2"/>
+          <p:cNvSpPr>
+            <a:spLocks noGrp="1"/>
+          </p:cNvSpPr>
+          <p:nvPr>
+            <p:ph sz="quarter" idx="10"/>
+          </p:nvPr>
+        </p:nvSpPr>
+        <p:spPr/>
+        <p:txBody>
+          <a:bodyPr/>
+          <a:lstStyle/>
+          <a:p>
+            <a:r>
+              <a:rPr lang="en-US" dirty="0" smtClean="0"/>
+              <a:t>Hypermedia is the key</a:t>
+            </a:r>
+          </a:p>
+          <a:p>
+            <a:r>
+              <a:rPr lang="en-US" dirty="0" smtClean="0"/>
+              <a:t>It all starts at a URL</a:t>
+            </a:r>
+          </a:p>
+          <a:p>
+            <a:r>
+              <a:rPr lang="en-US" dirty="0" smtClean="0"/>
+              <a:t>Resources are returned </a:t>
+            </a:r>
+          </a:p>
+          <a:p>
+            <a:r>
+              <a:rPr lang="en-US" dirty="0" smtClean="0"/>
+              <a:t>Media types and locations are included</a:t>
+            </a:r>
+          </a:p>
+          <a:p>
+            <a:r>
+              <a:rPr lang="en-US" dirty="0" smtClean="0"/>
+              <a:t>References based on state </a:t>
+            </a:r>
+          </a:p>
+        </p:txBody>
+      </p:sp>
+    </p:spTree>
+    <p:extLst>
+      <p:ext uri="{BB962C8B-B14F-4D97-AF65-F5344CB8AC3E}">
+        <p14:creationId xmlns:p14="http://schemas.microsoft.com/office/powerpoint/2010/main" val="920491971"/>
+      </p:ext>
+    </p:extLst>
+  </p:cSld>
+  <p:clrMapOvr>
+    <a:masterClrMapping/>
+  </p:clrMapOvr>
+  <p:timing>
+    <p:tnLst>
+      <p:par>
+        <p:cTn id="1" dur="indefinite" restart="never" nodeType="tmRoot"/>
+      </p:par>
+    </p:tnLst>
+  </p:timing>
+</p:sld>
+</file>
+
+<file path=ppt/slides/slide17.xml><?xml version="1.0" encoding="utf-8"?>
+<p:sld xmlns:a="http://schemas.openxmlformats.org/drawingml/2006/main" xmlns:r="http://schemas.openxmlformats.org/officeDocument/2006/relationships" xmlns:p="http://schemas.openxmlformats.org/presentationml/2006/main">
+  <p:cSld>
+    <p:spTree>
+      <p:nvGrpSpPr>
+        <p:cNvPr id="1" name=""/>
+        <p:cNvGrpSpPr/>
+        <p:nvPr/>
+      </p:nvGrpSpPr>
+      <p:grpSpPr>
+        <a:xfrm>
+          <a:off x="0" y="0"/>
+          <a:ext cx="0" cy="0"/>
+          <a:chOff x="0" y="0"/>
+          <a:chExt cx="0" cy="0"/>
+        </a:xfrm>
+      </p:grpSpPr>
+      <p:sp>
+        <p:nvSpPr>
+          <p:cNvPr id="2" name="Title 1"/>
+          <p:cNvSpPr>
+            <a:spLocks noGrp="1"/>
+          </p:cNvSpPr>
+          <p:nvPr>
+            <p:ph type="title"/>
+          </p:nvPr>
+        </p:nvSpPr>
+        <p:spPr/>
+        <p:txBody>
+          <a:bodyPr/>
+          <a:lstStyle/>
+          <a:p>
+            <a:r>
+              <a:rPr lang="en-US" b="1" dirty="0" smtClean="0"/>
+              <a:t>REST and HATEOAS in Action</a:t>
+            </a:r>
+            <a:endParaRPr lang="en-US" dirty="0"/>
+          </a:p>
+        </p:txBody>
+      </p:sp>
+    </p:spTree>
+    <p:extLst>
+      <p:ext uri="{BB962C8B-B14F-4D97-AF65-F5344CB8AC3E}">
+        <p14:creationId xmlns:p14="http://schemas.microsoft.com/office/powerpoint/2010/main" val="2016122624"/>
+      </p:ext>
+    </p:extLst>
+  </p:cSld>
+  <p:clrMapOvr>
+    <a:masterClrMapping/>
+  </p:clrMapOvr>
+  <p:timing>
+    <p:tnLst>
+      <p:par>
+        <p:cTn id="1" dur="indefinite" restart="never" nodeType="tmRoot"/>
+      </p:par>
+    </p:tnLst>
+  </p:timing>
+</p:sld>
+</file>
+
+<file path=ppt/slides/slide18.xml><?xml version="1.0" encoding="utf-8"?>
+<p:sld xmlns:a="http://schemas.openxmlformats.org/drawingml/2006/main" xmlns:r="http://schemas.openxmlformats.org/officeDocument/2006/relationships" xmlns:p="http://schemas.openxmlformats.org/presentationml/2006/main">
+  <p:cSld>
+    <p:spTree>
+      <p:nvGrpSpPr>
+        <p:cNvPr id="1" name=""/>
+        <p:cNvGrpSpPr/>
+        <p:nvPr/>
+      </p:nvGrpSpPr>
+      <p:grpSpPr>
+        <a:xfrm>
+          <a:off x="0" y="0"/>
+          <a:ext cx="0" cy="0"/>
+          <a:chOff x="0" y="0"/>
+          <a:chExt cx="0" cy="0"/>
+        </a:xfrm>
+      </p:grpSpPr>
+      <p:sp>
+        <p:nvSpPr>
+          <p:cNvPr id="5" name="Text Placeholder 4"/>
+          <p:cNvSpPr>
+            <a:spLocks noGrp="1"/>
+          </p:cNvSpPr>
+          <p:nvPr>
+            <p:ph type="body" sz="quarter" idx="10"/>
+          </p:nvPr>
+        </p:nvSpPr>
+        <p:spPr/>
+        <p:txBody>
+          <a:bodyPr/>
+          <a:lstStyle/>
+          <a:p>
+            <a:r>
+              <a:rPr lang="en-US" dirty="0" smtClean="0"/>
+              <a:t>Scaffolding</a:t>
+            </a:r>
+            <a:endParaRPr lang="en-US" dirty="0"/>
+          </a:p>
+        </p:txBody>
+      </p:sp>
+      <p:sp>
+        <p:nvSpPr>
+          <p:cNvPr id="4" name="Subtitle 3"/>
+          <p:cNvSpPr>
+            <a:spLocks noGrp="1"/>
+          </p:cNvSpPr>
+          <p:nvPr>
+            <p:ph type="subTitle" idx="1"/>
+          </p:nvPr>
+        </p:nvSpPr>
+        <p:spPr/>
+        <p:txBody>
+          <a:bodyPr/>
+          <a:lstStyle/>
+          <a:p>
+            <a:r>
+              <a:rPr lang="en-US" dirty="0" smtClean="0"/>
+              <a:t>Generation of Web API projects out of the box with Visual Studio</a:t>
+            </a:r>
+            <a:endParaRPr lang="en-US" dirty="0"/>
+          </a:p>
+        </p:txBody>
+      </p:sp>
+    </p:spTree>
+    <p:extLst>
+      <p:ext uri="{BB962C8B-B14F-4D97-AF65-F5344CB8AC3E}">
+        <p14:creationId xmlns:p14="http://schemas.microsoft.com/office/powerpoint/2010/main" val="2418095642"/>
+      </p:ext>
+    </p:extLst>
+  </p:cSld>
+  <p:clrMapOvr>
+    <a:masterClrMapping/>
+  </p:clrMapOvr>
+</p:sld>
+</file>
+
+<file path=ppt/slides/slide19.xml><?xml version="1.0" encoding="utf-8"?>
+<p:sld xmlns:a="http://schemas.openxmlformats.org/drawingml/2006/main" xmlns:r="http://schemas.openxmlformats.org/officeDocument/2006/relationships" xmlns:p="http://schemas.openxmlformats.org/presentationml/2006/main">
+  <p:cSld>
+    <p:spTree>
+      <p:nvGrpSpPr>
+        <p:cNvPr id="1" name=""/>
+        <p:cNvGrpSpPr/>
+        <p:nvPr/>
+      </p:nvGrpSpPr>
+      <p:grpSpPr>
+        <a:xfrm>
+          <a:off x="0" y="0"/>
+          <a:ext cx="0" cy="0"/>
+          <a:chOff x="0" y="0"/>
+          <a:chExt cx="0" cy="0"/>
+        </a:xfrm>
+      </p:grpSpPr>
+      <p:sp>
+        <p:nvSpPr>
+          <p:cNvPr id="2" name="Title 1"/>
+          <p:cNvSpPr>
+            <a:spLocks noGrp="1"/>
+          </p:cNvSpPr>
+          <p:nvPr>
+            <p:ph type="title"/>
+          </p:nvPr>
+        </p:nvSpPr>
+        <p:spPr/>
+        <p:txBody>
+          <a:bodyPr/>
+          <a:lstStyle/>
+          <a:p>
+            <a:r>
+              <a:rPr lang="en-US" b="1" dirty="0" smtClean="0"/>
+              <a:t>Scaffolding</a:t>
+            </a:r>
+            <a:endParaRPr lang="en-US" dirty="0"/>
+          </a:p>
+        </p:txBody>
+      </p:sp>
+    </p:spTree>
+    <p:extLst>
+      <p:ext uri="{BB962C8B-B14F-4D97-AF65-F5344CB8AC3E}">
+        <p14:creationId xmlns:p14="http://schemas.microsoft.com/office/powerpoint/2010/main" val="2477759453"/>
+      </p:ext>
+    </p:extLst>
+  </p:cSld>
+  <p:clrMapOvr>
+    <a:masterClrMapping/>
+  </p:clrMapOvr>
+  <p:timing>
+    <p:tnLst>
+      <p:par>
+        <p:cTn id="1" dur="indefinite" restart="never" nodeType="tmRoot"/>
+      </p:par>
+    </p:tnLst>
+  </p:timing>
+</p:sld>
+</file>
+
+<file path=ppt/slides/slide2.xml><?xml version="1.0" encoding="utf-8"?>
+<p:sld xmlns:a="http://schemas.openxmlformats.org/drawingml/2006/main" xmlns:r="http://schemas.openxmlformats.org/officeDocument/2006/relationships" xmlns:p="http://schemas.openxmlformats.org/presentationml/2006/main">
+  <p:cSld>
+    <p:spTree>
+      <p:nvGrpSpPr>
+        <p:cNvPr id="1" name=""/>
+        <p:cNvGrpSpPr/>
+        <p:nvPr/>
+      </p:nvGrpSpPr>
+      <p:grpSpPr>
+        <a:xfrm>
+          <a:off x="0" y="0"/>
+          <a:ext cx="0" cy="0"/>
+          <a:chOff x="0" y="0"/>
+          <a:chExt cx="0" cy="0"/>
+        </a:xfrm>
+      </p:grpSpPr>
+      <p:sp>
+        <p:nvSpPr>
+          <p:cNvPr id="2" name="Title 1"/>
+          <p:cNvSpPr>
+            <a:spLocks noGrp="1"/>
+          </p:cNvSpPr>
+          <p:nvPr>
+            <p:ph type="title"/>
+          </p:nvPr>
+        </p:nvSpPr>
+        <p:spPr/>
+        <p:txBody>
+          <a:bodyPr/>
+          <a:lstStyle/>
+          <a:p>
+            <a:r>
+              <a:rPr lang="en-US" dirty="0" smtClean="0"/>
+              <a:t>Meet Jeremy Likness | ‏@</a:t>
+            </a:r>
+            <a:r>
+              <a:rPr lang="en-US" dirty="0" err="1" smtClean="0"/>
+              <a:t>jeremylikness</a:t>
+            </a:r>
+            <a:r>
+              <a:rPr lang="en-US" dirty="0" smtClean="0"/>
+              <a:t> </a:t>
+            </a:r>
+            <a:endParaRPr lang="en-US" dirty="0"/>
+          </a:p>
+        </p:txBody>
+      </p:sp>
+      <p:sp>
+        <p:nvSpPr>
+          <p:cNvPr id="7" name="Content Placeholder 6"/>
+          <p:cNvSpPr>
+            <a:spLocks noGrp="1"/>
+          </p:cNvSpPr>
+          <p:nvPr>
+            <p:ph idx="10"/>
+          </p:nvPr>
+        </p:nvSpPr>
+        <p:spPr/>
+        <p:txBody>
+          <a:bodyPr/>
+          <a:lstStyle/>
+          <a:p>
+            <a:r>
+              <a:rPr lang="en-US" dirty="0" smtClean="0"/>
+              <a:t>Principal Architect at iVision</a:t>
+            </a:r>
+          </a:p>
+          <a:p>
+            <a:pPr lvl="1"/>
+            <a:r>
+              <a:rPr lang="en-US" dirty="0" smtClean="0"/>
+              <a:t>Focused on Microsoft stack Enterprise Applications</a:t>
+            </a:r>
+          </a:p>
+          <a:p>
+            <a:pPr lvl="1"/>
+            <a:r>
+              <a:rPr lang="en-US" dirty="0" smtClean="0">
+                <a:hlinkClick r:id="rId3"/>
+              </a:rPr>
+              <a:t>http://csharperimage.jeremylikness.com/</a:t>
+            </a:r>
+            <a:r>
+              <a:rPr lang="en-US" dirty="0" smtClean="0"/>
+              <a:t> </a:t>
+            </a:r>
+          </a:p>
+          <a:p>
+            <a:pPr lvl="1"/>
+            <a:r>
+              <a:rPr lang="en-US" dirty="0" smtClean="0"/>
+              <a:t>Former Certified Fitness Trainer and Specialist in Performance Nutrition   </a:t>
+            </a:r>
+          </a:p>
+          <a:p>
+            <a:r>
+              <a:rPr lang="en-US" dirty="0" smtClean="0"/>
+              <a:t>Over 20 Years of Professional Experience </a:t>
+            </a:r>
+          </a:p>
+          <a:p>
+            <a:pPr lvl="1"/>
+            <a:r>
+              <a:rPr lang="en-US" dirty="0" smtClean="0"/>
+              <a:t>4-time Author incl. Programming the Windows Runtime by Example</a:t>
+            </a:r>
+          </a:p>
+          <a:p>
+            <a:pPr lvl="1"/>
+            <a:r>
+              <a:rPr lang="en-US" dirty="0" smtClean="0"/>
+              <a:t>Prolific speaker at conferences including </a:t>
+            </a:r>
+            <a:r>
+              <a:rPr lang="en-US" dirty="0" err="1" smtClean="0"/>
+              <a:t>DevLink</a:t>
+            </a:r>
+            <a:r>
+              <a:rPr lang="en-US" dirty="0" smtClean="0"/>
+              <a:t>, CodeStock, and the Microsoft Worldwide Partner Conference </a:t>
+            </a:r>
+          </a:p>
+          <a:p>
+            <a:pPr lvl="1"/>
+            <a:r>
+              <a:rPr lang="en-US" dirty="0" smtClean="0"/>
+              <a:t>5 Year Microsoft Most Valuable Professional (MVP)</a:t>
+            </a:r>
+          </a:p>
+          <a:p>
+            <a:pPr lvl="1"/>
+            <a:r>
+              <a:rPr lang="en-US" dirty="0" smtClean="0"/>
+              <a:t>9-Ball player</a:t>
+            </a:r>
+          </a:p>
+        </p:txBody>
+      </p:sp>
+      <p:pic>
+        <p:nvPicPr>
+          <p:cNvPr id="5" name="Picture 4"/>
+          <p:cNvPicPr/>
+          <p:nvPr/>
+        </p:nvPicPr>
+        <p:blipFill>
+          <a:blip r:embed="rId4">
+            <a:extLst>
+              <a:ext uri="{28A0092B-C50C-407E-A947-70E740481C1C}">
+                <a14:useLocalDpi xmlns:a14="http://schemas.microsoft.com/office/drawing/2010/main" val="0"/>
+              </a:ext>
+            </a:extLst>
+          </a:blip>
+          <a:stretch>
+            <a:fillRect/>
+          </a:stretch>
+        </p:blipFill>
+        <p:spPr bwMode="auto">
+          <a:xfrm>
+            <a:off x="9703020" y="202030"/>
+            <a:ext cx="2259281" cy="2259281"/>
+          </a:xfrm>
+          <a:prstGeom prst="rect">
+            <a:avLst/>
+          </a:prstGeom>
+          <a:noFill/>
+          <a:ln>
+            <a:solidFill>
+              <a:schemeClr val="tx1"/>
+            </a:solidFill>
+          </a:ln>
+          <a:effectLst>
+            <a:outerShdw blurRad="50800" dist="38100" dir="2700000" algn="tl" rotWithShape="0">
+              <a:prstClr val="black">
+                <a:alpha val="40000"/>
+              </a:prstClr>
+            </a:outerShdw>
+          </a:effectLst>
+        </p:spPr>
+      </p:pic>
+    </p:spTree>
+    <p:extLst>
+      <p:ext uri="{BB962C8B-B14F-4D97-AF65-F5344CB8AC3E}">
+        <p14:creationId xmlns:p14="http://schemas.microsoft.com/office/powerpoint/2010/main" val="4238450048"/>
+      </p:ext>
+    </p:extLst>
+  </p:cSld>
+  <p:clrMapOvr>
+    <a:masterClrMapping/>
+  </p:clrMapOvr>
+  <mc:AlternateContent xmlns:mc="http://schemas.openxmlformats.org/markup-compatibility/2006" xmlns:p14="http://schemas.microsoft.com/office/powerpoint/2010/main">
+    <mc:Choice Requires="p14">
+      <p:transition spd="slow" p14:dur="2000"/>
+    </mc:Choice>
+    <mc:Fallback xmlns="">
+      <p:transition spd="slow"/>
+    </mc:Fallback>
+  </mc:AlternateContent>
+  <p:timing>
+    <p:tnLst>
+      <p:par>
+        <p:cTn id="1" dur="indefinite" restart="never" nodeType="tmRoot"/>
+      </p:par>
+    </p:tnLst>
+  </p:timing>
+</p:sld>
+</file>
+
+<file path=ppt/slides/slide20.xml><?xml version="1.0" encoding="utf-8"?>
+<p:sld xmlns:a="http://schemas.openxmlformats.org/drawingml/2006/main" xmlns:r="http://schemas.openxmlformats.org/officeDocument/2006/relationships" xmlns:p="http://schemas.openxmlformats.org/presentationml/2006/main">
+  <p:cSld>
+    <p:spTree>
+      <p:nvGrpSpPr>
+        <p:cNvPr id="1" name=""/>
+        <p:cNvGrpSpPr/>
+        <p:nvPr/>
+      </p:nvGrpSpPr>
+      <p:grpSpPr>
+        <a:xfrm>
+          <a:off x="0" y="0"/>
+          <a:ext cx="0" cy="0"/>
+          <a:chOff x="0" y="0"/>
+          <a:chExt cx="0" cy="0"/>
+        </a:xfrm>
+      </p:grpSpPr>
+    </p:spTree>
+    <p:extLst>
+      <p:ext uri="{BB962C8B-B14F-4D97-AF65-F5344CB8AC3E}">
+        <p14:creationId xmlns:p14="http://schemas.microsoft.com/office/powerpoint/2010/main" val="898363405"/>
+      </p:ext>
+    </p:extLst>
+  </p:cSld>
+  <p:clrMapOvr>
+    <a:masterClrMapping/>
+  </p:clrMapOvr>
+  <p:timing>
+    <p:tnLst>
+      <p:par>
+        <p:cTn id="1" dur="indefinite" restart="never" nodeType="tmRoot"/>
+      </p:par>
+    </p:tnLst>
+  </p:timing>
+</p:sld>
+</file>
+
+<file path=ppt/slides/slide3.xml><?xml version="1.0" encoding="utf-8"?>
+<p:sld xmlns:a="http://schemas.openxmlformats.org/drawingml/2006/main" xmlns:r="http://schemas.openxmlformats.org/officeDocument/2006/relationships" xmlns:p="http://schemas.openxmlformats.org/presentationml/2006/main">
+  <p:cSld>
+    <p:spTree>
+      <p:nvGrpSpPr>
+        <p:cNvPr id="1" name=""/>
+        <p:cNvGrpSpPr/>
+        <p:nvPr/>
+      </p:nvGrpSpPr>
+      <p:grpSpPr>
+        <a:xfrm>
+          <a:off x="0" y="0"/>
+          <a:ext cx="0" cy="0"/>
+          <a:chOff x="0" y="0"/>
+          <a:chExt cx="0" cy="0"/>
+        </a:xfrm>
+      </p:grpSpPr>
+      <p:sp>
+        <p:nvSpPr>
+          <p:cNvPr id="2" name="Title 1"/>
+          <p:cNvSpPr>
+            <a:spLocks noGrp="1"/>
+          </p:cNvSpPr>
+          <p:nvPr>
+            <p:ph type="title"/>
+          </p:nvPr>
+        </p:nvSpPr>
+        <p:spPr/>
+        <p:txBody>
+          <a:bodyPr/>
+          <a:lstStyle/>
+          <a:p>
+            <a:r>
+              <a:rPr lang="en-US" dirty="0" smtClean="0"/>
+              <a:t>Meet Christopher Harrison | @</a:t>
+            </a:r>
+            <a:r>
+              <a:rPr lang="en-US" dirty="0" err="1" smtClean="0"/>
+              <a:t>geektrainer</a:t>
+            </a:r>
+            <a:endParaRPr lang="en-US" dirty="0"/>
+          </a:p>
+        </p:txBody>
+      </p:sp>
+      <p:sp>
+        <p:nvSpPr>
+          <p:cNvPr id="7" name="Content Placeholder 6"/>
+          <p:cNvSpPr>
+            <a:spLocks noGrp="1"/>
+          </p:cNvSpPr>
+          <p:nvPr>
+            <p:ph idx="10"/>
+          </p:nvPr>
+        </p:nvSpPr>
+        <p:spPr/>
+        <p:txBody>
+          <a:bodyPr/>
+          <a:lstStyle/>
+          <a:p>
+            <a:r>
+              <a:rPr lang="en-US" dirty="0" smtClean="0"/>
+              <a:t>Principal Program Manager, Microsoft</a:t>
+            </a:r>
+          </a:p>
+          <a:p>
+            <a:pPr lvl="1"/>
+            <a:r>
+              <a:rPr lang="en-US" dirty="0" smtClean="0"/>
+              <a:t>Web developer focused on Windows Azure and ASP.NET</a:t>
+            </a:r>
+          </a:p>
+          <a:p>
+            <a:pPr lvl="1"/>
+            <a:r>
+              <a:rPr lang="en-US" dirty="0" smtClean="0"/>
+              <a:t>Blogging at </a:t>
+            </a:r>
+            <a:r>
+              <a:rPr lang="en-US" dirty="0" smtClean="0">
+                <a:hlinkClick r:id="rId3"/>
+              </a:rPr>
+              <a:t>http://hanselman.com</a:t>
+            </a:r>
+            <a:r>
+              <a:rPr lang="en-US" dirty="0" smtClean="0"/>
+              <a:t> for over a decade</a:t>
+            </a:r>
+          </a:p>
+          <a:p>
+            <a:r>
+              <a:rPr lang="en-US" dirty="0" smtClean="0"/>
+              <a:t>One of Microsoft’s Most Respected Developers</a:t>
+            </a:r>
+          </a:p>
+          <a:p>
+            <a:pPr lvl="1"/>
+            <a:r>
+              <a:rPr lang="en-US" dirty="0" smtClean="0"/>
+              <a:t>Written a number of books and spoken in person to almost a half million developers worldwide</a:t>
+            </a:r>
+          </a:p>
+          <a:p>
+            <a:pPr lvl="1"/>
+            <a:r>
+              <a:rPr lang="en-US" dirty="0" smtClean="0">
+                <a:hlinkClick r:id="rId4"/>
+              </a:rPr>
+              <a:t>http://hanselminutes.com</a:t>
+            </a:r>
+            <a:r>
+              <a:rPr lang="en-US" dirty="0" smtClean="0"/>
+              <a:t> for tech talk</a:t>
+            </a:r>
+          </a:p>
+          <a:p>
+            <a:pPr lvl="1"/>
+            <a:r>
+              <a:rPr lang="en-US" dirty="0" smtClean="0">
+                <a:hlinkClick r:id="rId5"/>
+              </a:rPr>
+              <a:t>http://thisdeveloperslife.com</a:t>
+            </a:r>
+            <a:r>
+              <a:rPr lang="en-US" dirty="0" smtClean="0"/>
+              <a:t> on developers’ lives and loves</a:t>
+            </a:r>
+          </a:p>
+          <a:p>
+            <a:pPr lvl="1"/>
+            <a:r>
+              <a:rPr lang="en-US" dirty="0" smtClean="0">
+                <a:hlinkClick r:id="rId6"/>
+              </a:rPr>
+              <a:t>http://ratchetandthegeek.com</a:t>
+            </a:r>
+            <a:r>
+              <a:rPr lang="en-US" dirty="0" smtClean="0"/>
+              <a:t> for pop culture and tech media</a:t>
+            </a:r>
+          </a:p>
+        </p:txBody>
+      </p:sp>
+      <p:pic>
+        <p:nvPicPr>
+          <p:cNvPr id="3" name="Picture 2"/>
+          <p:cNvPicPr>
+            <a:picLocks noChangeAspect="1"/>
+          </p:cNvPicPr>
+          <p:nvPr/>
+        </p:nvPicPr>
+        <p:blipFill>
+          <a:blip r:embed="rId7">
+            <a:extLst>
+              <a:ext uri="{28A0092B-C50C-407E-A947-70E740481C1C}">
+                <a14:useLocalDpi xmlns:a14="http://schemas.microsoft.com/office/drawing/2010/main" val="0"/>
+              </a:ext>
+            </a:extLst>
+          </a:blip>
+          <a:stretch>
+            <a:fillRect/>
+          </a:stretch>
+        </p:blipFill>
+        <p:spPr>
+          <a:xfrm>
+            <a:off x="10217018" y="110280"/>
+            <a:ext cx="1830521" cy="2125767"/>
+          </a:xfrm>
+          <a:prstGeom prst="rect">
+            <a:avLst/>
+          </a:prstGeom>
+          <a:ln>
+            <a:solidFill>
+              <a:schemeClr val="tx1"/>
+            </a:solidFill>
+          </a:ln>
+          <a:effectLst>
+            <a:outerShdw blurRad="50800" dist="38100" dir="2700000" algn="tl" rotWithShape="0">
+              <a:prstClr val="black">
+                <a:alpha val="40000"/>
+              </a:prstClr>
+            </a:outerShdw>
+          </a:effectLst>
+        </p:spPr>
+      </p:pic>
+    </p:spTree>
+    <p:extLst>
+      <p:ext uri="{BB962C8B-B14F-4D97-AF65-F5344CB8AC3E}">
+        <p14:creationId xmlns:p14="http://schemas.microsoft.com/office/powerpoint/2010/main" val="444521906"/>
+      </p:ext>
+    </p:extLst>
+  </p:cSld>
+  <p:clrMapOvr>
+    <a:masterClrMapping/>
+  </p:clrMapOvr>
+  <mc:AlternateContent xmlns:mc="http://schemas.openxmlformats.org/markup-compatibility/2006" xmlns:p14="http://schemas.microsoft.com/office/powerpoint/2010/main">
+    <mc:Choice Requires="p14">
+      <p:transition spd="slow" p14:dur="2000"/>
+    </mc:Choice>
+    <mc:Fallback xmlns="">
+      <p:transition spd="slow"/>
+    </mc:Fallback>
+  </mc:AlternateContent>
+  <p:timing>
+    <p:tnLst>
+      <p:par>
+        <p:cTn id="1" dur="indefinite" restart="never" nodeType="tmRoot"/>
+      </p:par>
+    </p:tnLst>
+  </p:timing>
+</p:sld>
+</file>
+
+<file path=ppt/slides/slide4.xml><?xml version="1.0" encoding="utf-8"?>
+<p:sld xmlns:a="http://schemas.openxmlformats.org/drawingml/2006/main" xmlns:r="http://schemas.openxmlformats.org/officeDocument/2006/relationships" xmlns:p="http://schemas.openxmlformats.org/presentationml/2006/main">
+  <p:cSld>
+    <p:spTree>
+      <p:nvGrpSpPr>
+        <p:cNvPr id="1" name=""/>
+        <p:cNvGrpSpPr/>
+        <p:nvPr/>
+      </p:nvGrpSpPr>
+      <p:grpSpPr>
+        <a:xfrm>
+          <a:off x="0" y="0"/>
+          <a:ext cx="0" cy="0"/>
+          <a:chOff x="0" y="0"/>
+          <a:chExt cx="0" cy="0"/>
+        </a:xfrm>
+      </p:grpSpPr>
+      <p:sp>
+        <p:nvSpPr>
+          <p:cNvPr id="2" name="Title 1"/>
+          <p:cNvSpPr>
+            <a:spLocks noGrp="1"/>
+          </p:cNvSpPr>
+          <p:nvPr>
+            <p:ph type="title"/>
+          </p:nvPr>
+        </p:nvSpPr>
+        <p:spPr/>
+        <p:txBody>
+          <a:bodyPr>
+            <a:normAutofit/>
+          </a:bodyPr>
+          <a:lstStyle/>
+          <a:p>
+            <a:pPr lvl="0"/>
+            <a:r>
+              <a:rPr lang="en-US" dirty="0" smtClean="0"/>
+              <a:t>Course Topics</a:t>
+            </a:r>
+            <a:endParaRPr lang="en-US" dirty="0"/>
+          </a:p>
+        </p:txBody>
+      </p:sp>
+      <p:graphicFrame>
+        <p:nvGraphicFramePr>
+          <p:cNvPr id="4" name="Content Placeholder 3"/>
+          <p:cNvGraphicFramePr>
+            <a:graphicFrameLocks noGrp="1"/>
+          </p:cNvGraphicFramePr>
+          <p:nvPr>
+            <p:ph sz="quarter" idx="10"/>
+            <p:extLst>
+              <p:ext uri="{D42A27DB-BD31-4B8C-83A1-F6EECF244321}">
+                <p14:modId xmlns:p14="http://schemas.microsoft.com/office/powerpoint/2010/main" val="3547459360"/>
+              </p:ext>
+            </p:extLst>
+          </p:nvPr>
+        </p:nvGraphicFramePr>
+        <p:xfrm>
+          <a:off x="379413" y="1417636"/>
+          <a:ext cx="11525250" cy="3070528"/>
+        </p:xfrm>
+        <a:graphic>
+          <a:graphicData uri="http://schemas.openxmlformats.org/drawingml/2006/table">
+            <a:tbl>
+              <a:tblPr firstRow="1" bandRow="1">
+                <a:tableStyleId>{5C22544A-7EE6-4342-B048-85BDC9FD1C3A}</a:tableStyleId>
+              </a:tblPr>
+              <a:tblGrid>
+                <a:gridCol w="5762625">
+                  <a:extLst>
+                    <a:ext uri="{9D8B030D-6E8A-4147-A177-3AD203B41FA5}">
+                      <a16:colId xmlns="" xmlns:a16="http://schemas.microsoft.com/office/drawing/2014/main" val="1632794655"/>
+                    </a:ext>
+                  </a:extLst>
+                </a:gridCol>
+                <a:gridCol w="5762625">
+                  <a:extLst>
+                    <a:ext uri="{9D8B030D-6E8A-4147-A177-3AD203B41FA5}">
+                      <a16:colId xmlns="" xmlns:a16="http://schemas.microsoft.com/office/drawing/2014/main" val="2011313899"/>
+                    </a:ext>
+                  </a:extLst>
+                </a:gridCol>
+              </a:tblGrid>
+              <a:tr h="767632">
+                <a:tc gridSpan="2">
+                  <a:txBody>
+                    <a:bodyPr/>
+                    <a:lstStyle/>
+                    <a:p>
+                      <a:r>
+                        <a:rPr lang="en-US" sz="3600" dirty="0" smtClean="0">
+                          <a:latin typeface="Segoe UI Light" panose="020B0502040204020203" pitchFamily="34" charset="0"/>
+                          <a:cs typeface="Segoe UI Light" panose="020B0502040204020203" pitchFamily="34" charset="0"/>
+                        </a:rPr>
+                        <a:t>Web</a:t>
+                      </a:r>
+                      <a:r>
+                        <a:rPr lang="en-US" sz="3600" baseline="0" dirty="0" smtClean="0">
+                          <a:latin typeface="Segoe UI Light" panose="020B0502040204020203" pitchFamily="34" charset="0"/>
+                          <a:cs typeface="Segoe UI Light" panose="020B0502040204020203" pitchFamily="34" charset="0"/>
+                        </a:rPr>
+                        <a:t> API Design</a:t>
+                      </a:r>
+                      <a:endParaRPr lang="en-US" sz="3600" dirty="0">
+                        <a:latin typeface="Segoe UI Light" panose="020B0502040204020203" pitchFamily="34" charset="0"/>
+                        <a:cs typeface="Segoe UI Light" panose="020B0502040204020203" pitchFamily="34" charset="0"/>
+                      </a:endParaRPr>
+                    </a:p>
+                  </a:txBody>
+                  <a:tcPr anchor="ctr"/>
+                </a:tc>
+                <a:tc hMerge="1">
+                  <a:txBody>
+                    <a:bodyPr/>
+                    <a:lstStyle/>
+                    <a:p>
+                      <a:endParaRPr lang="en-US" dirty="0"/>
+                    </a:p>
+                  </a:txBody>
+                  <a:tcPr/>
+                </a:tc>
+                <a:extLst>
+                  <a:ext uri="{0D108BD9-81ED-4DB2-BD59-A6C34878D82A}">
+                    <a16:rowId xmlns="" xmlns:a16="http://schemas.microsoft.com/office/drawing/2014/main" val="1789177411"/>
+                  </a:ext>
+                </a:extLst>
+              </a:tr>
+              <a:tr h="767632">
+                <a:tc>
+                  <a:txBody>
+                    <a:bodyPr/>
+                    <a:lstStyle/>
+                    <a:p>
+                      <a:r>
+                        <a:rPr lang="en-US" sz="2400" dirty="0" smtClean="0">
+                          <a:latin typeface="Segoe UI Light" panose="020B0502040204020203" pitchFamily="34" charset="0"/>
+                          <a:cs typeface="Segoe UI Light" panose="020B0502040204020203" pitchFamily="34" charset="0"/>
+                        </a:rPr>
+                        <a:t>01 | Introduction to Web</a:t>
+                      </a:r>
+                      <a:r>
+                        <a:rPr lang="en-US" sz="2400" baseline="0" dirty="0" smtClean="0">
+                          <a:latin typeface="Segoe UI Light" panose="020B0502040204020203" pitchFamily="34" charset="0"/>
+                          <a:cs typeface="Segoe UI Light" panose="020B0502040204020203" pitchFamily="34" charset="0"/>
+                        </a:rPr>
+                        <a:t> API</a:t>
+                      </a:r>
+                      <a:endParaRPr lang="en-US" sz="2400" dirty="0">
+                        <a:latin typeface="Segoe UI Light" panose="020B0502040204020203" pitchFamily="34" charset="0"/>
+                        <a:cs typeface="Segoe UI Light" panose="020B0502040204020203" pitchFamily="34" charset="0"/>
+                      </a:endParaRPr>
+                    </a:p>
+                  </a:txBody>
+                  <a:tcPr anchor="ctr"/>
+                </a:tc>
+                <a:tc>
+                  <a:txBody>
+                    <a:bodyPr/>
+                    <a:lstStyle/>
+                    <a:p>
+                      <a:r>
+                        <a:rPr lang="en-US" sz="2400" dirty="0" smtClean="0">
+                          <a:latin typeface="Segoe UI Light" panose="020B0502040204020203" pitchFamily="34" charset="0"/>
+                          <a:cs typeface="Segoe UI Light" panose="020B0502040204020203" pitchFamily="34" charset="0"/>
+                        </a:rPr>
+                        <a:t>04 | Validation</a:t>
+                      </a:r>
+                      <a:r>
+                        <a:rPr lang="en-US" sz="2400" baseline="0" dirty="0" smtClean="0">
+                          <a:latin typeface="Segoe UI Light" panose="020B0502040204020203" pitchFamily="34" charset="0"/>
+                          <a:cs typeface="Segoe UI Light" panose="020B0502040204020203" pitchFamily="34" charset="0"/>
+                        </a:rPr>
+                        <a:t> and Error Handling</a:t>
+                      </a:r>
+                      <a:r>
+                        <a:rPr lang="en-US" sz="2400" dirty="0" smtClean="0">
+                          <a:latin typeface="Segoe UI Light" panose="020B0502040204020203" pitchFamily="34" charset="0"/>
+                          <a:cs typeface="Segoe UI Light" panose="020B0502040204020203" pitchFamily="34" charset="0"/>
+                        </a:rPr>
+                        <a:t> </a:t>
+                      </a:r>
+                      <a:endParaRPr lang="en-US" sz="2400" dirty="0">
+                        <a:latin typeface="Segoe UI Light" panose="020B0502040204020203" pitchFamily="34" charset="0"/>
+                        <a:cs typeface="Segoe UI Light" panose="020B0502040204020203" pitchFamily="34" charset="0"/>
+                      </a:endParaRPr>
+                    </a:p>
+                  </a:txBody>
+                  <a:tcPr anchor="ctr"/>
+                </a:tc>
+                <a:extLst>
+                  <a:ext uri="{0D108BD9-81ED-4DB2-BD59-A6C34878D82A}">
+                    <a16:rowId xmlns="" xmlns:a16="http://schemas.microsoft.com/office/drawing/2014/main" val="3842815335"/>
+                  </a:ext>
+                </a:extLst>
+              </a:tr>
+              <a:tr h="767632">
+                <a:tc>
+                  <a:txBody>
+                    <a:bodyPr/>
+                    <a:lstStyle/>
+                    <a:p>
+                      <a:r>
+                        <a:rPr lang="en-US" sz="2400" dirty="0" smtClean="0">
+                          <a:latin typeface="Segoe UI Light" panose="020B0502040204020203" pitchFamily="34" charset="0"/>
+                          <a:cs typeface="Segoe UI Light" panose="020B0502040204020203" pitchFamily="34" charset="0"/>
+                        </a:rPr>
+                        <a:t>02 | Basic Web API Design</a:t>
+                      </a:r>
+                      <a:endParaRPr lang="en-US" sz="2400" dirty="0">
+                        <a:latin typeface="Segoe UI Light" panose="020B0502040204020203" pitchFamily="34" charset="0"/>
+                        <a:cs typeface="Segoe UI Light" panose="020B0502040204020203" pitchFamily="34" charset="0"/>
+                      </a:endParaRPr>
+                    </a:p>
+                  </a:txBody>
+                  <a:tcPr anchor="ctr"/>
+                </a:tc>
+                <a:tc>
+                  <a:txBody>
+                    <a:bodyPr/>
+                    <a:lstStyle/>
+                    <a:p>
+                      <a:r>
+                        <a:rPr lang="en-US" sz="2400" dirty="0" smtClean="0">
+                          <a:latin typeface="Segoe UI Light" panose="020B0502040204020203" pitchFamily="34" charset="0"/>
+                          <a:cs typeface="Segoe UI Light" panose="020B0502040204020203" pitchFamily="34" charset="0"/>
+                        </a:rPr>
+                        <a:t>05 | Security </a:t>
+                      </a:r>
+                      <a:endParaRPr lang="en-US" sz="2400" dirty="0">
+                        <a:latin typeface="Segoe UI Light" panose="020B0502040204020203" pitchFamily="34" charset="0"/>
+                        <a:cs typeface="Segoe UI Light" panose="020B0502040204020203" pitchFamily="34" charset="0"/>
+                      </a:endParaRPr>
+                    </a:p>
+                  </a:txBody>
+                  <a:tcPr anchor="ctr"/>
+                </a:tc>
+                <a:extLst>
+                  <a:ext uri="{0D108BD9-81ED-4DB2-BD59-A6C34878D82A}">
+                    <a16:rowId xmlns="" xmlns:a16="http://schemas.microsoft.com/office/drawing/2014/main" val="321066646"/>
+                  </a:ext>
+                </a:extLst>
+              </a:tr>
+              <a:tr h="767632">
+                <a:tc>
+                  <a:txBody>
+                    <a:bodyPr/>
+                    <a:lstStyle/>
+                    <a:p>
+                      <a:pPr marL="0" marR="0" indent="0" algn="l" defTabSz="914088" rtl="0" eaLnBrk="1" fontAlgn="auto" latinLnBrk="0" hangingPunct="1">
+                        <a:lnSpc>
+                          <a:spcPct val="100000"/>
+                        </a:lnSpc>
+                        <a:spcBef>
+                          <a:spcPts val="0"/>
+                        </a:spcBef>
+                        <a:spcAft>
+                          <a:spcPts val="0"/>
+                        </a:spcAft>
+                        <a:buClrTx/>
+                        <a:buSzTx/>
+                        <a:buFontTx/>
+                        <a:buNone/>
+                        <a:tabLst/>
+                        <a:defRPr/>
+                      </a:pPr>
+                      <a:r>
+                        <a:rPr lang="en-US" sz="2400" dirty="0" smtClean="0">
+                          <a:latin typeface="Segoe UI Light" panose="020B0502040204020203" pitchFamily="34" charset="0"/>
+                          <a:cs typeface="Segoe UI Light" panose="020B0502040204020203" pitchFamily="34" charset="0"/>
+                        </a:rPr>
+                        <a:t>03</a:t>
+                      </a:r>
+                      <a:r>
+                        <a:rPr lang="en-US" sz="2400" baseline="0" dirty="0" smtClean="0">
+                          <a:latin typeface="Segoe UI Light" panose="020B0502040204020203" pitchFamily="34" charset="0"/>
+                          <a:cs typeface="Segoe UI Light" panose="020B0502040204020203" pitchFamily="34" charset="0"/>
+                        </a:rPr>
+                        <a:t> | Configuration</a:t>
+                      </a:r>
+                      <a:endParaRPr lang="en-US" sz="2400" dirty="0" smtClean="0">
+                        <a:latin typeface="Segoe UI Light" panose="020B0502040204020203" pitchFamily="34" charset="0"/>
+                        <a:cs typeface="Segoe UI Light" panose="020B0502040204020203" pitchFamily="34" charset="0"/>
+                      </a:endParaRPr>
+                    </a:p>
+                  </a:txBody>
+                  <a:tcPr anchor="ctr"/>
+                </a:tc>
+                <a:tc>
+                  <a:txBody>
+                    <a:bodyPr/>
+                    <a:lstStyle/>
+                    <a:p>
+                      <a:r>
+                        <a:rPr lang="en-US" sz="2400" dirty="0" smtClean="0">
+                          <a:latin typeface="Segoe UI Light" panose="020B0502040204020203" pitchFamily="34" charset="0"/>
+                          <a:cs typeface="Segoe UI Light" panose="020B0502040204020203" pitchFamily="34" charset="0"/>
+                        </a:rPr>
+                        <a:t>06 | Advanced</a:t>
+                      </a:r>
+                      <a:r>
+                        <a:rPr lang="en-US" sz="2400" baseline="0" dirty="0" smtClean="0">
+                          <a:latin typeface="Segoe UI Light" panose="020B0502040204020203" pitchFamily="34" charset="0"/>
+                          <a:cs typeface="Segoe UI Light" panose="020B0502040204020203" pitchFamily="34" charset="0"/>
+                        </a:rPr>
+                        <a:t> Web API Design</a:t>
+                      </a:r>
+                      <a:r>
+                        <a:rPr lang="en-US" sz="2400" dirty="0" smtClean="0">
+                          <a:latin typeface="Segoe UI Light" panose="020B0502040204020203" pitchFamily="34" charset="0"/>
+                          <a:cs typeface="Segoe UI Light" panose="020B0502040204020203" pitchFamily="34" charset="0"/>
+                        </a:rPr>
+                        <a:t> </a:t>
+                      </a:r>
+                      <a:endParaRPr lang="en-US" sz="2400" dirty="0">
+                        <a:latin typeface="Segoe UI Light" panose="020B0502040204020203" pitchFamily="34" charset="0"/>
+                        <a:cs typeface="Segoe UI Light" panose="020B0502040204020203" pitchFamily="34" charset="0"/>
+                      </a:endParaRPr>
+                    </a:p>
+                  </a:txBody>
+                  <a:tcPr anchor="ctr"/>
+                </a:tc>
+                <a:extLst>
+                  <a:ext uri="{0D108BD9-81ED-4DB2-BD59-A6C34878D82A}">
+                    <a16:rowId xmlns="" xmlns:a16="http://schemas.microsoft.com/office/drawing/2014/main" val="3812060533"/>
+                  </a:ext>
+                </a:extLst>
+              </a:tr>
+            </a:tbl>
+          </a:graphicData>
+        </a:graphic>
+      </p:graphicFrame>
+    </p:spTree>
+    <p:extLst>
+      <p:ext uri="{BB962C8B-B14F-4D97-AF65-F5344CB8AC3E}">
+        <p14:creationId xmlns:p14="http://schemas.microsoft.com/office/powerpoint/2010/main" val="4178564752"/>
+      </p:ext>
+    </p:extLst>
+  </p:cSld>
+  <p:clrMapOvr>
+    <a:masterClrMapping/>
+  </p:clrMapOvr>
+  <mc:AlternateContent xmlns:mc="http://schemas.openxmlformats.org/markup-compatibility/2006" xmlns:p14="http://schemas.microsoft.com/office/powerpoint/2010/main">
+    <mc:Choice Requires="p14">
+      <p:transition spd="slow" p14:dur="2000"/>
+    </mc:Choice>
+    <mc:Fallback xmlns="">
+      <p:transition spd="slow"/>
+    </mc:Fallback>
+  </mc:AlternateContent>
+  <p:timing>
+    <p:tnLst>
+      <p:par>
+        <p:cTn id="1" dur="indefinite" restart="never" nodeType="tmRoot"/>
+      </p:par>
+    </p:tnLst>
+  </p:timing>
+</p:sld>
+</file>
+
+<file path=ppt/slides/slide5.xml><?xml version="1.0" encoding="utf-8"?>
+<p:sld xmlns:a="http://schemas.openxmlformats.org/drawingml/2006/main" xmlns:r="http://schemas.openxmlformats.org/officeDocument/2006/relationships" xmlns:p="http://schemas.openxmlformats.org/presentationml/2006/main">
+  <p:cSld>
+    <p:spTree>
+      <p:nvGrpSpPr>
+        <p:cNvPr id="1" name=""/>
+        <p:cNvGrpSpPr/>
+        <p:nvPr/>
+      </p:nvGrpSpPr>
+      <p:grpSpPr>
+        <a:xfrm>
+          <a:off x="0" y="0"/>
+          <a:ext cx="0" cy="0"/>
+          <a:chOff x="0" y="0"/>
+          <a:chExt cx="0" cy="0"/>
+        </a:xfrm>
+      </p:grpSpPr>
+      <p:sp>
+        <p:nvSpPr>
+          <p:cNvPr id="2" name="Title 1"/>
+          <p:cNvSpPr>
+            <a:spLocks noGrp="1"/>
+          </p:cNvSpPr>
+          <p:nvPr>
+            <p:ph type="title"/>
+          </p:nvPr>
+        </p:nvSpPr>
+        <p:spPr/>
+        <p:txBody>
+          <a:bodyPr/>
+          <a:lstStyle/>
+          <a:p>
+            <a:pPr lvl="0"/>
+            <a:r>
+              <a:rPr lang="en-US" smtClean="0"/>
+              <a:t>Setting Expectations</a:t>
+            </a:r>
+            <a:endParaRPr lang="en-US" dirty="0"/>
+          </a:p>
+        </p:txBody>
+      </p:sp>
+      <p:sp>
+        <p:nvSpPr>
+          <p:cNvPr id="3" name="Content Placeholder 2"/>
+          <p:cNvSpPr>
+            <a:spLocks noGrp="1"/>
+          </p:cNvSpPr>
+          <p:nvPr>
+            <p:ph sz="quarter" idx="10"/>
+          </p:nvPr>
+        </p:nvSpPr>
+        <p:spPr/>
+        <p:txBody>
+          <a:bodyPr/>
+          <a:lstStyle/>
+          <a:p>
+            <a:r>
+              <a:rPr lang="en-US" dirty="0" smtClean="0"/>
+              <a:t>Target Audience</a:t>
+            </a:r>
+          </a:p>
+          <a:p>
+            <a:pPr lvl="1"/>
+            <a:r>
+              <a:rPr lang="en-US" dirty="0" smtClean="0"/>
+              <a:t>Web Application Developer</a:t>
+            </a:r>
+          </a:p>
+          <a:p>
+            <a:pPr lvl="1"/>
+            <a:r>
+              <a:rPr lang="en-US" dirty="0" smtClean="0"/>
+              <a:t>Interesting in building </a:t>
+            </a:r>
+            <a:r>
+              <a:rPr lang="en-US" dirty="0"/>
+              <a:t>p</a:t>
+            </a:r>
+            <a:r>
+              <a:rPr lang="en-US" dirty="0" smtClean="0"/>
+              <a:t>ublic-facing RESTful APIs </a:t>
+            </a:r>
+          </a:p>
+          <a:p>
+            <a:pPr lvl="1"/>
+            <a:r>
+              <a:rPr lang="en-US" dirty="0" smtClean="0"/>
+              <a:t>Would like to expand knowledge of Web API design</a:t>
+            </a:r>
+          </a:p>
+          <a:p>
+            <a:r>
+              <a:rPr lang="en-US" dirty="0" smtClean="0"/>
+              <a:t>Suggested Prerequisites/Supporting Material</a:t>
+            </a:r>
+          </a:p>
+          <a:p>
+            <a:pPr lvl="1"/>
+            <a:r>
+              <a:rPr lang="en-US" dirty="0" smtClean="0"/>
+              <a:t>Visual Studio 2013+</a:t>
+            </a:r>
+            <a:endParaRPr lang="en-US" dirty="0"/>
+          </a:p>
+        </p:txBody>
+      </p:sp>
+    </p:spTree>
+    <p:extLst>
+      <p:ext uri="{BB962C8B-B14F-4D97-AF65-F5344CB8AC3E}">
+        <p14:creationId xmlns:p14="http://schemas.microsoft.com/office/powerpoint/2010/main" val="1967407312"/>
+      </p:ext>
+    </p:extLst>
+  </p:cSld>
+  <p:clrMapOvr>
+    <a:masterClrMapping/>
+  </p:clrMapOvr>
+  <p:timing>
+    <p:tnLst>
+      <p:par>
+        <p:cTn id="1" dur="indefinite" restart="never" nodeType="tmRoot"/>
+      </p:par>
+    </p:tnLst>
+  </p:timing>
+</p:sld>
+</file>
+
+<file path=ppt/slides/slide6.xml><?xml version="1.0" encoding="utf-8"?>
+<p:sld xmlns:a="http://schemas.openxmlformats.org/drawingml/2006/main" xmlns:r="http://schemas.openxmlformats.org/officeDocument/2006/relationships" xmlns:p="http://schemas.openxmlformats.org/presentationml/2006/main">
+  <p:cSld>
+    <p:spTree>
+      <p:nvGrpSpPr>
+        <p:cNvPr id="1" name=""/>
+        <p:cNvGrpSpPr/>
+        <p:nvPr/>
+      </p:nvGrpSpPr>
+      <p:grpSpPr>
+        <a:xfrm>
+          <a:off x="0" y="0"/>
+          <a:ext cx="0" cy="0"/>
+          <a:chOff x="0" y="0"/>
+          <a:chExt cx="0" cy="0"/>
+        </a:xfrm>
+      </p:grpSpPr>
+      <p:sp>
+        <p:nvSpPr>
+          <p:cNvPr id="2" name="Content Placeholder 1"/>
+          <p:cNvSpPr>
+            <a:spLocks noGrp="1"/>
+          </p:cNvSpPr>
+          <p:nvPr>
+            <p:ph sz="quarter" idx="10"/>
+          </p:nvPr>
+        </p:nvSpPr>
+        <p:spPr>
+          <a:xfrm>
+            <a:off x="277813" y="1427918"/>
+            <a:ext cx="11525250" cy="5290388"/>
+          </a:xfrm>
+        </p:spPr>
+        <p:txBody>
+          <a:bodyPr/>
+          <a:lstStyle/>
+          <a:p>
+            <a:r>
+              <a:rPr lang="en-US" dirty="0" smtClean="0"/>
+              <a:t>Microsoft Virtual Academy</a:t>
+            </a:r>
+          </a:p>
+          <a:p>
+            <a:pPr lvl="1"/>
+            <a:r>
+              <a:rPr lang="en-US" dirty="0" smtClean="0"/>
+              <a:t>Free online learning tailored for IT Pros and Developers </a:t>
+            </a:r>
+          </a:p>
+          <a:p>
+            <a:pPr lvl="1"/>
+            <a:r>
+              <a:rPr lang="en-US" dirty="0"/>
+              <a:t>Over </a:t>
+            </a:r>
+            <a:r>
+              <a:rPr lang="en-US" dirty="0" smtClean="0"/>
+              <a:t>1M registered users</a:t>
+            </a:r>
+          </a:p>
+          <a:p>
+            <a:pPr lvl="1"/>
+            <a:r>
+              <a:rPr lang="en-US" dirty="0" smtClean="0"/>
+              <a:t>Up-to-date, relevant training on variety of Microsoft products</a:t>
+            </a:r>
+          </a:p>
+          <a:p>
+            <a:r>
+              <a:rPr lang="en-US" dirty="0" smtClean="0"/>
+              <a:t>“Earn while you learn!” </a:t>
+            </a:r>
+          </a:p>
+          <a:p>
+            <a:pPr lvl="1"/>
+            <a:r>
+              <a:rPr lang="en-US" dirty="0" smtClean="0"/>
+              <a:t>Get 50 MVA Points for this event!</a:t>
+            </a:r>
+          </a:p>
+          <a:p>
+            <a:pPr lvl="1"/>
+            <a:r>
+              <a:rPr lang="en-US" dirty="0" smtClean="0"/>
+              <a:t>Visit </a:t>
+            </a:r>
+            <a:r>
+              <a:rPr lang="en-US" dirty="0" smtClean="0">
+                <a:hlinkClick r:id="rId2"/>
+              </a:rPr>
+              <a:t>http://aka.ms/MVA-Voucher</a:t>
+            </a:r>
+            <a:r>
+              <a:rPr lang="en-US" dirty="0" smtClean="0"/>
+              <a:t> </a:t>
+            </a:r>
+          </a:p>
+          <a:p>
+            <a:pPr lvl="1"/>
+            <a:r>
+              <a:rPr lang="en-US" dirty="0" smtClean="0"/>
+              <a:t>Enter this code: </a:t>
+            </a:r>
+            <a:r>
+              <a:rPr lang="en-US" b="1" dirty="0" smtClean="0"/>
+              <a:t>PowerJump1 </a:t>
+            </a:r>
+            <a:r>
+              <a:rPr lang="en-US" dirty="0" smtClean="0"/>
+              <a:t>(expires 8/15/2013)</a:t>
+            </a:r>
+            <a:endParaRPr lang="en-US" dirty="0"/>
+          </a:p>
+        </p:txBody>
+      </p:sp>
+      <p:sp>
+        <p:nvSpPr>
+          <p:cNvPr id="3" name="Title 2"/>
+          <p:cNvSpPr>
+            <a:spLocks noGrp="1"/>
+          </p:cNvSpPr>
+          <p:nvPr>
+            <p:ph type="title"/>
+          </p:nvPr>
+        </p:nvSpPr>
+        <p:spPr>
+          <a:xfrm>
+            <a:off x="-367266" y="182215"/>
+            <a:ext cx="11416266" cy="1063487"/>
+          </a:xfrm>
+        </p:spPr>
+        <p:txBody>
+          <a:bodyPr/>
+          <a:lstStyle/>
+          <a:p>
+            <a:r>
+              <a:rPr lang="en-US" dirty="0" smtClean="0"/>
+              <a:t>     Join the MVA Community!</a:t>
+            </a:r>
+            <a:endParaRPr lang="en-US" dirty="0"/>
+          </a:p>
+        </p:txBody>
+      </p:sp>
+    </p:spTree>
+    <p:extLst>
+      <p:ext uri="{BB962C8B-B14F-4D97-AF65-F5344CB8AC3E}">
+        <p14:creationId xmlns:p14="http://schemas.microsoft.com/office/powerpoint/2010/main" val="3654709363"/>
+      </p:ext>
+    </p:extLst>
+  </p:cSld>
+  <p:clrMapOvr>
+    <a:masterClrMapping/>
+  </p:clrMapOvr>
+  <mc:AlternateContent xmlns:mc="http://schemas.openxmlformats.org/markup-compatibility/2006" xmlns:p14="http://schemas.microsoft.com/office/powerpoint/2010/main">
+    <mc:Choice Requires="p14">
+      <p:transition spd="med" p14:dur="700">
+        <p:fade/>
+      </p:transition>
+    </mc:Choice>
+    <mc:Fallback xmlns="">
+      <p:transition spd="med">
+        <p:fade/>
+      </p:transition>
+    </mc:Fallback>
+  </mc:AlternateContent>
+  <p:timing>
+    <p:tnLst>
+      <p:par>
+        <p:cTn id="1" dur="indefinite" restart="never" nodeType="tmRoot"/>
+      </p:par>
+    </p:tnLst>
+  </p:timing>
+</p:sld>
+</file>
+
+<file path=ppt/slides/slide7.xml><?xml version="1.0" encoding="utf-8"?>
+<p:sld xmlns:a="http://schemas.openxmlformats.org/drawingml/2006/main" xmlns:r="http://schemas.openxmlformats.org/officeDocument/2006/relationships" xmlns:p="http://schemas.openxmlformats.org/presentationml/2006/main">
+  <p:cSld>
+    <p:spTree>
+      <p:nvGrpSpPr>
+        <p:cNvPr id="1" name=""/>
+        <p:cNvGrpSpPr/>
+        <p:nvPr/>
+      </p:nvGrpSpPr>
+      <p:grpSpPr>
+        <a:xfrm>
+          <a:off x="0" y="0"/>
+          <a:ext cx="0" cy="0"/>
+          <a:chOff x="0" y="0"/>
+          <a:chExt cx="0" cy="0"/>
+        </a:xfrm>
+      </p:grpSpPr>
+      <p:sp>
+        <p:nvSpPr>
+          <p:cNvPr id="5" name="Text Placeholder 4"/>
+          <p:cNvSpPr>
+            <a:spLocks noGrp="1"/>
+          </p:cNvSpPr>
+          <p:nvPr>
+            <p:ph type="body" sz="quarter" idx="10"/>
+          </p:nvPr>
+        </p:nvSpPr>
+        <p:spPr>
+          <a:solidFill>
+            <a:srgbClr val="007233"/>
+          </a:solidFill>
+          <a:ln>
+            <a:noFill/>
+          </a:ln>
+        </p:spPr>
+        <p:txBody>
+          <a:bodyPr/>
+          <a:lstStyle/>
+          <a:p>
+            <a:pPr marL="914400" indent="-914400"/>
+            <a:r>
+              <a:rPr lang="en-US" dirty="0" smtClean="0"/>
+              <a:t>01 | Introduction to Web API</a:t>
+            </a:r>
+            <a:endParaRPr lang="en-US" dirty="0"/>
+          </a:p>
+        </p:txBody>
+      </p:sp>
+      <p:sp>
+        <p:nvSpPr>
+          <p:cNvPr id="4" name="Subtitle 3"/>
+          <p:cNvSpPr>
+            <a:spLocks noGrp="1"/>
+          </p:cNvSpPr>
+          <p:nvPr>
+            <p:ph type="subTitle" idx="1"/>
+          </p:nvPr>
+        </p:nvSpPr>
+        <p:spPr/>
+        <p:txBody>
+          <a:bodyPr/>
+          <a:lstStyle/>
+          <a:p>
+            <a:r>
+              <a:rPr lang="en-US" dirty="0" smtClean="0"/>
+              <a:t>Jeremy Likness </a:t>
+            </a:r>
+            <a:r>
+              <a:rPr lang="en-US" dirty="0"/>
+              <a:t>| </a:t>
+            </a:r>
+            <a:r>
+              <a:rPr lang="en-US" dirty="0" smtClean="0"/>
+              <a:t>Principal </a:t>
+            </a:r>
+            <a:r>
+              <a:rPr lang="en-US" dirty="0"/>
+              <a:t>Architect</a:t>
+            </a:r>
+          </a:p>
+          <a:p>
+            <a:r>
+              <a:rPr lang="en-US" dirty="0" smtClean="0"/>
+              <a:t>Christopher Harrison </a:t>
+            </a:r>
+            <a:r>
+              <a:rPr lang="en-US" dirty="0"/>
+              <a:t>| </a:t>
+            </a:r>
+            <a:r>
+              <a:rPr lang="en-US" dirty="0" smtClean="0"/>
+              <a:t>Content Developer</a:t>
+            </a:r>
+            <a:endParaRPr lang="en-US" dirty="0"/>
+          </a:p>
+        </p:txBody>
+      </p:sp>
+    </p:spTree>
+    <p:extLst>
+      <p:ext uri="{BB962C8B-B14F-4D97-AF65-F5344CB8AC3E}">
+        <p14:creationId xmlns:p14="http://schemas.microsoft.com/office/powerpoint/2010/main" val="897692544"/>
+      </p:ext>
+    </p:extLst>
+  </p:cSld>
+  <p:clrMapOvr>
+    <a:masterClrMapping/>
+  </p:clrMapOvr>
+  <p:timing>
+    <p:tnLst>
+      <p:par>
+        <p:cTn id="1" dur="indefinite" restart="never" nodeType="tmRoot"/>
+      </p:par>
+    </p:tnLst>
+  </p:timing>
+</p:sld>
+</file>
+
+<file path=ppt/slides/slide8.xml><?xml version="1.0" encoding="utf-8"?>
+<p:sld xmlns:a="http://schemas.openxmlformats.org/drawingml/2006/main" xmlns:r="http://schemas.openxmlformats.org/officeDocument/2006/relationships" xmlns:p="http://schemas.openxmlformats.org/presentationml/2006/main">
+  <p:cSld>
+    <p:spTree>
+      <p:nvGrpSpPr>
+        <p:cNvPr id="1" name=""/>
+        <p:cNvGrpSpPr/>
+        <p:nvPr/>
+      </p:nvGrpSpPr>
+      <p:grpSpPr>
+        <a:xfrm>
+          <a:off x="0" y="0"/>
+          <a:ext cx="0" cy="0"/>
+          <a:chOff x="0" y="0"/>
+          <a:chExt cx="0" cy="0"/>
+        </a:xfrm>
+      </p:grpSpPr>
+      <p:sp>
+        <p:nvSpPr>
+          <p:cNvPr id="7" name="Content Placeholder 6"/>
+          <p:cNvSpPr>
+            <a:spLocks noGrp="1"/>
+          </p:cNvSpPr>
+          <p:nvPr>
+            <p:ph sz="quarter" idx="10"/>
+          </p:nvPr>
+        </p:nvSpPr>
+        <p:spPr/>
+        <p:txBody>
+          <a:bodyPr>
+            <a:normAutofit/>
+          </a:bodyPr>
+          <a:lstStyle/>
+          <a:p>
+            <a:r>
+              <a:rPr lang="en-GB" dirty="0" smtClean="0"/>
+              <a:t>ASP.NET Web API</a:t>
+            </a:r>
+          </a:p>
+          <a:p>
+            <a:r>
+              <a:rPr lang="en-GB" dirty="0" smtClean="0"/>
+              <a:t>Web API Design</a:t>
+            </a:r>
+          </a:p>
+          <a:p>
+            <a:r>
+              <a:rPr lang="en-GB" dirty="0" smtClean="0"/>
+              <a:t>REST</a:t>
+            </a:r>
+          </a:p>
+          <a:p>
+            <a:r>
+              <a:rPr lang="en-GB" dirty="0" smtClean="0"/>
+              <a:t>HATEOAS</a:t>
+            </a:r>
+          </a:p>
+          <a:p>
+            <a:r>
+              <a:rPr lang="en-GB" dirty="0" smtClean="0"/>
+              <a:t>Scaffolding</a:t>
+            </a:r>
+            <a:endParaRPr lang="en-GB" dirty="0"/>
+          </a:p>
+        </p:txBody>
+      </p:sp>
+      <p:sp>
+        <p:nvSpPr>
+          <p:cNvPr id="2" name="Title 1"/>
+          <p:cNvSpPr>
+            <a:spLocks noGrp="1"/>
+          </p:cNvSpPr>
+          <p:nvPr>
+            <p:ph type="title"/>
+          </p:nvPr>
+        </p:nvSpPr>
+        <p:spPr/>
+        <p:txBody>
+          <a:bodyPr/>
+          <a:lstStyle/>
+          <a:p>
+            <a:r>
+              <a:rPr lang="en-US" smtClean="0"/>
+              <a:t>Module Overview</a:t>
+            </a:r>
+            <a:endParaRPr lang="en-US" dirty="0"/>
+          </a:p>
+        </p:txBody>
+      </p:sp>
+    </p:spTree>
+    <p:extLst>
+      <p:ext uri="{BB962C8B-B14F-4D97-AF65-F5344CB8AC3E}">
+        <p14:creationId xmlns:p14="http://schemas.microsoft.com/office/powerpoint/2010/main" val="318349970"/>
+      </p:ext>
+    </p:extLst>
+  </p:cSld>
+  <p:clrMapOvr>
+    <a:masterClrMapping/>
+  </p:clrMapOvr>
+  <p:timing>
+    <p:tnLst>
+      <p:par>
+        <p:cTn id="1" dur="indefinite" restart="never" nodeType="tmRoot"/>
+      </p:par>
+    </p:tnLst>
+  </p:timing>
+</p:sld>
+</file>
+
+<file path=ppt/slides/slide9.xml><?xml version="1.0" encoding="utf-8"?>
+<p:sld xmlns:a="http://schemas.openxmlformats.org/drawingml/2006/main" xmlns:r="http://schemas.openxmlformats.org/officeDocument/2006/relationships" xmlns:p="http://schemas.openxmlformats.org/presentationml/2006/main">
+  <p:cSld>
+    <p:spTree>
+      <p:nvGrpSpPr>
+        <p:cNvPr id="1" name=""/>
+        <p:cNvGrpSpPr/>
+        <p:nvPr/>
+      </p:nvGrpSpPr>
+      <p:grpSpPr>
+        <a:xfrm>
+          <a:off x="0" y="0"/>
+          <a:ext cx="0" cy="0"/>
+          <a:chOff x="0" y="0"/>
+          <a:chExt cx="0" cy="0"/>
+        </a:xfrm>
+      </p:grpSpPr>
+      <p:sp>
+        <p:nvSpPr>
+          <p:cNvPr id="5" name="Text Placeholder 4"/>
+          <p:cNvSpPr>
+            <a:spLocks noGrp="1"/>
+          </p:cNvSpPr>
+          <p:nvPr>
+            <p:ph type="body" sz="quarter" idx="10"/>
+          </p:nvPr>
+        </p:nvSpPr>
+        <p:spPr/>
+        <p:txBody>
+          <a:bodyPr/>
+          <a:lstStyle/>
+          <a:p>
+            <a:r>
+              <a:rPr lang="en-US" dirty="0" smtClean="0"/>
+              <a:t>ASP.NET Web API</a:t>
+            </a:r>
+            <a:endParaRPr lang="en-US" dirty="0"/>
+          </a:p>
+        </p:txBody>
+      </p:sp>
+      <p:sp>
+        <p:nvSpPr>
+          <p:cNvPr id="4" name="Subtitle 3"/>
+          <p:cNvSpPr>
+            <a:spLocks noGrp="1"/>
+          </p:cNvSpPr>
+          <p:nvPr>
+            <p:ph type="subTitle" idx="1"/>
+          </p:nvPr>
+        </p:nvSpPr>
+        <p:spPr/>
+        <p:txBody>
+          <a:bodyPr/>
+          <a:lstStyle/>
+          <a:p>
+            <a:r>
+              <a:rPr lang="en-US" dirty="0" smtClean="0"/>
+              <a:t>Overview</a:t>
+            </a:r>
+            <a:endParaRPr lang="en-US" dirty="0"/>
+          </a:p>
+        </p:txBody>
+      </p:sp>
+    </p:spTree>
+    <p:extLst>
+      <p:ext uri="{BB962C8B-B14F-4D97-AF65-F5344CB8AC3E}">
+        <p14:creationId xmlns:p14="http://schemas.microsoft.com/office/powerpoint/2010/main" val="3203669398"/>
+      </p:ext>
+    </p:extLst>
+  </p:cSld>
+  <p:clrMapOvr>
+    <a:masterClrMapping/>
+  </p:clrMapOvr>
 </p:sld>
 </file>
 
@@ -7686,19 +7616,6 @@
 </file>
 
 <file path=customXml/item1.xml><?xml version="1.0" encoding="utf-8"?>
-<p:properties xmlns:p="http://schemas.microsoft.com/office/2006/metadata/properties" xmlns:xsi="http://www.w3.org/2001/XMLSchema-instance" xmlns:pc="http://schemas.microsoft.com/office/infopath/2007/PartnerControls">
-  <documentManagement>
-    <TaxCatchAll xmlns="230e9df3-be65-4c73-a93b-d1236ebd677e"/>
-    <PublishingExpirationDate xmlns="http://schemas.microsoft.com/sharepoint/v3" xsi:nil="true"/>
-    <PublishingStartDate xmlns="http://schemas.microsoft.com/sharepoint/v3" xsi:nil="true"/>
-    <TaxKeywordTaxHTField xmlns="230e9df3-be65-4c73-a93b-d1236ebd677e">
-      <Terms xmlns="http://schemas.microsoft.com/office/infopath/2007/PartnerControls"/>
-    </TaxKeywordTaxHTField>
-  </documentManagement>
-</p:properties>
-</file>
-
-<file path=customXml/item2.xml><?xml version="1.0" encoding="utf-8"?>
 <ct:contentTypeSchema xmlns:ct="http://schemas.microsoft.com/office/2006/metadata/contentType" xmlns:ma="http://schemas.microsoft.com/office/2006/metadata/properties/metaAttributes" ct:_="" ma:_="" ma:contentTypeName="Document" ma:contentTypeID="0x010100496889825850D44592AC5D2F43187AE4" ma:contentTypeVersion="5" ma:contentTypeDescription="Create a new document." ma:contentTypeScope="" ma:versionID="fde90edb5a63ba841bca516fd2abaf95">
   <xsd:schema xmlns:xsd="http://www.w3.org/2001/XMLSchema" xmlns:xs="http://www.w3.org/2001/XMLSchema" xmlns:p="http://schemas.microsoft.com/office/2006/metadata/properties" xmlns:ns1="http://schemas.microsoft.com/sharepoint/v3" xmlns:ns2="230e9df3-be65-4c73-a93b-d1236ebd677e" xmlns:ns3="27aa9422-7f1f-4c84-9cdf-302b1a67e513" targetNamespace="http://schemas.microsoft.com/office/2006/metadata/properties" ma:root="true" ma:fieldsID="5e7808ae941cc340dbe51a3031959734" ns1:_="" ns2:_="" ns3:_="">
     <xsd:import namespace="http://schemas.microsoft.com/sharepoint/v3"/>
@@ -7880,6 +7797,19 @@
 </ct:contentTypeSchema>
 </file>
 
+<file path=customXml/item2.xml><?xml version="1.0" encoding="utf-8"?>
+<p:properties xmlns:p="http://schemas.microsoft.com/office/2006/metadata/properties" xmlns:xsi="http://www.w3.org/2001/XMLSchema-instance" xmlns:pc="http://schemas.microsoft.com/office/infopath/2007/PartnerControls">
+  <documentManagement>
+    <TaxCatchAll xmlns="230e9df3-be65-4c73-a93b-d1236ebd677e"/>
+    <PublishingExpirationDate xmlns="http://schemas.microsoft.com/sharepoint/v3" xsi:nil="true"/>
+    <PublishingStartDate xmlns="http://schemas.microsoft.com/sharepoint/v3" xsi:nil="true"/>
+    <TaxKeywordTaxHTField xmlns="230e9df3-be65-4c73-a93b-d1236ebd677e">
+      <Terms xmlns="http://schemas.microsoft.com/office/infopath/2007/PartnerControls"/>
+    </TaxKeywordTaxHTField>
+  </documentManagement>
+</p:properties>
+</file>
+
 <file path=customXml/item3.xml><?xml version="1.0" encoding="utf-8"?>
 <?mso-contentType ?>
 <FormTemplates xmlns="http://schemas.microsoft.com/sharepoint/v3/contenttype/forms">
@@ -7890,24 +7820,6 @@
 </file>
 
 <file path=customXml/itemProps1.xml><?xml version="1.0" encoding="utf-8"?>
-<ds:datastoreItem xmlns:ds="http://schemas.openxmlformats.org/officeDocument/2006/customXml" ds:itemID="{7025FDD9-4C58-4084-9F89-0E6ADD6FFF55}">
-  <ds:schemaRefs>
-    <ds:schemaRef ds:uri="27aa9422-7f1f-4c84-9cdf-302b1a67e513"/>
-    <ds:schemaRef ds:uri="http://schemas.microsoft.com/office/2006/documentManagement/types"/>
-    <ds:schemaRef ds:uri="http://schemas.microsoft.com/office/2006/metadata/properties"/>
-    <ds:schemaRef ds:uri="http://purl.org/dc/elements/1.1/"/>
-    <ds:schemaRef ds:uri="230e9df3-be65-4c73-a93b-d1236ebd677e"/>
-    <ds:schemaRef ds:uri="http://purl.org/dc/terms/"/>
-    <ds:schemaRef ds:uri="http://schemas.openxmlformats.org/package/2006/metadata/core-properties"/>
-    <ds:schemaRef ds:uri="http://purl.org/dc/dcmitype/"/>
-    <ds:schemaRef ds:uri="http://schemas.microsoft.com/office/infopath/2007/PartnerControls"/>
-    <ds:schemaRef ds:uri="http://schemas.microsoft.com/sharepoint/v3"/>
-    <ds:schemaRef ds:uri="http://www.w3.org/XML/1998/namespace"/>
-  </ds:schemaRefs>
-</ds:datastoreItem>
-</file>
-
-<file path=customXml/itemProps2.xml><?xml version="1.0" encoding="utf-8"?>
 <ds:datastoreItem xmlns:ds="http://schemas.openxmlformats.org/officeDocument/2006/customXml" ds:itemID="{3253B29C-1CCD-4FE8-A1C4-023A0910DF96}">
   <ds:schemaRefs>
     <ds:schemaRef ds:uri="http://schemas.microsoft.com/office/2006/metadata/contentType"/>
@@ -7927,6 +7839,24 @@
 </ds:datastoreItem>
 </file>
 
+<file path=customXml/itemProps2.xml><?xml version="1.0" encoding="utf-8"?>
+<ds:datastoreItem xmlns:ds="http://schemas.openxmlformats.org/officeDocument/2006/customXml" ds:itemID="{7025FDD9-4C58-4084-9F89-0E6ADD6FFF55}">
+  <ds:schemaRefs>
+    <ds:schemaRef ds:uri="27aa9422-7f1f-4c84-9cdf-302b1a67e513"/>
+    <ds:schemaRef ds:uri="http://schemas.microsoft.com/office/2006/documentManagement/types"/>
+    <ds:schemaRef ds:uri="http://schemas.microsoft.com/office/2006/metadata/properties"/>
+    <ds:schemaRef ds:uri="http://purl.org/dc/elements/1.1/"/>
+    <ds:schemaRef ds:uri="230e9df3-be65-4c73-a93b-d1236ebd677e"/>
+    <ds:schemaRef ds:uri="http://purl.org/dc/terms/"/>
+    <ds:schemaRef ds:uri="http://schemas.openxmlformats.org/package/2006/metadata/core-properties"/>
+    <ds:schemaRef ds:uri="http://purl.org/dc/dcmitype/"/>
+    <ds:schemaRef ds:uri="http://schemas.microsoft.com/office/infopath/2007/PartnerControls"/>
+    <ds:schemaRef ds:uri="http://schemas.microsoft.com/sharepoint/v3"/>
+    <ds:schemaRef ds:uri="http://www.w3.org/XML/1998/namespace"/>
+  </ds:schemaRefs>
+</ds:datastoreItem>
+</file>
+
 <file path=customXml/itemProps3.xml><?xml version="1.0" encoding="utf-8"?>
 <ds:datastoreItem xmlns:ds="http://schemas.openxmlformats.org/officeDocument/2006/customXml" ds:itemID="{B0CA13EC-1D3C-4D6F-8D1C-E8A452CFC79A}">
   <ds:schemaRefs>

</xml_diff>

<commit_message>
Pass at Module 1
Module 1 updates
</commit_message>
<xml_diff>
--- a/Slides/Module 1 - Introduction to Web API.pptx
+++ b/Slides/Module 1 - Introduction to Web API.pptx
@@ -222,7 +222,7 @@
           <a:p>
             <a:fld id="{312E7B4A-039C-48A2-9B2C-AF16AA3873D8}" type="datetimeFigureOut">
               <a:rPr lang="en-US" smtClean="0"/>
-              <a:t>1/23/2015</a:t>
+              <a:t>1/25/2015</a:t>
             </a:fld>
             <a:endParaRPr lang="en-US"/>
           </a:p>
@@ -387,7 +387,7 @@
           <a:p>
             <a:fld id="{DA005A0C-54D9-45AA-87D4-C551D08DFCE1}" type="datetimeFigureOut">
               <a:rPr lang="en-US" smtClean="0"/>
-              <a:t>1/23/2015</a:t>
+              <a:t>1/25/2015</a:t>
             </a:fld>
             <a:endParaRPr lang="en-US"/>
           </a:p>
@@ -745,6 +745,90 @@
 </p:notes>
 </file>
 
+<file path=ppt/notesSlides/notesSlide10.xml><?xml version="1.0" encoding="utf-8"?>
+<p:notes xmlns:a="http://schemas.openxmlformats.org/drawingml/2006/main" xmlns:r="http://schemas.openxmlformats.org/officeDocument/2006/relationships" xmlns:p="http://schemas.openxmlformats.org/presentationml/2006/main">
+  <p:cSld>
+    <p:spTree>
+      <p:nvGrpSpPr>
+        <p:cNvPr id="1" name=""/>
+        <p:cNvGrpSpPr/>
+        <p:nvPr/>
+      </p:nvGrpSpPr>
+      <p:grpSpPr>
+        <a:xfrm>
+          <a:off x="0" y="0"/>
+          <a:ext cx="0" cy="0"/>
+          <a:chOff x="0" y="0"/>
+          <a:chExt cx="0" cy="0"/>
+        </a:xfrm>
+      </p:grpSpPr>
+      <p:sp>
+        <p:nvSpPr>
+          <p:cNvPr id="2" name="Slide Image Placeholder 1"/>
+          <p:cNvSpPr>
+            <a:spLocks noGrp="1" noRot="1" noChangeAspect="1"/>
+          </p:cNvSpPr>
+          <p:nvPr>
+            <p:ph type="sldImg"/>
+          </p:nvPr>
+        </p:nvSpPr>
+        <p:spPr/>
+      </p:sp>
+      <p:sp>
+        <p:nvSpPr>
+          <p:cNvPr id="3" name="Notes Placeholder 2"/>
+          <p:cNvSpPr>
+            <a:spLocks noGrp="1"/>
+          </p:cNvSpPr>
+          <p:nvPr>
+            <p:ph type="body" idx="1"/>
+          </p:nvPr>
+        </p:nvSpPr>
+        <p:spPr/>
+        <p:txBody>
+          <a:bodyPr/>
+          <a:lstStyle/>
+          <a:p>
+            <a:endParaRPr lang="en-US" dirty="0"/>
+          </a:p>
+        </p:txBody>
+      </p:sp>
+      <p:sp>
+        <p:nvSpPr>
+          <p:cNvPr id="4" name="Slide Number Placeholder 3"/>
+          <p:cNvSpPr>
+            <a:spLocks noGrp="1"/>
+          </p:cNvSpPr>
+          <p:nvPr>
+            <p:ph type="sldNum" sz="quarter" idx="10"/>
+          </p:nvPr>
+        </p:nvSpPr>
+        <p:spPr/>
+        <p:txBody>
+          <a:bodyPr/>
+          <a:lstStyle/>
+          <a:p>
+            <a:fld id="{4CFD207A-07DF-40AD-A916-9872E089CE7A}" type="slidenum">
+              <a:rPr lang="en-US" smtClean="0"/>
+              <a:t>19</a:t>
+            </a:fld>
+            <a:endParaRPr lang="en-US"/>
+          </a:p>
+        </p:txBody>
+      </p:sp>
+    </p:spTree>
+    <p:extLst>
+      <p:ext uri="{BB962C8B-B14F-4D97-AF65-F5344CB8AC3E}">
+        <p14:creationId xmlns:p14="http://schemas.microsoft.com/office/powerpoint/2010/main" val="2868944259"/>
+      </p:ext>
+    </p:extLst>
+  </p:cSld>
+  <p:clrMapOvr>
+    <a:masterClrMapping/>
+  </p:clrMapOvr>
+</p:notes>
+</file>
+
 <file path=ppt/notesSlides/notesSlide2.xml><?xml version="1.0" encoding="utf-8"?>
 <p:notes xmlns:a="http://schemas.openxmlformats.org/drawingml/2006/main" xmlns:r="http://schemas.openxmlformats.org/officeDocument/2006/relationships" xmlns:p="http://schemas.openxmlformats.org/presentationml/2006/main">
   <p:cSld>
@@ -1320,17 +1404,17 @@
           <a:p>
             <a:r>
               <a:rPr lang="en-US" dirty="0" smtClean="0"/>
-              <a:t>http://</a:t>
-            </a:r>
-            <a:r>
-              <a:rPr lang="en-US" smtClean="0"/>
-              <a:t>odata.org</a:t>
-            </a:r>
-            <a:r>
-              <a:rPr lang="en-US" baseline="0" smtClean="0"/>
-              <a:t> examples</a:t>
-            </a:r>
-            <a:endParaRPr lang="en-US"/>
+              <a:t>http://odata.org</a:t>
+            </a:r>
+            <a:r>
+              <a:rPr lang="en-US" baseline="0" dirty="0" smtClean="0"/>
+              <a:t> </a:t>
+            </a:r>
+            <a:r>
+              <a:rPr lang="en-US" baseline="0" dirty="0" smtClean="0"/>
+              <a:t>examples See RestDEMO.txt</a:t>
+            </a:r>
+            <a:endParaRPr lang="en-US" dirty="0"/>
           </a:p>
         </p:txBody>
       </p:sp>
@@ -1414,6 +1498,14 @@
           <a:bodyPr/>
           <a:lstStyle/>
           <a:p>
+            <a:r>
+              <a:rPr lang="en-US" dirty="0" smtClean="0"/>
+              <a:t>Show MVC with Web</a:t>
+            </a:r>
+            <a:r>
+              <a:rPr lang="en-US" baseline="0" dirty="0" smtClean="0"/>
+              <a:t> API, Web API, and Empty with Web API</a:t>
+            </a:r>
             <a:endParaRPr lang="en-US" dirty="0"/>
           </a:p>
         </p:txBody>
@@ -1435,7 +1527,7 @@
           <a:p>
             <a:fld id="{4CFD207A-07DF-40AD-A916-9872E089CE7A}" type="slidenum">
               <a:rPr lang="en-US" smtClean="0"/>
-              <a:t>19</a:t>
+              <a:t>18</a:t>
             </a:fld>
             <a:endParaRPr lang="en-US"/>
           </a:p>
@@ -1444,7 +1536,7 @@
     </p:spTree>
     <p:extLst>
       <p:ext uri="{BB962C8B-B14F-4D97-AF65-F5344CB8AC3E}">
-        <p14:creationId xmlns:p14="http://schemas.microsoft.com/office/powerpoint/2010/main" val="2868944259"/>
+        <p14:creationId xmlns:p14="http://schemas.microsoft.com/office/powerpoint/2010/main" val="3924134073"/>
       </p:ext>
     </p:extLst>
   </p:cSld>
@@ -4551,6 +4643,13 @@
   <p:clrMapOvr>
     <a:masterClrMapping/>
   </p:clrMapOvr>
+  <p:timing>
+    <p:tnLst>
+      <p:par>
+        <p:cTn id="1" dur="indefinite" restart="never" nodeType="tmRoot"/>
+      </p:par>
+    </p:tnLst>
+  </p:timing>
 </p:sld>
 </file>
 
@@ -4756,6 +4855,13 @@
   <p:clrMapOvr>
     <a:masterClrMapping/>
   </p:clrMapOvr>
+  <p:timing>
+    <p:tnLst>
+      <p:par>
+        <p:cTn id="1" dur="indefinite" restart="never" nodeType="tmRoot"/>
+      </p:par>
+    </p:tnLst>
+  </p:timing>
 </p:sld>
 </file>
 
@@ -4994,6 +5100,13 @@
   <p:clrMapOvr>
     <a:masterClrMapping/>
   </p:clrMapOvr>
+  <p:timing>
+    <p:tnLst>
+      <p:par>
+        <p:cTn id="1" dur="indefinite" restart="never" nodeType="tmRoot"/>
+      </p:par>
+    </p:tnLst>
+  </p:timing>
 </p:sld>
 </file>
 
@@ -5325,6 +5438,13 @@
   <p:clrMapOvr>
     <a:masterClrMapping/>
   </p:clrMapOvr>
+  <p:timing>
+    <p:tnLst>
+      <p:par>
+        <p:cTn id="1" dur="indefinite" restart="never" nodeType="tmRoot"/>
+      </p:par>
+    </p:tnLst>
+  </p:timing>
 </p:sld>
 </file>
 
@@ -5742,11 +5862,7 @@
             </a:pPr>
             <a:r>
               <a:rPr lang="en-US" dirty="0" smtClean="0"/>
-              <a:t>Long </a:t>
-            </a:r>
-            <a:r>
-              <a:rPr lang="en-US" dirty="0" smtClean="0"/>
-              <a:t>time geek</a:t>
+              <a:t>Long time geek</a:t>
             </a:r>
           </a:p>
           <a:p>
@@ -5764,11 +5880,7 @@
             </a:pPr>
             <a:r>
               <a:rPr lang="en-US" dirty="0" smtClean="0"/>
-              <a:t>Periodic </a:t>
-            </a:r>
-            <a:r>
-              <a:rPr lang="en-US" dirty="0" smtClean="0"/>
-              <a:t>blogger at </a:t>
+              <a:t>Periodic blogger at </a:t>
             </a:r>
             <a:r>
               <a:rPr lang="en-US" dirty="0" smtClean="0">
@@ -5829,11 +5941,11 @@
   <p:clrMapOvr>
     <a:masterClrMapping/>
   </p:clrMapOvr>
-  <mc:AlternateContent xmlns:mc="http://schemas.openxmlformats.org/markup-compatibility/2006">
-    <mc:Choice xmlns:p14="http://schemas.microsoft.com/office/powerpoint/2010/main" Requires="p14">
+  <mc:AlternateContent xmlns:mc="http://schemas.openxmlformats.org/markup-compatibility/2006" xmlns:p14="http://schemas.microsoft.com/office/powerpoint/2010/main">
+    <mc:Choice Requires="p14">
       <p:transition spd="slow" p14:dur="2000"/>
     </mc:Choice>
-    <mc:Fallback>
+    <mc:Fallback xmlns="">
       <p:transition spd="slow"/>
     </mc:Fallback>
   </mc:AlternateContent>
@@ -5919,14 +6031,14 @@
                 <a:gridCol w="5762625">
                   <a:extLst>
                     <a:ext uri="{9D8B030D-6E8A-4147-A177-3AD203B41FA5}">
-                      <a16:colId xmlns:a16="http://schemas.microsoft.com/office/drawing/2014/main" xmlns="" val="1632794655"/>
+                      <a16:colId xmlns="" xmlns:a16="http://schemas.microsoft.com/office/drawing/2014/main" val="1632794655"/>
                     </a:ext>
                   </a:extLst>
                 </a:gridCol>
                 <a:gridCol w="5762625">
                   <a:extLst>
                     <a:ext uri="{9D8B030D-6E8A-4147-A177-3AD203B41FA5}">
-                      <a16:colId xmlns:a16="http://schemas.microsoft.com/office/drawing/2014/main" xmlns="" val="2011313899"/>
+                      <a16:colId xmlns="" xmlns:a16="http://schemas.microsoft.com/office/drawing/2014/main" val="2011313899"/>
                     </a:ext>
                   </a:extLst>
                 </a:gridCol>
@@ -5971,7 +6083,7 @@
                 </a:tc>
                 <a:extLst>
                   <a:ext uri="{0D108BD9-81ED-4DB2-BD59-A6C34878D82A}">
-                    <a16:rowId xmlns:a16="http://schemas.microsoft.com/office/drawing/2014/main" xmlns="" val="1789177411"/>
+                    <a16:rowId xmlns="" xmlns:a16="http://schemas.microsoft.com/office/drawing/2014/main" val="1789177411"/>
                   </a:ext>
                 </a:extLst>
               </a:tr>
@@ -6039,7 +6151,7 @@
                 </a:tc>
                 <a:extLst>
                   <a:ext uri="{0D108BD9-81ED-4DB2-BD59-A6C34878D82A}">
-                    <a16:rowId xmlns:a16="http://schemas.microsoft.com/office/drawing/2014/main" xmlns="" val="3842815335"/>
+                    <a16:rowId xmlns="" xmlns:a16="http://schemas.microsoft.com/office/drawing/2014/main" val="3842815335"/>
                   </a:ext>
                 </a:extLst>
               </a:tr>
@@ -6086,7 +6198,7 @@
                 </a:tc>
                 <a:extLst>
                   <a:ext uri="{0D108BD9-81ED-4DB2-BD59-A6C34878D82A}">
-                    <a16:rowId xmlns:a16="http://schemas.microsoft.com/office/drawing/2014/main" xmlns="" val="321066646"/>
+                    <a16:rowId xmlns="" xmlns:a16="http://schemas.microsoft.com/office/drawing/2014/main" val="321066646"/>
                   </a:ext>
                 </a:extLst>
               </a:tr>
@@ -6171,7 +6283,7 @@
                 </a:tc>
                 <a:extLst>
                   <a:ext uri="{0D108BD9-81ED-4DB2-BD59-A6C34878D82A}">
-                    <a16:rowId xmlns:a16="http://schemas.microsoft.com/office/drawing/2014/main" xmlns="" val="3812060533"/>
+                    <a16:rowId xmlns="" xmlns:a16="http://schemas.microsoft.com/office/drawing/2014/main" val="3812060533"/>
                   </a:ext>
                 </a:extLst>
               </a:tr>
@@ -6279,7 +6391,11 @@
             <a:pPr lvl="1"/>
             <a:r>
               <a:rPr lang="en-US" dirty="0" smtClean="0"/>
-              <a:t>Interesting in building </a:t>
+              <a:t>Interested </a:t>
+            </a:r>
+            <a:r>
+              <a:rPr lang="en-US" dirty="0" smtClean="0"/>
+              <a:t>in building </a:t>
             </a:r>
             <a:r>
               <a:rPr lang="en-US" dirty="0"/>
@@ -6390,15 +6506,7 @@
             </a:r>
             <a:r>
               <a:rPr lang="en-US" dirty="0" smtClean="0"/>
-              <a:t>2.6</a:t>
-            </a:r>
-            <a:r>
-              <a:rPr lang="en-US" dirty="0" smtClean="0"/>
-              <a:t>M </a:t>
-            </a:r>
-            <a:r>
-              <a:rPr lang="en-US" dirty="0" smtClean="0"/>
-              <a:t>registered users</a:t>
+              <a:t>2.6M registered users</a:t>
             </a:r>
           </a:p>
           <a:p>
@@ -6815,6 +6923,13 @@
   <p:clrMapOvr>
     <a:masterClrMapping/>
   </p:clrMapOvr>
+  <p:timing>
+    <p:tnLst>
+      <p:par>
+        <p:cTn id="1" dur="indefinite" restart="never" nodeType="tmRoot"/>
+      </p:par>
+    </p:tnLst>
+  </p:timing>
 </p:sld>
 </file>
 
@@ -7626,28 +7741,6 @@
 </file>
 
 <file path=customXml/item1.xml><?xml version="1.0" encoding="utf-8"?>
-<?mso-contentType ?>
-<FormTemplates xmlns="http://schemas.microsoft.com/sharepoint/v3/contenttype/forms">
-  <Display>DocumentLibraryForm</Display>
-  <Edit>DocumentLibraryForm</Edit>
-  <New>DocumentLibraryForm</New>
-</FormTemplates>
-</file>
-
-<file path=customXml/item2.xml><?xml version="1.0" encoding="utf-8"?>
-<p:properties xmlns:p="http://schemas.microsoft.com/office/2006/metadata/properties" xmlns:xsi="http://www.w3.org/2001/XMLSchema-instance" xmlns:pc="http://schemas.microsoft.com/office/infopath/2007/PartnerControls">
-  <documentManagement>
-    <TaxCatchAll xmlns="230e9df3-be65-4c73-a93b-d1236ebd677e"/>
-    <PublishingExpirationDate xmlns="http://schemas.microsoft.com/sharepoint/v3" xsi:nil="true"/>
-    <PublishingStartDate xmlns="http://schemas.microsoft.com/sharepoint/v3" xsi:nil="true"/>
-    <TaxKeywordTaxHTField xmlns="230e9df3-be65-4c73-a93b-d1236ebd677e">
-      <Terms xmlns="http://schemas.microsoft.com/office/infopath/2007/PartnerControls"/>
-    </TaxKeywordTaxHTField>
-  </documentManagement>
-</p:properties>
-</file>
-
-<file path=customXml/item3.xml><?xml version="1.0" encoding="utf-8"?>
 <ct:contentTypeSchema xmlns:ct="http://schemas.microsoft.com/office/2006/metadata/contentType" xmlns:ma="http://schemas.microsoft.com/office/2006/metadata/properties/metaAttributes" ct:_="" ma:_="" ma:contentTypeName="Document" ma:contentTypeID="0x010100496889825850D44592AC5D2F43187AE4" ma:contentTypeVersion="5" ma:contentTypeDescription="Create a new document." ma:contentTypeScope="" ma:versionID="fde90edb5a63ba841bca516fd2abaf95">
   <xsd:schema xmlns:xsd="http://www.w3.org/2001/XMLSchema" xmlns:xs="http://www.w3.org/2001/XMLSchema" xmlns:p="http://schemas.microsoft.com/office/2006/metadata/properties" xmlns:ns1="http://schemas.microsoft.com/sharepoint/v3" xmlns:ns2="230e9df3-be65-4c73-a93b-d1236ebd677e" xmlns:ns3="27aa9422-7f1f-4c84-9cdf-302b1a67e513" targetNamespace="http://schemas.microsoft.com/office/2006/metadata/properties" ma:root="true" ma:fieldsID="5e7808ae941cc340dbe51a3031959734" ns1:_="" ns2:_="" ns3:_="">
     <xsd:import namespace="http://schemas.microsoft.com/sharepoint/v3"/>
@@ -7829,10 +7922,44 @@
 </ct:contentTypeSchema>
 </file>
 
+<file path=customXml/item2.xml><?xml version="1.0" encoding="utf-8"?>
+<p:properties xmlns:p="http://schemas.microsoft.com/office/2006/metadata/properties" xmlns:xsi="http://www.w3.org/2001/XMLSchema-instance" xmlns:pc="http://schemas.microsoft.com/office/infopath/2007/PartnerControls">
+  <documentManagement>
+    <TaxCatchAll xmlns="230e9df3-be65-4c73-a93b-d1236ebd677e"/>
+    <PublishingExpirationDate xmlns="http://schemas.microsoft.com/sharepoint/v3" xsi:nil="true"/>
+    <PublishingStartDate xmlns="http://schemas.microsoft.com/sharepoint/v3" xsi:nil="true"/>
+    <TaxKeywordTaxHTField xmlns="230e9df3-be65-4c73-a93b-d1236ebd677e">
+      <Terms xmlns="http://schemas.microsoft.com/office/infopath/2007/PartnerControls"/>
+    </TaxKeywordTaxHTField>
+  </documentManagement>
+</p:properties>
+</file>
+
+<file path=customXml/item3.xml><?xml version="1.0" encoding="utf-8"?>
+<?mso-contentType ?>
+<FormTemplates xmlns="http://schemas.microsoft.com/sharepoint/v3/contenttype/forms">
+  <Display>DocumentLibraryForm</Display>
+  <Edit>DocumentLibraryForm</Edit>
+  <New>DocumentLibraryForm</New>
+</FormTemplates>
+</file>
+
 <file path=customXml/itemProps1.xml><?xml version="1.0" encoding="utf-8"?>
-<ds:datastoreItem xmlns:ds="http://schemas.openxmlformats.org/officeDocument/2006/customXml" ds:itemID="{B0CA13EC-1D3C-4D6F-8D1C-E8A452CFC79A}">
+<ds:datastoreItem xmlns:ds="http://schemas.openxmlformats.org/officeDocument/2006/customXml" ds:itemID="{3253B29C-1CCD-4FE8-A1C4-023A0910DF96}">
   <ds:schemaRefs>
-    <ds:schemaRef ds:uri="http://schemas.microsoft.com/sharepoint/v3/contenttype/forms"/>
+    <ds:schemaRef ds:uri="http://schemas.microsoft.com/office/2006/metadata/contentType"/>
+    <ds:schemaRef ds:uri="http://schemas.microsoft.com/office/2006/metadata/properties/metaAttributes"/>
+    <ds:schemaRef ds:uri="http://www.w3.org/2001/XMLSchema"/>
+    <ds:schemaRef ds:uri="http://schemas.microsoft.com/office/2006/metadata/properties"/>
+    <ds:schemaRef ds:uri="http://schemas.microsoft.com/sharepoint/v3"/>
+    <ds:schemaRef ds:uri="230e9df3-be65-4c73-a93b-d1236ebd677e"/>
+    <ds:schemaRef ds:uri="27aa9422-7f1f-4c84-9cdf-302b1a67e513"/>
+    <ds:schemaRef ds:uri="http://schemas.microsoft.com/office/2006/documentManagement/types"/>
+    <ds:schemaRef ds:uri="http://schemas.microsoft.com/office/infopath/2007/PartnerControls"/>
+    <ds:schemaRef ds:uri="http://schemas.openxmlformats.org/package/2006/metadata/core-properties"/>
+    <ds:schemaRef ds:uri="http://purl.org/dc/elements/1.1/"/>
+    <ds:schemaRef ds:uri="http://purl.org/dc/terms/"/>
+    <ds:schemaRef ds:uri="http://schemas.microsoft.com/internal/obd"/>
   </ds:schemaRefs>
 </ds:datastoreItem>
 </file>
@@ -7856,21 +7983,9 @@
 </file>
 
 <file path=customXml/itemProps3.xml><?xml version="1.0" encoding="utf-8"?>
-<ds:datastoreItem xmlns:ds="http://schemas.openxmlformats.org/officeDocument/2006/customXml" ds:itemID="{3253B29C-1CCD-4FE8-A1C4-023A0910DF96}">
+<ds:datastoreItem xmlns:ds="http://schemas.openxmlformats.org/officeDocument/2006/customXml" ds:itemID="{B0CA13EC-1D3C-4D6F-8D1C-E8A452CFC79A}">
   <ds:schemaRefs>
-    <ds:schemaRef ds:uri="http://schemas.microsoft.com/office/2006/metadata/contentType"/>
-    <ds:schemaRef ds:uri="http://schemas.microsoft.com/office/2006/metadata/properties/metaAttributes"/>
-    <ds:schemaRef ds:uri="http://www.w3.org/2001/XMLSchema"/>
-    <ds:schemaRef ds:uri="http://schemas.microsoft.com/office/2006/metadata/properties"/>
-    <ds:schemaRef ds:uri="http://schemas.microsoft.com/sharepoint/v3"/>
-    <ds:schemaRef ds:uri="230e9df3-be65-4c73-a93b-d1236ebd677e"/>
-    <ds:schemaRef ds:uri="27aa9422-7f1f-4c84-9cdf-302b1a67e513"/>
-    <ds:schemaRef ds:uri="http://schemas.microsoft.com/office/2006/documentManagement/types"/>
-    <ds:schemaRef ds:uri="http://schemas.microsoft.com/office/infopath/2007/PartnerControls"/>
-    <ds:schemaRef ds:uri="http://schemas.openxmlformats.org/package/2006/metadata/core-properties"/>
-    <ds:schemaRef ds:uri="http://purl.org/dc/elements/1.1/"/>
-    <ds:schemaRef ds:uri="http://purl.org/dc/terms/"/>
-    <ds:schemaRef ds:uri="http://schemas.microsoft.com/internal/obd"/>
+    <ds:schemaRef ds:uri="http://schemas.microsoft.com/sharepoint/v3/contenttype/forms"/>
   </ds:schemaRefs>
 </ds:datastoreItem>
 </file>
</xml_diff>

<commit_message>
Slide updates and demo modifications
</commit_message>
<xml_diff>
--- a/Slides/Module 1 - Introduction to Web API.pptx
+++ b/Slides/Module 1 - Introduction to Web API.pptx
@@ -222,7 +222,7 @@
           <a:p>
             <a:fld id="{312E7B4A-039C-48A2-9B2C-AF16AA3873D8}" type="datetimeFigureOut">
               <a:rPr lang="en-US" smtClean="0"/>
-              <a:t>1/25/2015</a:t>
+              <a:t>1/28/2015</a:t>
             </a:fld>
             <a:endParaRPr lang="en-US"/>
           </a:p>
@@ -387,7 +387,7 @@
           <a:p>
             <a:fld id="{DA005A0C-54D9-45AA-87D4-C551D08DFCE1}" type="datetimeFigureOut">
               <a:rPr lang="en-US" smtClean="0"/>
-              <a:t>1/25/2015</a:t>
+              <a:t>1/28/2015</a:t>
             </a:fld>
             <a:endParaRPr lang="en-US"/>
           </a:p>
@@ -789,6 +789,14 @@
           <a:bodyPr/>
           <a:lstStyle/>
           <a:p>
+            <a:r>
+              <a:rPr lang="en-US" dirty="0" smtClean="0"/>
+              <a:t>Show MVC w/ Web API vs. Web API, also show Web API with individual accounts to demonstrate the </a:t>
+            </a:r>
+            <a:r>
+              <a:rPr lang="en-US" smtClean="0"/>
+              <a:t>token infrastructure</a:t>
+            </a:r>
             <a:endParaRPr lang="en-US" dirty="0"/>
           </a:p>
         </p:txBody>
@@ -1408,11 +1416,7 @@
             </a:r>
             <a:r>
               <a:rPr lang="en-US" baseline="0" dirty="0" smtClean="0"/>
-              <a:t> </a:t>
-            </a:r>
-            <a:r>
-              <a:rPr lang="en-US" baseline="0" dirty="0" smtClean="0"/>
-              <a:t>examples See RestDEMO.txt</a:t>
+              <a:t> examples See RestDEMO.txt</a:t>
             </a:r>
             <a:endParaRPr lang="en-US" dirty="0"/>
           </a:p>
@@ -6031,14 +6035,14 @@
                 <a:gridCol w="5762625">
                   <a:extLst>
                     <a:ext uri="{9D8B030D-6E8A-4147-A177-3AD203B41FA5}">
-                      <a16:colId xmlns="" xmlns:a16="http://schemas.microsoft.com/office/drawing/2014/main" val="1632794655"/>
+                      <a16:colId xmlns:a16="http://schemas.microsoft.com/office/drawing/2014/main" xmlns="" val="1632794655"/>
                     </a:ext>
                   </a:extLst>
                 </a:gridCol>
                 <a:gridCol w="5762625">
                   <a:extLst>
                     <a:ext uri="{9D8B030D-6E8A-4147-A177-3AD203B41FA5}">
-                      <a16:colId xmlns="" xmlns:a16="http://schemas.microsoft.com/office/drawing/2014/main" val="2011313899"/>
+                      <a16:colId xmlns:a16="http://schemas.microsoft.com/office/drawing/2014/main" xmlns="" val="2011313899"/>
                     </a:ext>
                   </a:extLst>
                 </a:gridCol>
@@ -6083,7 +6087,7 @@
                 </a:tc>
                 <a:extLst>
                   <a:ext uri="{0D108BD9-81ED-4DB2-BD59-A6C34878D82A}">
-                    <a16:rowId xmlns="" xmlns:a16="http://schemas.microsoft.com/office/drawing/2014/main" val="1789177411"/>
+                    <a16:rowId xmlns:a16="http://schemas.microsoft.com/office/drawing/2014/main" xmlns="" val="1789177411"/>
                   </a:ext>
                 </a:extLst>
               </a:tr>
@@ -6151,7 +6155,7 @@
                 </a:tc>
                 <a:extLst>
                   <a:ext uri="{0D108BD9-81ED-4DB2-BD59-A6C34878D82A}">
-                    <a16:rowId xmlns="" xmlns:a16="http://schemas.microsoft.com/office/drawing/2014/main" val="3842815335"/>
+                    <a16:rowId xmlns:a16="http://schemas.microsoft.com/office/drawing/2014/main" xmlns="" val="3842815335"/>
                   </a:ext>
                 </a:extLst>
               </a:tr>
@@ -6198,7 +6202,7 @@
                 </a:tc>
                 <a:extLst>
                   <a:ext uri="{0D108BD9-81ED-4DB2-BD59-A6C34878D82A}">
-                    <a16:rowId xmlns="" xmlns:a16="http://schemas.microsoft.com/office/drawing/2014/main" val="321066646"/>
+                    <a16:rowId xmlns:a16="http://schemas.microsoft.com/office/drawing/2014/main" xmlns="" val="321066646"/>
                   </a:ext>
                 </a:extLst>
               </a:tr>
@@ -6283,7 +6287,7 @@
                 </a:tc>
                 <a:extLst>
                   <a:ext uri="{0D108BD9-81ED-4DB2-BD59-A6C34878D82A}">
-                    <a16:rowId xmlns="" xmlns:a16="http://schemas.microsoft.com/office/drawing/2014/main" val="3812060533"/>
+                    <a16:rowId xmlns:a16="http://schemas.microsoft.com/office/drawing/2014/main" xmlns="" val="3812060533"/>
                   </a:ext>
                 </a:extLst>
               </a:tr>
@@ -6391,11 +6395,7 @@
             <a:pPr lvl="1"/>
             <a:r>
               <a:rPr lang="en-US" dirty="0" smtClean="0"/>
-              <a:t>Interested </a:t>
-            </a:r>
-            <a:r>
-              <a:rPr lang="en-US" dirty="0" smtClean="0"/>
-              <a:t>in building </a:t>
+              <a:t>Interested in building </a:t>
             </a:r>
             <a:r>
               <a:rPr lang="en-US" dirty="0"/>
@@ -7741,6 +7741,28 @@
 </file>
 
 <file path=customXml/item1.xml><?xml version="1.0" encoding="utf-8"?>
+<?mso-contentType ?>
+<FormTemplates xmlns="http://schemas.microsoft.com/sharepoint/v3/contenttype/forms">
+  <Display>DocumentLibraryForm</Display>
+  <Edit>DocumentLibraryForm</Edit>
+  <New>DocumentLibraryForm</New>
+</FormTemplates>
+</file>
+
+<file path=customXml/item2.xml><?xml version="1.0" encoding="utf-8"?>
+<p:properties xmlns:p="http://schemas.microsoft.com/office/2006/metadata/properties" xmlns:xsi="http://www.w3.org/2001/XMLSchema-instance" xmlns:pc="http://schemas.microsoft.com/office/infopath/2007/PartnerControls">
+  <documentManagement>
+    <TaxCatchAll xmlns="230e9df3-be65-4c73-a93b-d1236ebd677e"/>
+    <PublishingExpirationDate xmlns="http://schemas.microsoft.com/sharepoint/v3" xsi:nil="true"/>
+    <PublishingStartDate xmlns="http://schemas.microsoft.com/sharepoint/v3" xsi:nil="true"/>
+    <TaxKeywordTaxHTField xmlns="230e9df3-be65-4c73-a93b-d1236ebd677e">
+      <Terms xmlns="http://schemas.microsoft.com/office/infopath/2007/PartnerControls"/>
+    </TaxKeywordTaxHTField>
+  </documentManagement>
+</p:properties>
+</file>
+
+<file path=customXml/item3.xml><?xml version="1.0" encoding="utf-8"?>
 <ct:contentTypeSchema xmlns:ct="http://schemas.microsoft.com/office/2006/metadata/contentType" xmlns:ma="http://schemas.microsoft.com/office/2006/metadata/properties/metaAttributes" ct:_="" ma:_="" ma:contentTypeName="Document" ma:contentTypeID="0x010100496889825850D44592AC5D2F43187AE4" ma:contentTypeVersion="5" ma:contentTypeDescription="Create a new document." ma:contentTypeScope="" ma:versionID="fde90edb5a63ba841bca516fd2abaf95">
   <xsd:schema xmlns:xsd="http://www.w3.org/2001/XMLSchema" xmlns:xs="http://www.w3.org/2001/XMLSchema" xmlns:p="http://schemas.microsoft.com/office/2006/metadata/properties" xmlns:ns1="http://schemas.microsoft.com/sharepoint/v3" xmlns:ns2="230e9df3-be65-4c73-a93b-d1236ebd677e" xmlns:ns3="27aa9422-7f1f-4c84-9cdf-302b1a67e513" targetNamespace="http://schemas.microsoft.com/office/2006/metadata/properties" ma:root="true" ma:fieldsID="5e7808ae941cc340dbe51a3031959734" ns1:_="" ns2:_="" ns3:_="">
     <xsd:import namespace="http://schemas.microsoft.com/sharepoint/v3"/>
@@ -7922,44 +7944,10 @@
 </ct:contentTypeSchema>
 </file>
 
-<file path=customXml/item2.xml><?xml version="1.0" encoding="utf-8"?>
-<p:properties xmlns:p="http://schemas.microsoft.com/office/2006/metadata/properties" xmlns:xsi="http://www.w3.org/2001/XMLSchema-instance" xmlns:pc="http://schemas.microsoft.com/office/infopath/2007/PartnerControls">
-  <documentManagement>
-    <TaxCatchAll xmlns="230e9df3-be65-4c73-a93b-d1236ebd677e"/>
-    <PublishingExpirationDate xmlns="http://schemas.microsoft.com/sharepoint/v3" xsi:nil="true"/>
-    <PublishingStartDate xmlns="http://schemas.microsoft.com/sharepoint/v3" xsi:nil="true"/>
-    <TaxKeywordTaxHTField xmlns="230e9df3-be65-4c73-a93b-d1236ebd677e">
-      <Terms xmlns="http://schemas.microsoft.com/office/infopath/2007/PartnerControls"/>
-    </TaxKeywordTaxHTField>
-  </documentManagement>
-</p:properties>
-</file>
-
-<file path=customXml/item3.xml><?xml version="1.0" encoding="utf-8"?>
-<?mso-contentType ?>
-<FormTemplates xmlns="http://schemas.microsoft.com/sharepoint/v3/contenttype/forms">
-  <Display>DocumentLibraryForm</Display>
-  <Edit>DocumentLibraryForm</Edit>
-  <New>DocumentLibraryForm</New>
-</FormTemplates>
-</file>
-
 <file path=customXml/itemProps1.xml><?xml version="1.0" encoding="utf-8"?>
-<ds:datastoreItem xmlns:ds="http://schemas.openxmlformats.org/officeDocument/2006/customXml" ds:itemID="{3253B29C-1CCD-4FE8-A1C4-023A0910DF96}">
+<ds:datastoreItem xmlns:ds="http://schemas.openxmlformats.org/officeDocument/2006/customXml" ds:itemID="{B0CA13EC-1D3C-4D6F-8D1C-E8A452CFC79A}">
   <ds:schemaRefs>
-    <ds:schemaRef ds:uri="http://schemas.microsoft.com/office/2006/metadata/contentType"/>
-    <ds:schemaRef ds:uri="http://schemas.microsoft.com/office/2006/metadata/properties/metaAttributes"/>
-    <ds:schemaRef ds:uri="http://www.w3.org/2001/XMLSchema"/>
-    <ds:schemaRef ds:uri="http://schemas.microsoft.com/office/2006/metadata/properties"/>
-    <ds:schemaRef ds:uri="http://schemas.microsoft.com/sharepoint/v3"/>
-    <ds:schemaRef ds:uri="230e9df3-be65-4c73-a93b-d1236ebd677e"/>
-    <ds:schemaRef ds:uri="27aa9422-7f1f-4c84-9cdf-302b1a67e513"/>
-    <ds:schemaRef ds:uri="http://schemas.microsoft.com/office/2006/documentManagement/types"/>
-    <ds:schemaRef ds:uri="http://schemas.microsoft.com/office/infopath/2007/PartnerControls"/>
-    <ds:schemaRef ds:uri="http://schemas.openxmlformats.org/package/2006/metadata/core-properties"/>
-    <ds:schemaRef ds:uri="http://purl.org/dc/elements/1.1/"/>
-    <ds:schemaRef ds:uri="http://purl.org/dc/terms/"/>
-    <ds:schemaRef ds:uri="http://schemas.microsoft.com/internal/obd"/>
+    <ds:schemaRef ds:uri="http://schemas.microsoft.com/sharepoint/v3/contenttype/forms"/>
   </ds:schemaRefs>
 </ds:datastoreItem>
 </file>
@@ -7983,9 +7971,21 @@
 </file>
 
 <file path=customXml/itemProps3.xml><?xml version="1.0" encoding="utf-8"?>
-<ds:datastoreItem xmlns:ds="http://schemas.openxmlformats.org/officeDocument/2006/customXml" ds:itemID="{B0CA13EC-1D3C-4D6F-8D1C-E8A452CFC79A}">
+<ds:datastoreItem xmlns:ds="http://schemas.openxmlformats.org/officeDocument/2006/customXml" ds:itemID="{3253B29C-1CCD-4FE8-A1C4-023A0910DF96}">
   <ds:schemaRefs>
-    <ds:schemaRef ds:uri="http://schemas.microsoft.com/sharepoint/v3/contenttype/forms"/>
+    <ds:schemaRef ds:uri="http://schemas.microsoft.com/office/2006/metadata/contentType"/>
+    <ds:schemaRef ds:uri="http://schemas.microsoft.com/office/2006/metadata/properties/metaAttributes"/>
+    <ds:schemaRef ds:uri="http://www.w3.org/2001/XMLSchema"/>
+    <ds:schemaRef ds:uri="http://schemas.microsoft.com/office/2006/metadata/properties"/>
+    <ds:schemaRef ds:uri="http://schemas.microsoft.com/sharepoint/v3"/>
+    <ds:schemaRef ds:uri="230e9df3-be65-4c73-a93b-d1236ebd677e"/>
+    <ds:schemaRef ds:uri="27aa9422-7f1f-4c84-9cdf-302b1a67e513"/>
+    <ds:schemaRef ds:uri="http://schemas.microsoft.com/office/2006/documentManagement/types"/>
+    <ds:schemaRef ds:uri="http://schemas.microsoft.com/office/infopath/2007/PartnerControls"/>
+    <ds:schemaRef ds:uri="http://schemas.openxmlformats.org/package/2006/metadata/core-properties"/>
+    <ds:schemaRef ds:uri="http://purl.org/dc/elements/1.1/"/>
+    <ds:schemaRef ds:uri="http://purl.org/dc/terms/"/>
+    <ds:schemaRef ds:uri="http://schemas.microsoft.com/internal/obd"/>
   </ds:schemaRefs>
 </ds:datastoreItem>
 </file>
</xml_diff>